<commit_message>
feat: updated presentation with data slides
</commit_message>
<xml_diff>
--- a/report/project_presentation.pptx
+++ b/report/project_presentation.pptx
@@ -13576,8 +13576,8 @@
         </p:nvSpPr>
         <p:spPr>
           <a:xfrm>
-            <a:off x="1154954" y="2603500"/>
-            <a:ext cx="10549366" cy="3416300"/>
+            <a:off x="1154954" y="2603499"/>
+            <a:ext cx="10549366" cy="3651445"/>
           </a:xfrm>
         </p:spPr>
         <p:txBody>
@@ -13586,25 +13586,32 @@
           <a:p>
             <a:r>
               <a:rPr lang="en-US" dirty="0"/>
-              <a:t>MIMIC–III  data is used as proposed by the paper</a:t>
+              <a:t>MIMIC–III dataset is used as proposed by the paper</a:t>
             </a:r>
           </a:p>
           <a:p>
             <a:r>
               <a:rPr lang="en-US" dirty="0"/>
-              <a:t>The paper implementation uses the MIMIC Extract pipeline  to preprocess the data.</a:t>
+              <a:t>MIMIC Extract pipeline to extract structured time series features</a:t>
             </a:r>
           </a:p>
           <a:p>
             <a:r>
               <a:rPr lang="en-US" dirty="0"/>
-              <a:t>A “pre-processed output” of the MIMIC Extract pipeline is available already  in GCP. We leveraged this extract after getting MIMIC-III GCP access through </a:t>
+              <a:t>Clinical notes events, admissions events and ICU stay events</a:t>
             </a:r>
+          </a:p>
+          <a:p>
             <a:r>
-              <a:rPr lang="en-US" dirty="0" err="1"/>
-              <a:t>physionet</a:t>
+              <a:rPr lang="en-US" dirty="0"/>
+              <a:t>Data split into Train/Dev/Test set to 70%/20%/10%</a:t>
             </a:r>
-            <a:endParaRPr lang="en-US" dirty="0"/>
+          </a:p>
+          <a:p>
+            <a:r>
+              <a:rPr lang="en-US" dirty="0"/>
+              <a:t>Eliminate data of patients age &lt; 15 years and the LOS &lt;12 hours and LOS &gt; 10 days </a:t>
+            </a:r>
           </a:p>
           <a:p>
             <a:endParaRPr lang="en-US" dirty="0"/>
@@ -13632,30 +13639,30 @@
           <p:nvPr>
             <p:extLst>
               <p:ext uri="{D42A27DB-BD31-4B8C-83A1-F6EECF244321}">
-                <p14:modId xmlns:p14="http://schemas.microsoft.com/office/powerpoint/2010/main" val="693868964"/>
+                <p14:modId xmlns:p14="http://schemas.microsoft.com/office/powerpoint/2010/main" val="1874554245"/>
               </p:ext>
             </p:extLst>
           </p:nvPr>
         </p:nvGraphicFramePr>
         <p:xfrm>
-          <a:off x="1258277" y="4616417"/>
-          <a:ext cx="8128000" cy="1112520"/>
+          <a:off x="1617332" y="4925231"/>
+          <a:ext cx="2289970" cy="900607"/>
         </p:xfrm>
         <a:graphic>
           <a:graphicData uri="http://schemas.openxmlformats.org/drawingml/2006/table">
             <a:tbl>
-              <a:tblPr firstRow="1" bandRow="1">
+              <a:tblPr firstCol="1">
                 <a:tableStyleId>{5C22544A-7EE6-4342-B048-85BDC9FD1C3A}</a:tableStyleId>
               </a:tblPr>
               <a:tblGrid>
-                <a:gridCol w="4064000">
+                <a:gridCol w="1325081">
                   <a:extLst>
                     <a:ext uri="{9D8B030D-6E8A-4147-A177-3AD203B41FA5}">
                       <a16:colId xmlns:a16="http://schemas.microsoft.com/office/drawing/2014/main" val="2368788603"/>
                     </a:ext>
                   </a:extLst>
                 </a:gridCol>
-                <a:gridCol w="4064000">
+                <a:gridCol w="964889">
                   <a:extLst>
                     <a:ext uri="{9D8B030D-6E8A-4147-A177-3AD203B41FA5}">
                       <a16:colId xmlns:a16="http://schemas.microsoft.com/office/drawing/2014/main" val="759245444"/>
@@ -13663,32 +13670,40 @@
                   </a:extLst>
                 </a:gridCol>
               </a:tblGrid>
-              <a:tr h="370840">
+              <a:tr h="443407">
                 <a:tc>
                   <a:txBody>
                     <a:bodyPr/>
                     <a:lstStyle/>
                     <a:p>
+                      <a:pPr algn="ctr"/>
                       <a:r>
-                        <a:rPr lang="en-US" dirty="0"/>
-                        <a:t>Total No of Patients</a:t>
+                        <a:rPr lang="en-US" sz="1200" b="0" dirty="0">
+                          <a:latin typeface="Arial" panose="020B0604020202020204" pitchFamily="34" charset="0"/>
+                          <a:cs typeface="Arial" panose="020B0604020202020204" pitchFamily="34" charset="0"/>
+                        </a:rPr>
+                        <a:t>No of Patients</a:t>
                       </a:r>
                     </a:p>
                   </a:txBody>
-                  <a:tcPr/>
+                  <a:tcPr anchor="ctr"/>
                 </a:tc>
                 <a:tc>
                   <a:txBody>
                     <a:bodyPr/>
                     <a:lstStyle/>
                     <a:p>
+                      <a:pPr algn="ctr"/>
                       <a:r>
-                        <a:rPr lang="en-US" dirty="0"/>
+                        <a:rPr lang="en-US" sz="1200" dirty="0">
+                          <a:latin typeface="Arial" panose="020B0604020202020204" pitchFamily="34" charset="0"/>
+                          <a:cs typeface="Arial" panose="020B0604020202020204" pitchFamily="34" charset="0"/>
+                        </a:rPr>
                         <a:t>34, 472</a:t>
                       </a:r>
                     </a:p>
                   </a:txBody>
-                  <a:tcPr/>
+                  <a:tcPr anchor="ctr"/>
                 </a:tc>
                 <a:extLst>
                   <a:ext uri="{0D108BD9-81ED-4DB2-BD59-A6C34878D82A}">
@@ -13696,32 +13711,40 @@
                   </a:ext>
                 </a:extLst>
               </a:tr>
-              <a:tr h="370840">
+              <a:tr h="443407">
                 <a:tc>
                   <a:txBody>
                     <a:bodyPr/>
                     <a:lstStyle/>
                     <a:p>
+                      <a:pPr algn="ctr"/>
                       <a:r>
-                        <a:rPr lang="en-US" dirty="0"/>
+                        <a:rPr lang="en-US" sz="1200" b="0" dirty="0">
+                          <a:latin typeface="Arial" panose="020B0604020202020204" pitchFamily="34" charset="0"/>
+                          <a:cs typeface="Arial" panose="020B0604020202020204" pitchFamily="34" charset="0"/>
+                        </a:rPr>
                         <a:t>Total Time Series Variables</a:t>
                       </a:r>
                     </a:p>
                   </a:txBody>
-                  <a:tcPr/>
+                  <a:tcPr anchor="ctr"/>
                 </a:tc>
                 <a:tc>
                   <a:txBody>
                     <a:bodyPr/>
                     <a:lstStyle/>
                     <a:p>
+                      <a:pPr algn="ctr"/>
                       <a:r>
-                        <a:rPr lang="en-US" dirty="0"/>
+                        <a:rPr lang="en-US" sz="1200" dirty="0">
+                          <a:latin typeface="Arial" panose="020B0604020202020204" pitchFamily="34" charset="0"/>
+                          <a:cs typeface="Arial" panose="020B0604020202020204" pitchFamily="34" charset="0"/>
+                        </a:rPr>
                         <a:t>104</a:t>
                       </a:r>
                     </a:p>
                   </a:txBody>
-                  <a:tcPr/>
+                  <a:tcPr anchor="ctr"/>
                 </a:tc>
                 <a:extLst>
                   <a:ext uri="{0D108BD9-81ED-4DB2-BD59-A6C34878D82A}">
@@ -13729,30 +13752,508 @@
                   </a:ext>
                 </a:extLst>
               </a:tr>
-              <a:tr h="370840">
+            </a:tbl>
+          </a:graphicData>
+        </a:graphic>
+      </p:graphicFrame>
+      <p:graphicFrame>
+        <p:nvGraphicFramePr>
+          <p:cNvPr id="5" name="Table 4">
+            <a:extLst>
+              <a:ext uri="{FF2B5EF4-FFF2-40B4-BE49-F238E27FC236}">
+                <a16:creationId xmlns:a16="http://schemas.microsoft.com/office/drawing/2014/main" id="{7CB426F0-4229-0F3F-C861-6E249A4CEACC}"/>
+              </a:ext>
+            </a:extLst>
+          </p:cNvPr>
+          <p:cNvGraphicFramePr>
+            <a:graphicFrameLocks noGrp="1"/>
+          </p:cNvGraphicFramePr>
+          <p:nvPr>
+            <p:extLst>
+              <p:ext uri="{D42A27DB-BD31-4B8C-83A1-F6EECF244321}">
+                <p14:modId xmlns:p14="http://schemas.microsoft.com/office/powerpoint/2010/main" val="4037966188"/>
+              </p:ext>
+            </p:extLst>
+          </p:nvPr>
+        </p:nvGraphicFramePr>
+        <p:xfrm>
+          <a:off x="4560285" y="4939024"/>
+          <a:ext cx="6233002" cy="886814"/>
+        </p:xfrm>
+        <a:graphic>
+          <a:graphicData uri="http://schemas.openxmlformats.org/drawingml/2006/table">
+            <a:tbl>
+              <a:tblPr firstRow="1">
+                <a:tableStyleId>{5C22544A-7EE6-4342-B048-85BDC9FD1C3A}</a:tableStyleId>
+              </a:tblPr>
+              <a:tblGrid>
+                <a:gridCol w="999044">
+                  <a:extLst>
+                    <a:ext uri="{9D8B030D-6E8A-4147-A177-3AD203B41FA5}">
+                      <a16:colId xmlns:a16="http://schemas.microsoft.com/office/drawing/2014/main" val="2368788603"/>
+                    </a:ext>
+                  </a:extLst>
+                </a:gridCol>
+                <a:gridCol w="1007218">
+                  <a:extLst>
+                    <a:ext uri="{9D8B030D-6E8A-4147-A177-3AD203B41FA5}">
+                      <a16:colId xmlns:a16="http://schemas.microsoft.com/office/drawing/2014/main" val="759245444"/>
+                    </a:ext>
+                  </a:extLst>
+                </a:gridCol>
+                <a:gridCol w="845348">
+                  <a:extLst>
+                    <a:ext uri="{9D8B030D-6E8A-4147-A177-3AD203B41FA5}">
+                      <a16:colId xmlns:a16="http://schemas.microsoft.com/office/drawing/2014/main" val="1634975802"/>
+                    </a:ext>
+                  </a:extLst>
+                </a:gridCol>
+                <a:gridCol w="722340">
+                  <a:extLst>
+                    <a:ext uri="{9D8B030D-6E8A-4147-A177-3AD203B41FA5}">
+                      <a16:colId xmlns:a16="http://schemas.microsoft.com/office/drawing/2014/main" val="3070726687"/>
+                    </a:ext>
+                  </a:extLst>
+                </a:gridCol>
+                <a:gridCol w="968356">
+                  <a:extLst>
+                    <a:ext uri="{9D8B030D-6E8A-4147-A177-3AD203B41FA5}">
+                      <a16:colId xmlns:a16="http://schemas.microsoft.com/office/drawing/2014/main" val="2979461448"/>
+                    </a:ext>
+                  </a:extLst>
+                </a:gridCol>
+                <a:gridCol w="845348">
+                  <a:extLst>
+                    <a:ext uri="{9D8B030D-6E8A-4147-A177-3AD203B41FA5}">
+                      <a16:colId xmlns:a16="http://schemas.microsoft.com/office/drawing/2014/main" val="1083874526"/>
+                    </a:ext>
+                  </a:extLst>
+                </a:gridCol>
+                <a:gridCol w="845348">
+                  <a:extLst>
+                    <a:ext uri="{9D8B030D-6E8A-4147-A177-3AD203B41FA5}">
+                      <a16:colId xmlns:a16="http://schemas.microsoft.com/office/drawing/2014/main" val="867443412"/>
+                    </a:ext>
+                  </a:extLst>
+                </a:gridCol>
+              </a:tblGrid>
+              <a:tr h="443407">
                 <a:tc>
                   <a:txBody>
                     <a:bodyPr/>
                     <a:lstStyle/>
                     <a:p>
-                      <a:endParaRPr lang="en-US" dirty="0"/>
+                      <a:pPr algn="ctr"/>
+                      <a:r>
+                        <a:rPr lang="en-US" sz="1200" b="0" kern="1200" dirty="0">
+                          <a:solidFill>
+                            <a:schemeClr val="lt1"/>
+                          </a:solidFill>
+                          <a:latin typeface="Arial" panose="020B0604020202020204" pitchFamily="34" charset="0"/>
+                          <a:ea typeface="+mn-ea"/>
+                          <a:cs typeface="Arial" panose="020B0604020202020204" pitchFamily="34" charset="0"/>
+                        </a:rPr>
+                        <a:t>Dosage</a:t>
+                      </a:r>
                     </a:p>
                   </a:txBody>
-                  <a:tcPr/>
+                  <a:tcPr anchor="ctr"/>
                 </a:tc>
                 <a:tc>
                   <a:txBody>
                     <a:bodyPr/>
                     <a:lstStyle/>
                     <a:p>
-                      <a:endParaRPr lang="en-US" dirty="0"/>
+                      <a:pPr algn="ctr"/>
+                      <a:r>
+                        <a:rPr lang="en-US" sz="1200" b="0" kern="1200" dirty="0">
+                          <a:solidFill>
+                            <a:schemeClr val="lt1"/>
+                          </a:solidFill>
+                          <a:latin typeface="Arial" panose="020B0604020202020204" pitchFamily="34" charset="0"/>
+                          <a:ea typeface="+mn-ea"/>
+                          <a:cs typeface="Arial" panose="020B0604020202020204" pitchFamily="34" charset="0"/>
+                        </a:rPr>
+                        <a:t>Drug</a:t>
+                      </a:r>
                     </a:p>
                   </a:txBody>
-                  <a:tcPr/>
+                  <a:tcPr anchor="ctr"/>
+                </a:tc>
+                <a:tc>
+                  <a:txBody>
+                    <a:bodyPr/>
+                    <a:lstStyle/>
+                    <a:p>
+                      <a:pPr algn="ctr"/>
+                      <a:r>
+                        <a:rPr lang="en-US" sz="1200" b="0" kern="1200" dirty="0">
+                          <a:solidFill>
+                            <a:schemeClr val="lt1"/>
+                          </a:solidFill>
+                          <a:latin typeface="Arial" panose="020B0604020202020204" pitchFamily="34" charset="0"/>
+                          <a:ea typeface="+mn-ea"/>
+                          <a:cs typeface="Arial" panose="020B0604020202020204" pitchFamily="34" charset="0"/>
+                        </a:rPr>
+                        <a:t>Duration</a:t>
+                      </a:r>
+                    </a:p>
+                  </a:txBody>
+                  <a:tcPr anchor="ctr"/>
+                </a:tc>
+                <a:tc>
+                  <a:txBody>
+                    <a:bodyPr/>
+                    <a:lstStyle/>
+                    <a:p>
+                      <a:pPr algn="ctr"/>
+                      <a:r>
+                        <a:rPr lang="en-US" sz="1200" b="0" kern="1200" dirty="0">
+                          <a:solidFill>
+                            <a:schemeClr val="lt1"/>
+                          </a:solidFill>
+                          <a:latin typeface="Arial" panose="020B0604020202020204" pitchFamily="34" charset="0"/>
+                          <a:ea typeface="+mn-ea"/>
+                          <a:cs typeface="Arial" panose="020B0604020202020204" pitchFamily="34" charset="0"/>
+                        </a:rPr>
+                        <a:t>Route</a:t>
+                      </a:r>
+                    </a:p>
+                  </a:txBody>
+                  <a:tcPr anchor="ctr"/>
+                </a:tc>
+                <a:tc>
+                  <a:txBody>
+                    <a:bodyPr/>
+                    <a:lstStyle/>
+                    <a:p>
+                      <a:pPr algn="ctr"/>
+                      <a:r>
+                        <a:rPr lang="en-US" sz="1200" b="0" kern="1200" dirty="0">
+                          <a:solidFill>
+                            <a:schemeClr val="lt1"/>
+                          </a:solidFill>
+                          <a:latin typeface="Arial" panose="020B0604020202020204" pitchFamily="34" charset="0"/>
+                          <a:ea typeface="+mn-ea"/>
+                          <a:cs typeface="Arial" panose="020B0604020202020204" pitchFamily="34" charset="0"/>
+                        </a:rPr>
+                        <a:t>Frequency</a:t>
+                      </a:r>
+                    </a:p>
+                  </a:txBody>
+                  <a:tcPr anchor="ctr"/>
+                </a:tc>
+                <a:tc>
+                  <a:txBody>
+                    <a:bodyPr/>
+                    <a:lstStyle/>
+                    <a:p>
+                      <a:pPr algn="ctr"/>
+                      <a:r>
+                        <a:rPr lang="en-US" sz="1200" b="0" kern="1200" dirty="0">
+                          <a:solidFill>
+                            <a:schemeClr val="lt1"/>
+                          </a:solidFill>
+                          <a:latin typeface="Arial" panose="020B0604020202020204" pitchFamily="34" charset="0"/>
+                          <a:ea typeface="+mn-ea"/>
+                          <a:cs typeface="Arial" panose="020B0604020202020204" pitchFamily="34" charset="0"/>
+                        </a:rPr>
+                        <a:t>Strength</a:t>
+                      </a:r>
+                    </a:p>
+                  </a:txBody>
+                  <a:tcPr anchor="ctr"/>
+                </a:tc>
+                <a:tc>
+                  <a:txBody>
+                    <a:bodyPr/>
+                    <a:lstStyle/>
+                    <a:p>
+                      <a:pPr algn="ctr"/>
+                      <a:r>
+                        <a:rPr lang="en-US" sz="1200" b="0" kern="1200" dirty="0">
+                          <a:solidFill>
+                            <a:schemeClr val="lt1"/>
+                          </a:solidFill>
+                          <a:latin typeface="Arial" panose="020B0604020202020204" pitchFamily="34" charset="0"/>
+                          <a:ea typeface="+mn-ea"/>
+                          <a:cs typeface="Arial" panose="020B0604020202020204" pitchFamily="34" charset="0"/>
+                        </a:rPr>
+                        <a:t>Form</a:t>
+                      </a:r>
+                    </a:p>
+                  </a:txBody>
+                  <a:tcPr anchor="ctr"/>
                 </a:tc>
                 <a:extLst>
                   <a:ext uri="{0D108BD9-81ED-4DB2-BD59-A6C34878D82A}">
-                    <a16:rowId xmlns:a16="http://schemas.microsoft.com/office/drawing/2014/main" val="516843818"/>
+                    <a16:rowId xmlns:a16="http://schemas.microsoft.com/office/drawing/2014/main" val="2202340455"/>
+                  </a:ext>
+                </a:extLst>
+              </a:tr>
+              <a:tr h="443407">
+                <a:tc>
+                  <a:txBody>
+                    <a:bodyPr/>
+                    <a:lstStyle/>
+                    <a:p>
+                      <a:pPr marL="0" marR="0" lvl="0" indent="0" algn="ctr" defTabSz="457200" rtl="0" eaLnBrk="1" fontAlgn="auto" latinLnBrk="0" hangingPunct="1">
+                        <a:lnSpc>
+                          <a:spcPct val="100000"/>
+                        </a:lnSpc>
+                        <a:spcBef>
+                          <a:spcPts val="0"/>
+                        </a:spcBef>
+                        <a:spcAft>
+                          <a:spcPts val="0"/>
+                        </a:spcAft>
+                        <a:buClrTx/>
+                        <a:buSzTx/>
+                        <a:buFontTx/>
+                        <a:buNone/>
+                        <a:tabLst/>
+                        <a:defRPr/>
+                      </a:pPr>
+                      <a:r>
+                        <a:rPr lang="en-US" sz="1200" kern="1200" dirty="0">
+                          <a:solidFill>
+                            <a:schemeClr val="dk1"/>
+                          </a:solidFill>
+                          <a:latin typeface="Arial" panose="020B0604020202020204" pitchFamily="34" charset="0"/>
+                          <a:ea typeface="+mn-ea"/>
+                          <a:cs typeface="Arial" panose="020B0604020202020204" pitchFamily="34" charset="0"/>
+                        </a:rPr>
+                        <a:t>84130</a:t>
+                      </a:r>
+                    </a:p>
+                  </a:txBody>
+                  <a:tcPr anchor="ctr"/>
+                </a:tc>
+                <a:tc>
+                  <a:txBody>
+                    <a:bodyPr/>
+                    <a:lstStyle/>
+                    <a:p>
+                      <a:pPr marL="0" marR="0" lvl="0" indent="0" algn="ctr" defTabSz="457200" rtl="0" eaLnBrk="1" fontAlgn="auto" latinLnBrk="0" hangingPunct="1">
+                        <a:lnSpc>
+                          <a:spcPct val="100000"/>
+                        </a:lnSpc>
+                        <a:spcBef>
+                          <a:spcPts val="0"/>
+                        </a:spcBef>
+                        <a:spcAft>
+                          <a:spcPts val="0"/>
+                        </a:spcAft>
+                        <a:buClrTx/>
+                        <a:buSzTx/>
+                        <a:buFontTx/>
+                        <a:buNone/>
+                        <a:tabLst/>
+                        <a:defRPr/>
+                      </a:pPr>
+                      <a:r>
+                        <a:rPr lang="en-US" sz="1200" kern="1200" dirty="0">
+                          <a:solidFill>
+                            <a:schemeClr val="dk1"/>
+                          </a:solidFill>
+                          <a:latin typeface="Arial" panose="020B0604020202020204" pitchFamily="34" charset="0"/>
+                          <a:ea typeface="+mn-ea"/>
+                          <a:cs typeface="Arial" panose="020B0604020202020204" pitchFamily="34" charset="0"/>
+                        </a:rPr>
+                        <a:t>684196</a:t>
+                      </a:r>
+                    </a:p>
+                  </a:txBody>
+                  <a:tcPr anchor="ctr"/>
+                </a:tc>
+                <a:tc>
+                  <a:txBody>
+                    <a:bodyPr/>
+                    <a:lstStyle/>
+                    <a:p>
+                      <a:pPr marL="0" marR="0" lvl="0" indent="0" algn="ctr" defTabSz="457200" rtl="0" eaLnBrk="1" fontAlgn="auto" latinLnBrk="0" hangingPunct="1">
+                        <a:lnSpc>
+                          <a:spcPct val="100000"/>
+                        </a:lnSpc>
+                        <a:spcBef>
+                          <a:spcPts val="0"/>
+                        </a:spcBef>
+                        <a:spcAft>
+                          <a:spcPts val="0"/>
+                        </a:spcAft>
+                        <a:buClrTx/>
+                        <a:buSzTx/>
+                        <a:buFontTx/>
+                        <a:buNone/>
+                        <a:tabLst/>
+                        <a:defRPr/>
+                      </a:pPr>
+                      <a:r>
+                        <a:rPr lang="en-US" sz="1200" kern="1200" dirty="0">
+                          <a:solidFill>
+                            <a:schemeClr val="dk1"/>
+                          </a:solidFill>
+                          <a:latin typeface="Arial" panose="020B0604020202020204" pitchFamily="34" charset="0"/>
+                          <a:ea typeface="+mn-ea"/>
+                          <a:cs typeface="Arial" panose="020B0604020202020204" pitchFamily="34" charset="0"/>
+                        </a:rPr>
+                        <a:t>6303</a:t>
+                      </a:r>
+                    </a:p>
+                  </a:txBody>
+                  <a:tcPr anchor="ctr"/>
+                </a:tc>
+                <a:tc>
+                  <a:txBody>
+                    <a:bodyPr/>
+                    <a:lstStyle/>
+                    <a:p>
+                      <a:pPr marL="0" marR="0" lvl="0" indent="0" algn="ctr" defTabSz="457200" rtl="0" eaLnBrk="1" fontAlgn="auto" latinLnBrk="0" hangingPunct="1">
+                        <a:lnSpc>
+                          <a:spcPct val="100000"/>
+                        </a:lnSpc>
+                        <a:spcBef>
+                          <a:spcPts val="0"/>
+                        </a:spcBef>
+                        <a:spcAft>
+                          <a:spcPts val="0"/>
+                        </a:spcAft>
+                        <a:buClrTx/>
+                        <a:buSzTx/>
+                        <a:buFontTx/>
+                        <a:buNone/>
+                        <a:tabLst/>
+                        <a:defRPr/>
+                      </a:pPr>
+                      <a:r>
+                        <a:rPr lang="en-US" sz="1200" kern="1200" dirty="0">
+                          <a:solidFill>
+                            <a:schemeClr val="dk1"/>
+                          </a:solidFill>
+                          <a:latin typeface="Arial" panose="020B0604020202020204" pitchFamily="34" charset="0"/>
+                          <a:ea typeface="+mn-ea"/>
+                          <a:cs typeface="Arial" panose="020B0604020202020204" pitchFamily="34" charset="0"/>
+                        </a:rPr>
+                        <a:t>215923</a:t>
+                      </a:r>
+                    </a:p>
+                  </a:txBody>
+                  <a:tcPr anchor="ctr"/>
+                </a:tc>
+                <a:tc>
+                  <a:txBody>
+                    <a:bodyPr/>
+                    <a:lstStyle/>
+                    <a:p>
+                      <a:pPr marL="0" marR="0" lvl="0" indent="0" algn="ctr" defTabSz="457200" rtl="0" eaLnBrk="1" fontAlgn="auto" latinLnBrk="0" hangingPunct="1">
+                        <a:lnSpc>
+                          <a:spcPct val="100000"/>
+                        </a:lnSpc>
+                        <a:spcBef>
+                          <a:spcPts val="0"/>
+                        </a:spcBef>
+                        <a:spcAft>
+                          <a:spcPts val="0"/>
+                        </a:spcAft>
+                        <a:buClrTx/>
+                        <a:buSzTx/>
+                        <a:buFontTx/>
+                        <a:buNone/>
+                        <a:tabLst/>
+                        <a:defRPr/>
+                      </a:pPr>
+                      <a:r>
+                        <a:rPr lang="en-US" sz="1200" kern="1200" dirty="0">
+                          <a:solidFill>
+                            <a:schemeClr val="dk1"/>
+                          </a:solidFill>
+                          <a:latin typeface="Arial" panose="020B0604020202020204" pitchFamily="34" charset="0"/>
+                          <a:ea typeface="+mn-ea"/>
+                          <a:cs typeface="Arial" panose="020B0604020202020204" pitchFamily="34" charset="0"/>
+                        </a:rPr>
+                        <a:t>131607</a:t>
+                      </a:r>
+                    </a:p>
+                  </a:txBody>
+                  <a:tcPr anchor="ctr"/>
+                </a:tc>
+                <a:tc>
+                  <a:txBody>
+                    <a:bodyPr/>
+                    <a:lstStyle/>
+                    <a:p>
+                      <a:pPr marL="0" marR="0" lvl="0" indent="0" algn="ctr" defTabSz="457200" rtl="0" eaLnBrk="1" fontAlgn="auto" latinLnBrk="0" hangingPunct="1">
+                        <a:lnSpc>
+                          <a:spcPct val="100000"/>
+                        </a:lnSpc>
+                        <a:spcBef>
+                          <a:spcPts val="0"/>
+                        </a:spcBef>
+                        <a:spcAft>
+                          <a:spcPts val="0"/>
+                        </a:spcAft>
+                        <a:buClrTx/>
+                        <a:buSzTx/>
+                        <a:buFontTx/>
+                        <a:buNone/>
+                        <a:tabLst/>
+                        <a:defRPr/>
+                      </a:pPr>
+                      <a:r>
+                        <a:rPr lang="en-US" sz="1200" kern="1200" dirty="0">
+                          <a:solidFill>
+                            <a:schemeClr val="dk1"/>
+                          </a:solidFill>
+                          <a:latin typeface="Arial" panose="020B0604020202020204" pitchFamily="34" charset="0"/>
+                          <a:ea typeface="+mn-ea"/>
+                          <a:cs typeface="Arial" panose="020B0604020202020204" pitchFamily="34" charset="0"/>
+                        </a:rPr>
+                        <a:t>186851</a:t>
+                      </a:r>
+                    </a:p>
+                  </a:txBody>
+                  <a:tcPr anchor="ctr"/>
+                </a:tc>
+                <a:tc>
+                  <a:txBody>
+                    <a:bodyPr/>
+                    <a:lstStyle/>
+                    <a:p>
+                      <a:pPr marL="0" marR="0" lvl="0" indent="0" algn="ctr" defTabSz="457200" rtl="0" eaLnBrk="1" fontAlgn="auto" latinLnBrk="0" hangingPunct="1">
+                        <a:lnSpc>
+                          <a:spcPct val="100000"/>
+                        </a:lnSpc>
+                        <a:spcBef>
+                          <a:spcPts val="0"/>
+                        </a:spcBef>
+                        <a:spcAft>
+                          <a:spcPts val="0"/>
+                        </a:spcAft>
+                        <a:buClrTx/>
+                        <a:buSzTx/>
+                        <a:buFontTx/>
+                        <a:buNone/>
+                        <a:tabLst/>
+                        <a:defRPr/>
+                      </a:pPr>
+                      <a:r>
+                        <a:rPr lang="en-US" sz="1200" kern="1200" dirty="0">
+                          <a:solidFill>
+                            <a:schemeClr val="dk1"/>
+                          </a:solidFill>
+                          <a:latin typeface="Arial" panose="020B0604020202020204" pitchFamily="34" charset="0"/>
+                          <a:ea typeface="+mn-ea"/>
+                          <a:cs typeface="Arial" panose="020B0604020202020204" pitchFamily="34" charset="0"/>
+                        </a:rPr>
+                        <a:t>19582</a:t>
+                      </a:r>
+                    </a:p>
+                  </a:txBody>
+                  <a:tcPr anchor="ctr"/>
+                </a:tc>
+                <a:extLst>
+                  <a:ext uri="{0D108BD9-81ED-4DB2-BD59-A6C34878D82A}">
+                    <a16:rowId xmlns:a16="http://schemas.microsoft.com/office/drawing/2014/main" val="809462908"/>
                   </a:ext>
                 </a:extLst>
               </a:tr>
@@ -13760,6 +14261,42 @@
           </a:graphicData>
         </a:graphic>
       </p:graphicFrame>
+      <p:sp>
+        <p:nvSpPr>
+          <p:cNvPr id="4" name="TextBox 3">
+            <a:extLst>
+              <a:ext uri="{FF2B5EF4-FFF2-40B4-BE49-F238E27FC236}">
+                <a16:creationId xmlns:a16="http://schemas.microsoft.com/office/drawing/2014/main" id="{D083BE3D-E69E-3462-FE50-8BA202151B11}"/>
+              </a:ext>
+            </a:extLst>
+          </p:cNvPr>
+          <p:cNvSpPr txBox="1"/>
+          <p:nvPr/>
+        </p:nvSpPr>
+        <p:spPr>
+          <a:xfrm>
+            <a:off x="5912217" y="5916915"/>
+            <a:ext cx="3529138" cy="246221"/>
+          </a:xfrm>
+          <a:prstGeom prst="rect">
+            <a:avLst/>
+          </a:prstGeom>
+          <a:noFill/>
+        </p:spPr>
+        <p:txBody>
+          <a:bodyPr wrap="square" rtlCol="0">
+            <a:spAutoFit/>
+          </a:bodyPr>
+          <a:lstStyle/>
+          <a:p>
+            <a:pPr algn="ctr"/>
+            <a:r>
+              <a:rPr lang="en-US" sz="1000" dirty="0"/>
+              <a:t>Med 7 – NER output after processing clinical notes</a:t>
+            </a:r>
+          </a:p>
+        </p:txBody>
+      </p:sp>
     </p:spTree>
     <p:extLst>
       <p:ext uri="{BB962C8B-B14F-4D97-AF65-F5344CB8AC3E}">

</xml_diff>

<commit_message>
feat: updated result slides
</commit_message>
<xml_diff>
--- a/report/project_presentation.pptx
+++ b/report/project_presentation.pptx
@@ -10,9 +10,10 @@
     <p:sldId id="263" r:id="rId4"/>
     <p:sldId id="258" r:id="rId5"/>
     <p:sldId id="259" r:id="rId6"/>
-    <p:sldId id="260" r:id="rId7"/>
-    <p:sldId id="261" r:id="rId8"/>
-    <p:sldId id="262" r:id="rId9"/>
+    <p:sldId id="264" r:id="rId7"/>
+    <p:sldId id="260" r:id="rId8"/>
+    <p:sldId id="261" r:id="rId9"/>
+    <p:sldId id="262" r:id="rId10"/>
   </p:sldIdLst>
   <p:sldSz cx="12192000" cy="6858000"/>
   <p:notesSz cx="6858000" cy="9144000"/>
@@ -117,6 +118,14 @@
     </p:ext>
   </p:extLst>
 </p:presentation>
+</file>
+
+<file path=ppt/revisionInfo.xml><?xml version="1.0" encoding="utf-8"?>
+<p1510:revInfo xmlns:a="http://schemas.openxmlformats.org/drawingml/2006/main" xmlns:r="http://schemas.openxmlformats.org/officeDocument/2006/relationships" xmlns:p1510="http://schemas.microsoft.com/office/powerpoint/2015/10/main">
+  <p1510:revLst>
+    <p1510:client id="{98275A60-A96C-1848-9A84-F2C5BAEA54E2}" v="39" dt="2022-05-07T20:40:30.759"/>
+  </p1510:revLst>
+</p1510:revInfo>
 </file>
 
 <file path=ppt/slideLayouts/slideLayout1.xml><?xml version="1.0" encoding="utf-8"?>
@@ -13771,7 +13780,7 @@
           <p:nvPr>
             <p:extLst>
               <p:ext uri="{D42A27DB-BD31-4B8C-83A1-F6EECF244321}">
-                <p14:modId xmlns:p14="http://schemas.microsoft.com/office/powerpoint/2010/main" val="4037966188"/>
+                <p14:modId xmlns:p14="http://schemas.microsoft.com/office/powerpoint/2010/main" val="3413637971"/>
               </p:ext>
             </p:extLst>
           </p:nvPr>
@@ -14466,10 +14475,631 @@
           <a:bodyPr/>
           <a:lstStyle/>
           <a:p>
+            <a:r>
+              <a:rPr lang="en-US" dirty="0"/>
+              <a:t>Claim 1 - Performance improvement of 1%  - 1.5% AUPRC against multimodal baseline models</a:t>
+            </a:r>
+          </a:p>
+          <a:p>
+            <a:pPr marL="0" indent="0">
+              <a:buNone/>
+            </a:pPr>
+            <a:endParaRPr lang="en-US" dirty="0"/>
+          </a:p>
+          <a:p>
+            <a:endParaRPr lang="en-US" dirty="0"/>
+          </a:p>
+          <a:p>
+            <a:pPr marL="0" indent="0">
+              <a:buNone/>
+            </a:pPr>
             <a:endParaRPr lang="en-US" dirty="0"/>
           </a:p>
         </p:txBody>
       </p:sp>
+      <p:graphicFrame>
+        <p:nvGraphicFramePr>
+          <p:cNvPr id="4" name="Table 3">
+            <a:extLst>
+              <a:ext uri="{FF2B5EF4-FFF2-40B4-BE49-F238E27FC236}">
+                <a16:creationId xmlns:a16="http://schemas.microsoft.com/office/drawing/2014/main" id="{42D9298F-660E-1ED2-B2B8-86482D32D727}"/>
+              </a:ext>
+            </a:extLst>
+          </p:cNvPr>
+          <p:cNvGraphicFramePr>
+            <a:graphicFrameLocks noGrp="1"/>
+          </p:cNvGraphicFramePr>
+          <p:nvPr>
+            <p:extLst>
+              <p:ext uri="{D42A27DB-BD31-4B8C-83A1-F6EECF244321}">
+                <p14:modId xmlns:p14="http://schemas.microsoft.com/office/powerpoint/2010/main" val="3370263218"/>
+              </p:ext>
+            </p:extLst>
+          </p:nvPr>
+        </p:nvGraphicFramePr>
+        <p:xfrm>
+          <a:off x="2976695" y="3429000"/>
+          <a:ext cx="6238610" cy="2217035"/>
+        </p:xfrm>
+        <a:graphic>
+          <a:graphicData uri="http://schemas.openxmlformats.org/drawingml/2006/table">
+            <a:tbl>
+              <a:tblPr firstRow="1">
+                <a:tableStyleId>{5C22544A-7EE6-4342-B048-85BDC9FD1C3A}</a:tableStyleId>
+              </a:tblPr>
+              <a:tblGrid>
+                <a:gridCol w="1806856">
+                  <a:extLst>
+                    <a:ext uri="{9D8B030D-6E8A-4147-A177-3AD203B41FA5}">
+                      <a16:colId xmlns:a16="http://schemas.microsoft.com/office/drawing/2014/main" val="2368788603"/>
+                    </a:ext>
+                  </a:extLst>
+                </a:gridCol>
+                <a:gridCol w="948636">
+                  <a:extLst>
+                    <a:ext uri="{9D8B030D-6E8A-4147-A177-3AD203B41FA5}">
+                      <a16:colId xmlns:a16="http://schemas.microsoft.com/office/drawing/2014/main" val="3146162556"/>
+                    </a:ext>
+                  </a:extLst>
+                </a:gridCol>
+                <a:gridCol w="1161039">
+                  <a:extLst>
+                    <a:ext uri="{9D8B030D-6E8A-4147-A177-3AD203B41FA5}">
+                      <a16:colId xmlns:a16="http://schemas.microsoft.com/office/drawing/2014/main" val="1634975802"/>
+                    </a:ext>
+                  </a:extLst>
+                </a:gridCol>
+                <a:gridCol w="992095">
+                  <a:extLst>
+                    <a:ext uri="{9D8B030D-6E8A-4147-A177-3AD203B41FA5}">
+                      <a16:colId xmlns:a16="http://schemas.microsoft.com/office/drawing/2014/main" val="3070726687"/>
+                    </a:ext>
+                  </a:extLst>
+                </a:gridCol>
+                <a:gridCol w="1329984">
+                  <a:extLst>
+                    <a:ext uri="{9D8B030D-6E8A-4147-A177-3AD203B41FA5}">
+                      <a16:colId xmlns:a16="http://schemas.microsoft.com/office/drawing/2014/main" val="2979461448"/>
+                    </a:ext>
+                  </a:extLst>
+                </a:gridCol>
+              </a:tblGrid>
+              <a:tr h="443407">
+                <a:tc>
+                  <a:txBody>
+                    <a:bodyPr/>
+                    <a:lstStyle/>
+                    <a:p>
+                      <a:pPr algn="ctr" fontAlgn="ctr"/>
+                      <a:r>
+                        <a:rPr lang="en-US" sz="1200" b="0" kern="1200" dirty="0">
+                          <a:solidFill>
+                            <a:schemeClr val="lt1"/>
+                          </a:solidFill>
+                          <a:latin typeface="Arial" panose="020B0604020202020204" pitchFamily="34" charset="0"/>
+                          <a:ea typeface="+mn-ea"/>
+                          <a:cs typeface="Arial" panose="020B0604020202020204" pitchFamily="34" charset="0"/>
+                        </a:rPr>
+                        <a:t>AUPRC</a:t>
+                      </a:r>
+                    </a:p>
+                  </a:txBody>
+                  <a:tcPr marL="9525" marR="9525" marT="9525" marB="0" anchor="ctr"/>
+                </a:tc>
+                <a:tc>
+                  <a:txBody>
+                    <a:bodyPr/>
+                    <a:lstStyle/>
+                    <a:p>
+                      <a:pPr algn="ctr" fontAlgn="ctr"/>
+                      <a:r>
+                        <a:rPr lang="en-US" sz="1200" b="0" kern="1200">
+                          <a:solidFill>
+                            <a:schemeClr val="lt1"/>
+                          </a:solidFill>
+                          <a:latin typeface="Arial" panose="020B0604020202020204" pitchFamily="34" charset="0"/>
+                          <a:ea typeface="+mn-ea"/>
+                          <a:cs typeface="Arial" panose="020B0604020202020204" pitchFamily="34" charset="0"/>
+                        </a:rPr>
+                        <a:t>In-Hospital</a:t>
+                      </a:r>
+                      <a:endParaRPr lang="en-US" sz="1200" b="0" kern="1200" dirty="0">
+                        <a:solidFill>
+                          <a:schemeClr val="lt1"/>
+                        </a:solidFill>
+                        <a:latin typeface="Arial" panose="020B0604020202020204" pitchFamily="34" charset="0"/>
+                        <a:ea typeface="+mn-ea"/>
+                        <a:cs typeface="Arial" panose="020B0604020202020204" pitchFamily="34" charset="0"/>
+                      </a:endParaRPr>
+                    </a:p>
+                  </a:txBody>
+                  <a:tcPr marL="9525" marR="9525" marT="9525" marB="0" anchor="ctr"/>
+                </a:tc>
+                <a:tc>
+                  <a:txBody>
+                    <a:bodyPr/>
+                    <a:lstStyle/>
+                    <a:p>
+                      <a:pPr algn="ctr" fontAlgn="ctr"/>
+                      <a:r>
+                        <a:rPr lang="en-US" sz="1200" b="0" kern="1200" dirty="0">
+                          <a:solidFill>
+                            <a:schemeClr val="lt1"/>
+                          </a:solidFill>
+                          <a:latin typeface="Arial" panose="020B0604020202020204" pitchFamily="34" charset="0"/>
+                          <a:ea typeface="+mn-ea"/>
+                          <a:cs typeface="Arial" panose="020B0604020202020204" pitchFamily="34" charset="0"/>
+                        </a:rPr>
+                        <a:t>ICU mort</a:t>
+                      </a:r>
+                    </a:p>
+                  </a:txBody>
+                  <a:tcPr marL="9525" marR="9525" marT="9525" marB="0" anchor="ctr"/>
+                </a:tc>
+                <a:tc>
+                  <a:txBody>
+                    <a:bodyPr/>
+                    <a:lstStyle/>
+                    <a:p>
+                      <a:pPr algn="ctr" fontAlgn="ctr"/>
+                      <a:r>
+                        <a:rPr lang="en-US" sz="1200" b="0" kern="1200" dirty="0">
+                          <a:solidFill>
+                            <a:schemeClr val="lt1"/>
+                          </a:solidFill>
+                          <a:latin typeface="Arial" panose="020B0604020202020204" pitchFamily="34" charset="0"/>
+                          <a:ea typeface="+mn-ea"/>
+                          <a:cs typeface="Arial" panose="020B0604020202020204" pitchFamily="34" charset="0"/>
+                        </a:rPr>
+                        <a:t>LOS &gt; 3</a:t>
+                      </a:r>
+                    </a:p>
+                  </a:txBody>
+                  <a:tcPr marL="9525" marR="9525" marT="9525" marB="0" anchor="ctr"/>
+                </a:tc>
+                <a:tc>
+                  <a:txBody>
+                    <a:bodyPr/>
+                    <a:lstStyle/>
+                    <a:p>
+                      <a:pPr algn="ctr" fontAlgn="ctr"/>
+                      <a:r>
+                        <a:rPr lang="en-US" sz="1200" b="0" kern="1200" dirty="0">
+                          <a:solidFill>
+                            <a:schemeClr val="lt1"/>
+                          </a:solidFill>
+                          <a:latin typeface="Arial" panose="020B0604020202020204" pitchFamily="34" charset="0"/>
+                          <a:ea typeface="+mn-ea"/>
+                          <a:cs typeface="Arial" panose="020B0604020202020204" pitchFamily="34" charset="0"/>
+                        </a:rPr>
+                        <a:t>LOS &gt; 7</a:t>
+                      </a:r>
+                    </a:p>
+                  </a:txBody>
+                  <a:tcPr marL="9525" marR="9525" marT="9525" marB="0" anchor="ctr"/>
+                </a:tc>
+                <a:extLst>
+                  <a:ext uri="{0D108BD9-81ED-4DB2-BD59-A6C34878D82A}">
+                    <a16:rowId xmlns:a16="http://schemas.microsoft.com/office/drawing/2014/main" val="2202340455"/>
+                  </a:ext>
+                </a:extLst>
+              </a:tr>
+              <a:tr h="443407">
+                <a:tc>
+                  <a:txBody>
+                    <a:bodyPr/>
+                    <a:lstStyle/>
+                    <a:p>
+                      <a:pPr algn="ctr" fontAlgn="b"/>
+                      <a:r>
+                        <a:rPr lang="en-US" sz="1200" kern="1200" dirty="0">
+                          <a:solidFill>
+                            <a:schemeClr val="dk1"/>
+                          </a:solidFill>
+                          <a:latin typeface="Arial" panose="020B0604020202020204" pitchFamily="34" charset="0"/>
+                          <a:ea typeface="+mn-ea"/>
+                          <a:cs typeface="Arial" panose="020B0604020202020204" pitchFamily="34" charset="0"/>
+                        </a:rPr>
+                        <a:t>Proposed </a:t>
+                      </a:r>
+                    </a:p>
+                  </a:txBody>
+                  <a:tcPr marL="9525" marR="9525" marT="9525" marB="0" anchor="ctr"/>
+                </a:tc>
+                <a:tc>
+                  <a:txBody>
+                    <a:bodyPr/>
+                    <a:lstStyle/>
+                    <a:p>
+                      <a:pPr algn="ctr" fontAlgn="b"/>
+                      <a:r>
+                        <a:rPr lang="en-US" sz="1200" kern="1200">
+                          <a:solidFill>
+                            <a:schemeClr val="dk1"/>
+                          </a:solidFill>
+                          <a:latin typeface="Arial" panose="020B0604020202020204" pitchFamily="34" charset="0"/>
+                          <a:ea typeface="+mn-ea"/>
+                          <a:cs typeface="Arial" panose="020B0604020202020204" pitchFamily="34" charset="0"/>
+                        </a:rPr>
+                        <a:t>0.580</a:t>
+                      </a:r>
+                      <a:endParaRPr lang="en-US" sz="1200" kern="1200" dirty="0">
+                        <a:solidFill>
+                          <a:schemeClr val="dk1"/>
+                        </a:solidFill>
+                        <a:latin typeface="Arial" panose="020B0604020202020204" pitchFamily="34" charset="0"/>
+                        <a:ea typeface="+mn-ea"/>
+                        <a:cs typeface="Arial" panose="020B0604020202020204" pitchFamily="34" charset="0"/>
+                      </a:endParaRPr>
+                    </a:p>
+                  </a:txBody>
+                  <a:tcPr marL="9525" marR="9525" marT="9525" marB="0" anchor="ctr"/>
+                </a:tc>
+                <a:tc>
+                  <a:txBody>
+                    <a:bodyPr/>
+                    <a:lstStyle/>
+                    <a:p>
+                      <a:pPr algn="ctr" fontAlgn="b"/>
+                      <a:r>
+                        <a:rPr lang="en-US" sz="1200" kern="1200" dirty="0">
+                          <a:solidFill>
+                            <a:schemeClr val="dk1"/>
+                          </a:solidFill>
+                          <a:latin typeface="Arial" panose="020B0604020202020204" pitchFamily="34" charset="0"/>
+                          <a:ea typeface="+mn-ea"/>
+                          <a:cs typeface="Arial" panose="020B0604020202020204" pitchFamily="34" charset="0"/>
+                        </a:rPr>
+                        <a:t>0.520</a:t>
+                      </a:r>
+                    </a:p>
+                  </a:txBody>
+                  <a:tcPr marL="9525" marR="9525" marT="9525" marB="0" anchor="ctr"/>
+                </a:tc>
+                <a:tc>
+                  <a:txBody>
+                    <a:bodyPr/>
+                    <a:lstStyle/>
+                    <a:p>
+                      <a:pPr algn="ctr" fontAlgn="b"/>
+                      <a:r>
+                        <a:rPr lang="en-US" sz="1200" kern="1200">
+                          <a:solidFill>
+                            <a:schemeClr val="dk1"/>
+                          </a:solidFill>
+                          <a:latin typeface="Arial" panose="020B0604020202020204" pitchFamily="34" charset="0"/>
+                          <a:ea typeface="+mn-ea"/>
+                          <a:cs typeface="Arial" panose="020B0604020202020204" pitchFamily="34" charset="0"/>
+                        </a:rPr>
+                        <a:t>0.647</a:t>
+                      </a:r>
+                    </a:p>
+                  </a:txBody>
+                  <a:tcPr marL="9525" marR="9525" marT="9525" marB="0" anchor="ctr"/>
+                </a:tc>
+                <a:tc>
+                  <a:txBody>
+                    <a:bodyPr/>
+                    <a:lstStyle/>
+                    <a:p>
+                      <a:pPr algn="ctr" fontAlgn="b"/>
+                      <a:r>
+                        <a:rPr lang="en-US" sz="1200" kern="1200">
+                          <a:solidFill>
+                            <a:schemeClr val="dk1"/>
+                          </a:solidFill>
+                          <a:latin typeface="Arial" panose="020B0604020202020204" pitchFamily="34" charset="0"/>
+                          <a:ea typeface="+mn-ea"/>
+                          <a:cs typeface="Arial" panose="020B0604020202020204" pitchFamily="34" charset="0"/>
+                        </a:rPr>
+                        <a:t>0.231</a:t>
+                      </a:r>
+                    </a:p>
+                  </a:txBody>
+                  <a:tcPr marL="9525" marR="9525" marT="9525" marB="0" anchor="ctr"/>
+                </a:tc>
+                <a:extLst>
+                  <a:ext uri="{0D108BD9-81ED-4DB2-BD59-A6C34878D82A}">
+                    <a16:rowId xmlns:a16="http://schemas.microsoft.com/office/drawing/2014/main" val="2540400553"/>
+                  </a:ext>
+                </a:extLst>
+              </a:tr>
+              <a:tr h="443407">
+                <a:tc>
+                  <a:txBody>
+                    <a:bodyPr/>
+                    <a:lstStyle/>
+                    <a:p>
+                      <a:pPr algn="ctr" fontAlgn="b"/>
+                      <a:r>
+                        <a:rPr lang="en-US" sz="1200" kern="1200" dirty="0">
+                          <a:solidFill>
+                            <a:schemeClr val="dk1"/>
+                          </a:solidFill>
+                          <a:latin typeface="Arial" panose="020B0604020202020204" pitchFamily="34" charset="0"/>
+                          <a:ea typeface="+mn-ea"/>
+                          <a:cs typeface="Arial" panose="020B0604020202020204" pitchFamily="34" charset="0"/>
+                        </a:rPr>
+                        <a:t>Multimodal</a:t>
+                      </a:r>
+                    </a:p>
+                  </a:txBody>
+                  <a:tcPr marL="9525" marR="9525" marT="9525" marB="0" anchor="ctr"/>
+                </a:tc>
+                <a:tc>
+                  <a:txBody>
+                    <a:bodyPr/>
+                    <a:lstStyle/>
+                    <a:p>
+                      <a:pPr algn="ctr" fontAlgn="b"/>
+                      <a:r>
+                        <a:rPr lang="en-US" sz="1200" kern="1200" dirty="0">
+                          <a:solidFill>
+                            <a:schemeClr val="dk1"/>
+                          </a:solidFill>
+                          <a:latin typeface="Arial" panose="020B0604020202020204" pitchFamily="34" charset="0"/>
+                          <a:ea typeface="+mn-ea"/>
+                          <a:cs typeface="Arial" panose="020B0604020202020204" pitchFamily="34" charset="0"/>
+                        </a:rPr>
+                        <a:t>0.580</a:t>
+                      </a:r>
+                    </a:p>
+                  </a:txBody>
+                  <a:tcPr marL="9525" marR="9525" marT="9525" marB="0" anchor="ctr"/>
+                </a:tc>
+                <a:tc>
+                  <a:txBody>
+                    <a:bodyPr/>
+                    <a:lstStyle/>
+                    <a:p>
+                      <a:pPr algn="ctr" fontAlgn="b"/>
+                      <a:r>
+                        <a:rPr lang="en-US" sz="1200" kern="1200" dirty="0">
+                          <a:solidFill>
+                            <a:schemeClr val="dk1"/>
+                          </a:solidFill>
+                          <a:latin typeface="Arial" panose="020B0604020202020204" pitchFamily="34" charset="0"/>
+                          <a:ea typeface="+mn-ea"/>
+                          <a:cs typeface="Arial" panose="020B0604020202020204" pitchFamily="34" charset="0"/>
+                        </a:rPr>
+                        <a:t>0.527</a:t>
+                      </a:r>
+                    </a:p>
+                  </a:txBody>
+                  <a:tcPr marL="9525" marR="9525" marT="9525" marB="0" anchor="ctr"/>
+                </a:tc>
+                <a:tc>
+                  <a:txBody>
+                    <a:bodyPr/>
+                    <a:lstStyle/>
+                    <a:p>
+                      <a:pPr algn="ctr" fontAlgn="b"/>
+                      <a:r>
+                        <a:rPr lang="en-US" sz="1200" kern="1200" dirty="0">
+                          <a:solidFill>
+                            <a:schemeClr val="dk1"/>
+                          </a:solidFill>
+                          <a:latin typeface="Arial" panose="020B0604020202020204" pitchFamily="34" charset="0"/>
+                          <a:ea typeface="+mn-ea"/>
+                          <a:cs typeface="Arial" panose="020B0604020202020204" pitchFamily="34" charset="0"/>
+                        </a:rPr>
+                        <a:t>0.644</a:t>
+                      </a:r>
+                    </a:p>
+                  </a:txBody>
+                  <a:tcPr marL="9525" marR="9525" marT="9525" marB="0" anchor="ctr"/>
+                </a:tc>
+                <a:tc>
+                  <a:txBody>
+                    <a:bodyPr/>
+                    <a:lstStyle/>
+                    <a:p>
+                      <a:pPr algn="ctr" fontAlgn="b"/>
+                      <a:r>
+                        <a:rPr lang="en-US" sz="1200" kern="1200" dirty="0">
+                          <a:solidFill>
+                            <a:schemeClr val="dk1"/>
+                          </a:solidFill>
+                          <a:latin typeface="Arial" panose="020B0604020202020204" pitchFamily="34" charset="0"/>
+                          <a:ea typeface="+mn-ea"/>
+                          <a:cs typeface="Arial" panose="020B0604020202020204" pitchFamily="34" charset="0"/>
+                        </a:rPr>
+                        <a:t>0.216</a:t>
+                      </a:r>
+                    </a:p>
+                  </a:txBody>
+                  <a:tcPr marL="9525" marR="9525" marT="9525" marB="0" anchor="ctr"/>
+                </a:tc>
+                <a:extLst>
+                  <a:ext uri="{0D108BD9-81ED-4DB2-BD59-A6C34878D82A}">
+                    <a16:rowId xmlns:a16="http://schemas.microsoft.com/office/drawing/2014/main" val="3998474700"/>
+                  </a:ext>
+                </a:extLst>
+              </a:tr>
+              <a:tr h="443407">
+                <a:tc gridSpan="5">
+                  <a:txBody>
+                    <a:bodyPr/>
+                    <a:lstStyle/>
+                    <a:p>
+                      <a:pPr algn="ctr" fontAlgn="ctr"/>
+                      <a:r>
+                        <a:rPr lang="en-US" sz="1200" kern="1200" dirty="0">
+                          <a:solidFill>
+                            <a:schemeClr val="dk1"/>
+                          </a:solidFill>
+                          <a:latin typeface="Arial" panose="020B0604020202020204" pitchFamily="34" charset="0"/>
+                          <a:ea typeface="+mn-ea"/>
+                          <a:cs typeface="Arial" panose="020B0604020202020204" pitchFamily="34" charset="0"/>
+                        </a:rPr>
+                        <a:t>Comparison – Average 1.62% better</a:t>
+                      </a:r>
+                    </a:p>
+                  </a:txBody>
+                  <a:tcPr marL="9525" marR="9525" marT="9525" marB="0" anchor="ctr"/>
+                </a:tc>
+                <a:tc hMerge="1">
+                  <a:txBody>
+                    <a:bodyPr/>
+                    <a:lstStyle/>
+                    <a:p>
+                      <a:endParaRPr lang="en-US"/>
+                    </a:p>
+                  </a:txBody>
+                  <a:tcPr/>
+                </a:tc>
+                <a:tc hMerge="1">
+                  <a:txBody>
+                    <a:bodyPr/>
+                    <a:lstStyle/>
+                    <a:p>
+                      <a:endParaRPr lang="en-US"/>
+                    </a:p>
+                  </a:txBody>
+                  <a:tcPr/>
+                </a:tc>
+                <a:tc hMerge="1">
+                  <a:txBody>
+                    <a:bodyPr/>
+                    <a:lstStyle/>
+                    <a:p>
+                      <a:endParaRPr lang="en-US"/>
+                    </a:p>
+                  </a:txBody>
+                  <a:tcPr/>
+                </a:tc>
+                <a:tc hMerge="1">
+                  <a:txBody>
+                    <a:bodyPr/>
+                    <a:lstStyle/>
+                    <a:p>
+                      <a:endParaRPr lang="en-US"/>
+                    </a:p>
+                  </a:txBody>
+                  <a:tcPr/>
+                </a:tc>
+                <a:extLst>
+                  <a:ext uri="{0D108BD9-81ED-4DB2-BD59-A6C34878D82A}">
+                    <a16:rowId xmlns:a16="http://schemas.microsoft.com/office/drawing/2014/main" val="2724568463"/>
+                  </a:ext>
+                </a:extLst>
+              </a:tr>
+              <a:tr h="443407">
+                <a:tc>
+                  <a:txBody>
+                    <a:bodyPr/>
+                    <a:lstStyle/>
+                    <a:p>
+                      <a:pPr algn="ctr" fontAlgn="b"/>
+                      <a:r>
+                        <a:rPr lang="en-US" sz="1200" kern="1200" dirty="0">
+                          <a:solidFill>
+                            <a:schemeClr val="dk1"/>
+                          </a:solidFill>
+                          <a:latin typeface="Arial" panose="020B0604020202020204" pitchFamily="34" charset="0"/>
+                          <a:ea typeface="+mn-ea"/>
+                          <a:cs typeface="Arial" panose="020B0604020202020204" pitchFamily="34" charset="0"/>
+                        </a:rPr>
+                        <a:t>Proposed vs Multimodal</a:t>
+                      </a:r>
+                    </a:p>
+                  </a:txBody>
+                  <a:tcPr marL="9525" marR="9525" marT="9525" marB="0" anchor="ctr"/>
+                </a:tc>
+                <a:tc>
+                  <a:txBody>
+                    <a:bodyPr/>
+                    <a:lstStyle/>
+                    <a:p>
+                      <a:pPr algn="ctr" fontAlgn="b"/>
+                      <a:r>
+                        <a:rPr lang="en-US" sz="1200" kern="1200" dirty="0">
+                          <a:solidFill>
+                            <a:schemeClr val="dk1"/>
+                          </a:solidFill>
+                          <a:latin typeface="Arial" panose="020B0604020202020204" pitchFamily="34" charset="0"/>
+                          <a:ea typeface="+mn-ea"/>
+                          <a:cs typeface="Arial" panose="020B0604020202020204" pitchFamily="34" charset="0"/>
+                        </a:rPr>
+                        <a:t>0.05%</a:t>
+                      </a:r>
+                    </a:p>
+                  </a:txBody>
+                  <a:tcPr marL="9525" marR="9525" marT="9525" marB="0" anchor="ctr"/>
+                </a:tc>
+                <a:tc>
+                  <a:txBody>
+                    <a:bodyPr/>
+                    <a:lstStyle/>
+                    <a:p>
+                      <a:pPr algn="ctr" fontAlgn="b"/>
+                      <a:r>
+                        <a:rPr lang="en-US" sz="1200" kern="1200">
+                          <a:solidFill>
+                            <a:schemeClr val="dk1"/>
+                          </a:solidFill>
+                          <a:latin typeface="Arial" panose="020B0604020202020204" pitchFamily="34" charset="0"/>
+                          <a:ea typeface="+mn-ea"/>
+                          <a:cs typeface="Arial" panose="020B0604020202020204" pitchFamily="34" charset="0"/>
+                        </a:rPr>
+                        <a:t>-1.27%</a:t>
+                      </a:r>
+                    </a:p>
+                  </a:txBody>
+                  <a:tcPr marL="9525" marR="9525" marT="9525" marB="0" anchor="ctr"/>
+                </a:tc>
+                <a:tc>
+                  <a:txBody>
+                    <a:bodyPr/>
+                    <a:lstStyle/>
+                    <a:p>
+                      <a:pPr algn="ctr" fontAlgn="b"/>
+                      <a:r>
+                        <a:rPr lang="en-US" sz="1200" kern="1200" dirty="0">
+                          <a:solidFill>
+                            <a:schemeClr val="dk1"/>
+                          </a:solidFill>
+                          <a:latin typeface="Arial" panose="020B0604020202020204" pitchFamily="34" charset="0"/>
+                          <a:ea typeface="+mn-ea"/>
+                          <a:cs typeface="Arial" panose="020B0604020202020204" pitchFamily="34" charset="0"/>
+                        </a:rPr>
+                        <a:t>0.47%</a:t>
+                      </a:r>
+                    </a:p>
+                  </a:txBody>
+                  <a:tcPr marL="9525" marR="9525" marT="9525" marB="0" anchor="ctr"/>
+                </a:tc>
+                <a:tc>
+                  <a:txBody>
+                    <a:bodyPr/>
+                    <a:lstStyle/>
+                    <a:p>
+                      <a:pPr algn="ctr" fontAlgn="b"/>
+                      <a:r>
+                        <a:rPr lang="en-US" sz="1200" kern="1200" dirty="0">
+                          <a:solidFill>
+                            <a:schemeClr val="dk1"/>
+                          </a:solidFill>
+                          <a:latin typeface="Arial" panose="020B0604020202020204" pitchFamily="34" charset="0"/>
+                          <a:ea typeface="+mn-ea"/>
+                          <a:cs typeface="Arial" panose="020B0604020202020204" pitchFamily="34" charset="0"/>
+                        </a:rPr>
+                        <a:t>7.23%</a:t>
+                      </a:r>
+                    </a:p>
+                  </a:txBody>
+                  <a:tcPr marL="9525" marR="9525" marT="9525" marB="0" anchor="ctr"/>
+                </a:tc>
+                <a:extLst>
+                  <a:ext uri="{0D108BD9-81ED-4DB2-BD59-A6C34878D82A}">
+                    <a16:rowId xmlns:a16="http://schemas.microsoft.com/office/drawing/2014/main" val="809462908"/>
+                  </a:ext>
+                </a:extLst>
+              </a:tr>
+            </a:tbl>
+          </a:graphicData>
+        </a:graphic>
+      </p:graphicFrame>
     </p:spTree>
     <p:extLst>
       <p:ext uri="{BB962C8B-B14F-4D97-AF65-F5344CB8AC3E}">
@@ -14523,7 +15153,7 @@
           <a:p>
             <a:r>
               <a:rPr lang="en-US" dirty="0"/>
-              <a:t>Ablations</a:t>
+              <a:t>Results</a:t>
             </a:r>
           </a:p>
         </p:txBody>
@@ -14551,15 +15181,625 @@
           <a:p>
             <a:r>
               <a:rPr lang="en-US" dirty="0"/>
-              <a:t>Glove</a:t>
+              <a:t>Claim 2 - Performance improvement of 2.5%  - 3% AUPRC against time series baseline model</a:t>
             </a:r>
+          </a:p>
+          <a:p>
+            <a:pPr marL="0" indent="0">
+              <a:buNone/>
+            </a:pPr>
+            <a:endParaRPr lang="en-US" dirty="0"/>
+          </a:p>
+          <a:p>
+            <a:endParaRPr lang="en-US" dirty="0"/>
+          </a:p>
+          <a:p>
+            <a:pPr marL="0" indent="0">
+              <a:buNone/>
+            </a:pPr>
+            <a:endParaRPr lang="en-US" dirty="0"/>
           </a:p>
         </p:txBody>
       </p:sp>
+      <p:graphicFrame>
+        <p:nvGraphicFramePr>
+          <p:cNvPr id="4" name="Table 3">
+            <a:extLst>
+              <a:ext uri="{FF2B5EF4-FFF2-40B4-BE49-F238E27FC236}">
+                <a16:creationId xmlns:a16="http://schemas.microsoft.com/office/drawing/2014/main" id="{42D9298F-660E-1ED2-B2B8-86482D32D727}"/>
+              </a:ext>
+            </a:extLst>
+          </p:cNvPr>
+          <p:cNvGraphicFramePr>
+            <a:graphicFrameLocks noGrp="1"/>
+          </p:cNvGraphicFramePr>
+          <p:nvPr>
+            <p:extLst>
+              <p:ext uri="{D42A27DB-BD31-4B8C-83A1-F6EECF244321}">
+                <p14:modId xmlns:p14="http://schemas.microsoft.com/office/powerpoint/2010/main" val="426263485"/>
+              </p:ext>
+            </p:extLst>
+          </p:nvPr>
+        </p:nvGraphicFramePr>
+        <p:xfrm>
+          <a:off x="2976695" y="3429000"/>
+          <a:ext cx="6238610" cy="2217035"/>
+        </p:xfrm>
+        <a:graphic>
+          <a:graphicData uri="http://schemas.openxmlformats.org/drawingml/2006/table">
+            <a:tbl>
+              <a:tblPr firstRow="1">
+                <a:tableStyleId>{5C22544A-7EE6-4342-B048-85BDC9FD1C3A}</a:tableStyleId>
+              </a:tblPr>
+              <a:tblGrid>
+                <a:gridCol w="1806856">
+                  <a:extLst>
+                    <a:ext uri="{9D8B030D-6E8A-4147-A177-3AD203B41FA5}">
+                      <a16:colId xmlns:a16="http://schemas.microsoft.com/office/drawing/2014/main" val="2368788603"/>
+                    </a:ext>
+                  </a:extLst>
+                </a:gridCol>
+                <a:gridCol w="948636">
+                  <a:extLst>
+                    <a:ext uri="{9D8B030D-6E8A-4147-A177-3AD203B41FA5}">
+                      <a16:colId xmlns:a16="http://schemas.microsoft.com/office/drawing/2014/main" val="3146162556"/>
+                    </a:ext>
+                  </a:extLst>
+                </a:gridCol>
+                <a:gridCol w="1161039">
+                  <a:extLst>
+                    <a:ext uri="{9D8B030D-6E8A-4147-A177-3AD203B41FA5}">
+                      <a16:colId xmlns:a16="http://schemas.microsoft.com/office/drawing/2014/main" val="1634975802"/>
+                    </a:ext>
+                  </a:extLst>
+                </a:gridCol>
+                <a:gridCol w="992095">
+                  <a:extLst>
+                    <a:ext uri="{9D8B030D-6E8A-4147-A177-3AD203B41FA5}">
+                      <a16:colId xmlns:a16="http://schemas.microsoft.com/office/drawing/2014/main" val="3070726687"/>
+                    </a:ext>
+                  </a:extLst>
+                </a:gridCol>
+                <a:gridCol w="1329984">
+                  <a:extLst>
+                    <a:ext uri="{9D8B030D-6E8A-4147-A177-3AD203B41FA5}">
+                      <a16:colId xmlns:a16="http://schemas.microsoft.com/office/drawing/2014/main" val="2979461448"/>
+                    </a:ext>
+                  </a:extLst>
+                </a:gridCol>
+              </a:tblGrid>
+              <a:tr h="443407">
+                <a:tc>
+                  <a:txBody>
+                    <a:bodyPr/>
+                    <a:lstStyle/>
+                    <a:p>
+                      <a:pPr algn="ctr" fontAlgn="ctr"/>
+                      <a:r>
+                        <a:rPr lang="en-US" sz="1200" b="0" kern="1200" dirty="0">
+                          <a:solidFill>
+                            <a:schemeClr val="lt1"/>
+                          </a:solidFill>
+                          <a:latin typeface="Arial" panose="020B0604020202020204" pitchFamily="34" charset="0"/>
+                          <a:ea typeface="+mn-ea"/>
+                          <a:cs typeface="Arial" panose="020B0604020202020204" pitchFamily="34" charset="0"/>
+                        </a:rPr>
+                        <a:t>AUPRC</a:t>
+                      </a:r>
+                    </a:p>
+                  </a:txBody>
+                  <a:tcPr marL="9525" marR="9525" marT="9525" marB="0" anchor="ctr"/>
+                </a:tc>
+                <a:tc>
+                  <a:txBody>
+                    <a:bodyPr/>
+                    <a:lstStyle/>
+                    <a:p>
+                      <a:pPr algn="ctr" fontAlgn="ctr"/>
+                      <a:r>
+                        <a:rPr lang="en-US" sz="1200" b="0" kern="1200" dirty="0">
+                          <a:solidFill>
+                            <a:schemeClr val="lt1"/>
+                          </a:solidFill>
+                          <a:latin typeface="Arial" panose="020B0604020202020204" pitchFamily="34" charset="0"/>
+                          <a:ea typeface="+mn-ea"/>
+                          <a:cs typeface="Arial" panose="020B0604020202020204" pitchFamily="34" charset="0"/>
+                        </a:rPr>
+                        <a:t>In-Hospital</a:t>
+                      </a:r>
+                    </a:p>
+                  </a:txBody>
+                  <a:tcPr marL="9525" marR="9525" marT="9525" marB="0" anchor="ctr"/>
+                </a:tc>
+                <a:tc>
+                  <a:txBody>
+                    <a:bodyPr/>
+                    <a:lstStyle/>
+                    <a:p>
+                      <a:pPr algn="ctr" fontAlgn="ctr"/>
+                      <a:r>
+                        <a:rPr lang="en-US" sz="1200" b="0" kern="1200" dirty="0">
+                          <a:solidFill>
+                            <a:schemeClr val="lt1"/>
+                          </a:solidFill>
+                          <a:latin typeface="Arial" panose="020B0604020202020204" pitchFamily="34" charset="0"/>
+                          <a:ea typeface="+mn-ea"/>
+                          <a:cs typeface="Arial" panose="020B0604020202020204" pitchFamily="34" charset="0"/>
+                        </a:rPr>
+                        <a:t>ICU mort</a:t>
+                      </a:r>
+                    </a:p>
+                  </a:txBody>
+                  <a:tcPr marL="9525" marR="9525" marT="9525" marB="0" anchor="ctr"/>
+                </a:tc>
+                <a:tc>
+                  <a:txBody>
+                    <a:bodyPr/>
+                    <a:lstStyle/>
+                    <a:p>
+                      <a:pPr algn="ctr" fontAlgn="ctr"/>
+                      <a:r>
+                        <a:rPr lang="en-US" sz="1200" b="0" kern="1200" dirty="0">
+                          <a:solidFill>
+                            <a:schemeClr val="lt1"/>
+                          </a:solidFill>
+                          <a:latin typeface="Arial" panose="020B0604020202020204" pitchFamily="34" charset="0"/>
+                          <a:ea typeface="+mn-ea"/>
+                          <a:cs typeface="Arial" panose="020B0604020202020204" pitchFamily="34" charset="0"/>
+                        </a:rPr>
+                        <a:t>LOS &gt; 3</a:t>
+                      </a:r>
+                    </a:p>
+                  </a:txBody>
+                  <a:tcPr marL="9525" marR="9525" marT="9525" marB="0" anchor="ctr"/>
+                </a:tc>
+                <a:tc>
+                  <a:txBody>
+                    <a:bodyPr/>
+                    <a:lstStyle/>
+                    <a:p>
+                      <a:pPr algn="ctr" fontAlgn="ctr"/>
+                      <a:r>
+                        <a:rPr lang="en-US" sz="1200" b="0" kern="1200" dirty="0">
+                          <a:solidFill>
+                            <a:schemeClr val="lt1"/>
+                          </a:solidFill>
+                          <a:latin typeface="Arial" panose="020B0604020202020204" pitchFamily="34" charset="0"/>
+                          <a:ea typeface="+mn-ea"/>
+                          <a:cs typeface="Arial" panose="020B0604020202020204" pitchFamily="34" charset="0"/>
+                        </a:rPr>
+                        <a:t>LOS &gt; 7</a:t>
+                      </a:r>
+                    </a:p>
+                  </a:txBody>
+                  <a:tcPr marL="9525" marR="9525" marT="9525" marB="0" anchor="ctr"/>
+                </a:tc>
+                <a:extLst>
+                  <a:ext uri="{0D108BD9-81ED-4DB2-BD59-A6C34878D82A}">
+                    <a16:rowId xmlns:a16="http://schemas.microsoft.com/office/drawing/2014/main" val="2202340455"/>
+                  </a:ext>
+                </a:extLst>
+              </a:tr>
+              <a:tr h="443407">
+                <a:tc>
+                  <a:txBody>
+                    <a:bodyPr/>
+                    <a:lstStyle/>
+                    <a:p>
+                      <a:pPr algn="ctr" fontAlgn="b"/>
+                      <a:r>
+                        <a:rPr lang="en-US" sz="1200" kern="1200" dirty="0">
+                          <a:solidFill>
+                            <a:schemeClr val="dk1"/>
+                          </a:solidFill>
+                          <a:latin typeface="Arial" panose="020B0604020202020204" pitchFamily="34" charset="0"/>
+                          <a:ea typeface="+mn-ea"/>
+                          <a:cs typeface="Arial" panose="020B0604020202020204" pitchFamily="34" charset="0"/>
+                        </a:rPr>
+                        <a:t>Proposed </a:t>
+                      </a:r>
+                    </a:p>
+                  </a:txBody>
+                  <a:tcPr marL="9525" marR="9525" marT="9525" marB="0" anchor="ctr"/>
+                </a:tc>
+                <a:tc>
+                  <a:txBody>
+                    <a:bodyPr/>
+                    <a:lstStyle/>
+                    <a:p>
+                      <a:pPr algn="ctr" fontAlgn="b"/>
+                      <a:r>
+                        <a:rPr lang="en-US" sz="1200" kern="1200" dirty="0">
+                          <a:solidFill>
+                            <a:schemeClr val="dk1"/>
+                          </a:solidFill>
+                          <a:latin typeface="Arial" panose="020B0604020202020204" pitchFamily="34" charset="0"/>
+                          <a:ea typeface="+mn-ea"/>
+                          <a:cs typeface="Arial" panose="020B0604020202020204" pitchFamily="34" charset="0"/>
+                        </a:rPr>
+                        <a:t>0.580</a:t>
+                      </a:r>
+                    </a:p>
+                  </a:txBody>
+                  <a:tcPr marL="9525" marR="9525" marT="9525" marB="0" anchor="ctr"/>
+                </a:tc>
+                <a:tc>
+                  <a:txBody>
+                    <a:bodyPr/>
+                    <a:lstStyle/>
+                    <a:p>
+                      <a:pPr algn="ctr" fontAlgn="b"/>
+                      <a:r>
+                        <a:rPr lang="en-US" sz="1200" kern="1200" dirty="0">
+                          <a:solidFill>
+                            <a:schemeClr val="dk1"/>
+                          </a:solidFill>
+                          <a:latin typeface="Arial" panose="020B0604020202020204" pitchFamily="34" charset="0"/>
+                          <a:ea typeface="+mn-ea"/>
+                          <a:cs typeface="Arial" panose="020B0604020202020204" pitchFamily="34" charset="0"/>
+                        </a:rPr>
+                        <a:t>0.520</a:t>
+                      </a:r>
+                    </a:p>
+                  </a:txBody>
+                  <a:tcPr marL="9525" marR="9525" marT="9525" marB="0" anchor="ctr"/>
+                </a:tc>
+                <a:tc>
+                  <a:txBody>
+                    <a:bodyPr/>
+                    <a:lstStyle/>
+                    <a:p>
+                      <a:pPr algn="ctr" fontAlgn="b"/>
+                      <a:r>
+                        <a:rPr lang="en-US" sz="1200" kern="1200" dirty="0">
+                          <a:solidFill>
+                            <a:schemeClr val="dk1"/>
+                          </a:solidFill>
+                          <a:latin typeface="Arial" panose="020B0604020202020204" pitchFamily="34" charset="0"/>
+                          <a:ea typeface="+mn-ea"/>
+                          <a:cs typeface="Arial" panose="020B0604020202020204" pitchFamily="34" charset="0"/>
+                        </a:rPr>
+                        <a:t>0.647</a:t>
+                      </a:r>
+                    </a:p>
+                  </a:txBody>
+                  <a:tcPr marL="9525" marR="9525" marT="9525" marB="0" anchor="ctr"/>
+                </a:tc>
+                <a:tc>
+                  <a:txBody>
+                    <a:bodyPr/>
+                    <a:lstStyle/>
+                    <a:p>
+                      <a:pPr algn="ctr" fontAlgn="b"/>
+                      <a:r>
+                        <a:rPr lang="en-US" sz="1200" kern="1200" dirty="0">
+                          <a:solidFill>
+                            <a:schemeClr val="dk1"/>
+                          </a:solidFill>
+                          <a:latin typeface="Arial" panose="020B0604020202020204" pitchFamily="34" charset="0"/>
+                          <a:ea typeface="+mn-ea"/>
+                          <a:cs typeface="Arial" panose="020B0604020202020204" pitchFamily="34" charset="0"/>
+                        </a:rPr>
+                        <a:t>0.231</a:t>
+                      </a:r>
+                    </a:p>
+                  </a:txBody>
+                  <a:tcPr marL="9525" marR="9525" marT="9525" marB="0" anchor="ctr"/>
+                </a:tc>
+                <a:extLst>
+                  <a:ext uri="{0D108BD9-81ED-4DB2-BD59-A6C34878D82A}">
+                    <a16:rowId xmlns:a16="http://schemas.microsoft.com/office/drawing/2014/main" val="2540400553"/>
+                  </a:ext>
+                </a:extLst>
+              </a:tr>
+              <a:tr h="443407">
+                <a:tc>
+                  <a:txBody>
+                    <a:bodyPr/>
+                    <a:lstStyle/>
+                    <a:p>
+                      <a:pPr algn="ctr" fontAlgn="b"/>
+                      <a:r>
+                        <a:rPr lang="en-US" sz="1200" kern="1200" dirty="0" err="1">
+                          <a:solidFill>
+                            <a:schemeClr val="dk1"/>
+                          </a:solidFill>
+                          <a:latin typeface="Arial" panose="020B0604020202020204" pitchFamily="34" charset="0"/>
+                          <a:ea typeface="+mn-ea"/>
+                          <a:cs typeface="Arial" panose="020B0604020202020204" pitchFamily="34" charset="0"/>
+                        </a:rPr>
+                        <a:t>TimeSeries</a:t>
+                      </a:r>
+                      <a:endParaRPr lang="en-US" sz="1200" kern="1200" dirty="0">
+                        <a:solidFill>
+                          <a:schemeClr val="dk1"/>
+                        </a:solidFill>
+                        <a:latin typeface="Arial" panose="020B0604020202020204" pitchFamily="34" charset="0"/>
+                        <a:ea typeface="+mn-ea"/>
+                        <a:cs typeface="Arial" panose="020B0604020202020204" pitchFamily="34" charset="0"/>
+                      </a:endParaRPr>
+                    </a:p>
+                  </a:txBody>
+                  <a:tcPr marL="9525" marR="9525" marT="9525" marB="0" anchor="ctr"/>
+                </a:tc>
+                <a:tc>
+                  <a:txBody>
+                    <a:bodyPr/>
+                    <a:lstStyle/>
+                    <a:p>
+                      <a:pPr algn="ctr" fontAlgn="b"/>
+                      <a:r>
+                        <a:rPr lang="en-US" sz="1200" kern="1200" dirty="0">
+                          <a:solidFill>
+                            <a:schemeClr val="dk1"/>
+                          </a:solidFill>
+                          <a:latin typeface="Arial" panose="020B0604020202020204" pitchFamily="34" charset="0"/>
+                          <a:ea typeface="+mn-ea"/>
+                          <a:cs typeface="Arial" panose="020B0604020202020204" pitchFamily="34" charset="0"/>
+                        </a:rPr>
+                        <a:t>0.558</a:t>
+                      </a:r>
+                    </a:p>
+                  </a:txBody>
+                  <a:tcPr marL="9525" marR="9525" marT="9525" marB="0" anchor="ctr"/>
+                </a:tc>
+                <a:tc>
+                  <a:txBody>
+                    <a:bodyPr/>
+                    <a:lstStyle/>
+                    <a:p>
+                      <a:pPr algn="ctr" fontAlgn="b"/>
+                      <a:r>
+                        <a:rPr lang="en-US" sz="1200" kern="1200" dirty="0">
+                          <a:solidFill>
+                            <a:schemeClr val="dk1"/>
+                          </a:solidFill>
+                          <a:latin typeface="Arial" panose="020B0604020202020204" pitchFamily="34" charset="0"/>
+                          <a:ea typeface="+mn-ea"/>
+                          <a:cs typeface="Arial" panose="020B0604020202020204" pitchFamily="34" charset="0"/>
+                        </a:rPr>
+                        <a:t>0.483</a:t>
+                      </a:r>
+                    </a:p>
+                  </a:txBody>
+                  <a:tcPr marL="9525" marR="9525" marT="9525" marB="0" anchor="ctr"/>
+                </a:tc>
+                <a:tc>
+                  <a:txBody>
+                    <a:bodyPr/>
+                    <a:lstStyle/>
+                    <a:p>
+                      <a:pPr algn="ctr" fontAlgn="b"/>
+                      <a:r>
+                        <a:rPr lang="en-US" sz="1200" kern="1200" dirty="0">
+                          <a:solidFill>
+                            <a:schemeClr val="dk1"/>
+                          </a:solidFill>
+                          <a:latin typeface="Arial" panose="020B0604020202020204" pitchFamily="34" charset="0"/>
+                          <a:ea typeface="+mn-ea"/>
+                          <a:cs typeface="Arial" panose="020B0604020202020204" pitchFamily="34" charset="0"/>
+                        </a:rPr>
+                        <a:t>0.627</a:t>
+                      </a:r>
+                    </a:p>
+                  </a:txBody>
+                  <a:tcPr marL="9525" marR="9525" marT="9525" marB="0" anchor="ctr"/>
+                </a:tc>
+                <a:tc>
+                  <a:txBody>
+                    <a:bodyPr/>
+                    <a:lstStyle/>
+                    <a:p>
+                      <a:pPr algn="ctr" fontAlgn="b"/>
+                      <a:r>
+                        <a:rPr lang="en-US" sz="1200" kern="1200" dirty="0">
+                          <a:solidFill>
+                            <a:schemeClr val="dk1"/>
+                          </a:solidFill>
+                          <a:latin typeface="Arial" panose="020B0604020202020204" pitchFamily="34" charset="0"/>
+                          <a:ea typeface="+mn-ea"/>
+                          <a:cs typeface="Arial" panose="020B0604020202020204" pitchFamily="34" charset="0"/>
+                        </a:rPr>
+                        <a:t>0.205</a:t>
+                      </a:r>
+                    </a:p>
+                  </a:txBody>
+                  <a:tcPr marL="9525" marR="9525" marT="9525" marB="0" anchor="ctr"/>
+                </a:tc>
+                <a:extLst>
+                  <a:ext uri="{0D108BD9-81ED-4DB2-BD59-A6C34878D82A}">
+                    <a16:rowId xmlns:a16="http://schemas.microsoft.com/office/drawing/2014/main" val="3998474700"/>
+                  </a:ext>
+                </a:extLst>
+              </a:tr>
+              <a:tr h="443407">
+                <a:tc gridSpan="5">
+                  <a:txBody>
+                    <a:bodyPr/>
+                    <a:lstStyle/>
+                    <a:p>
+                      <a:pPr algn="ctr" fontAlgn="ctr"/>
+                      <a:r>
+                        <a:rPr lang="en-US" sz="1200" kern="1200" dirty="0">
+                          <a:solidFill>
+                            <a:schemeClr val="dk1"/>
+                          </a:solidFill>
+                          <a:latin typeface="Arial" panose="020B0604020202020204" pitchFamily="34" charset="0"/>
+                          <a:ea typeface="+mn-ea"/>
+                          <a:cs typeface="Arial" panose="020B0604020202020204" pitchFamily="34" charset="0"/>
+                        </a:rPr>
+                        <a:t>Comparison – Average 6.8% better</a:t>
+                      </a:r>
+                    </a:p>
+                  </a:txBody>
+                  <a:tcPr marL="9525" marR="9525" marT="9525" marB="0" anchor="ctr"/>
+                </a:tc>
+                <a:tc hMerge="1">
+                  <a:txBody>
+                    <a:bodyPr/>
+                    <a:lstStyle/>
+                    <a:p>
+                      <a:endParaRPr lang="en-US"/>
+                    </a:p>
+                  </a:txBody>
+                  <a:tcPr/>
+                </a:tc>
+                <a:tc hMerge="1">
+                  <a:txBody>
+                    <a:bodyPr/>
+                    <a:lstStyle/>
+                    <a:p>
+                      <a:endParaRPr lang="en-US"/>
+                    </a:p>
+                  </a:txBody>
+                  <a:tcPr/>
+                </a:tc>
+                <a:tc hMerge="1">
+                  <a:txBody>
+                    <a:bodyPr/>
+                    <a:lstStyle/>
+                    <a:p>
+                      <a:endParaRPr lang="en-US"/>
+                    </a:p>
+                  </a:txBody>
+                  <a:tcPr/>
+                </a:tc>
+                <a:tc hMerge="1">
+                  <a:txBody>
+                    <a:bodyPr/>
+                    <a:lstStyle/>
+                    <a:p>
+                      <a:endParaRPr lang="en-US"/>
+                    </a:p>
+                  </a:txBody>
+                  <a:tcPr/>
+                </a:tc>
+                <a:extLst>
+                  <a:ext uri="{0D108BD9-81ED-4DB2-BD59-A6C34878D82A}">
+                    <a16:rowId xmlns:a16="http://schemas.microsoft.com/office/drawing/2014/main" val="2724568463"/>
+                  </a:ext>
+                </a:extLst>
+              </a:tr>
+              <a:tr h="443407">
+                <a:tc>
+                  <a:txBody>
+                    <a:bodyPr/>
+                    <a:lstStyle/>
+                    <a:p>
+                      <a:pPr algn="ctr" fontAlgn="b"/>
+                      <a:r>
+                        <a:rPr lang="en-US" sz="1200" kern="1200" dirty="0">
+                          <a:solidFill>
+                            <a:schemeClr val="dk1"/>
+                          </a:solidFill>
+                          <a:latin typeface="Arial" panose="020B0604020202020204" pitchFamily="34" charset="0"/>
+                          <a:ea typeface="+mn-ea"/>
+                          <a:cs typeface="Arial" panose="020B0604020202020204" pitchFamily="34" charset="0"/>
+                        </a:rPr>
+                        <a:t>Proposed vs Timeseries</a:t>
+                      </a:r>
+                    </a:p>
+                  </a:txBody>
+                  <a:tcPr marL="9525" marR="9525" marT="9525" marB="0" anchor="ctr"/>
+                </a:tc>
+                <a:tc>
+                  <a:txBody>
+                    <a:bodyPr/>
+                    <a:lstStyle/>
+                    <a:p>
+                      <a:pPr algn="ctr" fontAlgn="b"/>
+                      <a:r>
+                        <a:rPr lang="en-US" sz="1200" kern="1200">
+                          <a:solidFill>
+                            <a:schemeClr val="dk1"/>
+                          </a:solidFill>
+                          <a:latin typeface="Arial" panose="020B0604020202020204" pitchFamily="34" charset="0"/>
+                          <a:ea typeface="+mn-ea"/>
+                          <a:cs typeface="Arial" panose="020B0604020202020204" pitchFamily="34" charset="0"/>
+                        </a:rPr>
+                        <a:t>4.03%</a:t>
+                      </a:r>
+                    </a:p>
+                  </a:txBody>
+                  <a:tcPr marL="9525" marR="9525" marT="9525" marB="0" anchor="ctr"/>
+                </a:tc>
+                <a:tc>
+                  <a:txBody>
+                    <a:bodyPr/>
+                    <a:lstStyle/>
+                    <a:p>
+                      <a:pPr algn="ctr" fontAlgn="b"/>
+                      <a:r>
+                        <a:rPr lang="en-US" sz="1200" kern="1200">
+                          <a:solidFill>
+                            <a:schemeClr val="dk1"/>
+                          </a:solidFill>
+                          <a:latin typeface="Arial" panose="020B0604020202020204" pitchFamily="34" charset="0"/>
+                          <a:ea typeface="+mn-ea"/>
+                          <a:cs typeface="Arial" panose="020B0604020202020204" pitchFamily="34" charset="0"/>
+                        </a:rPr>
+                        <a:t>7.56%</a:t>
+                      </a:r>
+                    </a:p>
+                  </a:txBody>
+                  <a:tcPr marL="9525" marR="9525" marT="9525" marB="0" anchor="ctr"/>
+                </a:tc>
+                <a:tc>
+                  <a:txBody>
+                    <a:bodyPr/>
+                    <a:lstStyle/>
+                    <a:p>
+                      <a:pPr algn="ctr" fontAlgn="b"/>
+                      <a:r>
+                        <a:rPr lang="en-US" sz="1200" kern="1200">
+                          <a:solidFill>
+                            <a:schemeClr val="dk1"/>
+                          </a:solidFill>
+                          <a:latin typeface="Arial" panose="020B0604020202020204" pitchFamily="34" charset="0"/>
+                          <a:ea typeface="+mn-ea"/>
+                          <a:cs typeface="Arial" panose="020B0604020202020204" pitchFamily="34" charset="0"/>
+                        </a:rPr>
+                        <a:t>3.08%</a:t>
+                      </a:r>
+                    </a:p>
+                  </a:txBody>
+                  <a:tcPr marL="9525" marR="9525" marT="9525" marB="0" anchor="ctr"/>
+                </a:tc>
+                <a:tc>
+                  <a:txBody>
+                    <a:bodyPr/>
+                    <a:lstStyle/>
+                    <a:p>
+                      <a:pPr algn="ctr" fontAlgn="b"/>
+                      <a:r>
+                        <a:rPr lang="en-US" sz="1200" kern="1200" dirty="0">
+                          <a:solidFill>
+                            <a:schemeClr val="dk1"/>
+                          </a:solidFill>
+                          <a:latin typeface="Arial" panose="020B0604020202020204" pitchFamily="34" charset="0"/>
+                          <a:ea typeface="+mn-ea"/>
+                          <a:cs typeface="Arial" panose="020B0604020202020204" pitchFamily="34" charset="0"/>
+                        </a:rPr>
+                        <a:t>12.51%</a:t>
+                      </a:r>
+                    </a:p>
+                  </a:txBody>
+                  <a:tcPr marL="9525" marR="9525" marT="9525" marB="0" anchor="ctr"/>
+                </a:tc>
+                <a:extLst>
+                  <a:ext uri="{0D108BD9-81ED-4DB2-BD59-A6C34878D82A}">
+                    <a16:rowId xmlns:a16="http://schemas.microsoft.com/office/drawing/2014/main" val="809462908"/>
+                  </a:ext>
+                </a:extLst>
+              </a:tr>
+            </a:tbl>
+          </a:graphicData>
+        </a:graphic>
+      </p:graphicFrame>
     </p:spTree>
     <p:extLst>
       <p:ext uri="{BB962C8B-B14F-4D97-AF65-F5344CB8AC3E}">
-        <p14:creationId xmlns:p14="http://schemas.microsoft.com/office/powerpoint/2010/main" val="959879211"/>
+        <p14:creationId xmlns:p14="http://schemas.microsoft.com/office/powerpoint/2010/main" val="1130877294"/>
       </p:ext>
     </p:extLst>
   </p:cSld>
@@ -14609,7 +15849,7 @@
           <a:p>
             <a:r>
               <a:rPr lang="en-US" dirty="0"/>
-              <a:t>Software Usage</a:t>
+              <a:t>Ablations</a:t>
             </a:r>
           </a:p>
         </p:txBody>
@@ -14635,6 +15875,726 @@
           <a:bodyPr/>
           <a:lstStyle/>
           <a:p>
+            <a:r>
+              <a:rPr lang="en-US" dirty="0"/>
+              <a:t>Pretrained </a:t>
+            </a:r>
+            <a:r>
+              <a:rPr lang="en-US" dirty="0" err="1"/>
+              <a:t>GloVe</a:t>
+            </a:r>
+            <a:r>
+              <a:rPr lang="en-US" dirty="0"/>
+              <a:t> model</a:t>
+            </a:r>
+          </a:p>
+          <a:p>
+            <a:endParaRPr lang="en-US" dirty="0"/>
+          </a:p>
+          <a:p>
+            <a:pPr marL="0" indent="0">
+              <a:buNone/>
+            </a:pPr>
+            <a:endParaRPr lang="en-US" dirty="0"/>
+          </a:p>
+        </p:txBody>
+      </p:sp>
+      <p:graphicFrame>
+        <p:nvGraphicFramePr>
+          <p:cNvPr id="4" name="Table 3">
+            <a:extLst>
+              <a:ext uri="{FF2B5EF4-FFF2-40B4-BE49-F238E27FC236}">
+                <a16:creationId xmlns:a16="http://schemas.microsoft.com/office/drawing/2014/main" id="{C08CE5ED-742D-34B7-8F1A-E366DDE81395}"/>
+              </a:ext>
+            </a:extLst>
+          </p:cNvPr>
+          <p:cNvGraphicFramePr>
+            <a:graphicFrameLocks noGrp="1"/>
+          </p:cNvGraphicFramePr>
+          <p:nvPr>
+            <p:extLst>
+              <p:ext uri="{D42A27DB-BD31-4B8C-83A1-F6EECF244321}">
+                <p14:modId xmlns:p14="http://schemas.microsoft.com/office/powerpoint/2010/main" val="553535215"/>
+              </p:ext>
+            </p:extLst>
+          </p:nvPr>
+        </p:nvGraphicFramePr>
+        <p:xfrm>
+          <a:off x="2973202" y="3429000"/>
+          <a:ext cx="6245596" cy="2216650"/>
+        </p:xfrm>
+        <a:graphic>
+          <a:graphicData uri="http://schemas.openxmlformats.org/drawingml/2006/table">
+            <a:tbl>
+              <a:tblPr firstRow="1">
+                <a:tableStyleId>{5C22544A-7EE6-4342-B048-85BDC9FD1C3A}</a:tableStyleId>
+              </a:tblPr>
+              <a:tblGrid>
+                <a:gridCol w="1808879">
+                  <a:extLst>
+                    <a:ext uri="{9D8B030D-6E8A-4147-A177-3AD203B41FA5}">
+                      <a16:colId xmlns:a16="http://schemas.microsoft.com/office/drawing/2014/main" val="2368788603"/>
+                    </a:ext>
+                  </a:extLst>
+                </a:gridCol>
+                <a:gridCol w="949699">
+                  <a:extLst>
+                    <a:ext uri="{9D8B030D-6E8A-4147-A177-3AD203B41FA5}">
+                      <a16:colId xmlns:a16="http://schemas.microsoft.com/office/drawing/2014/main" val="3146162556"/>
+                    </a:ext>
+                  </a:extLst>
+                </a:gridCol>
+                <a:gridCol w="1162338">
+                  <a:extLst>
+                    <a:ext uri="{9D8B030D-6E8A-4147-A177-3AD203B41FA5}">
+                      <a16:colId xmlns:a16="http://schemas.microsoft.com/office/drawing/2014/main" val="1634975802"/>
+                    </a:ext>
+                  </a:extLst>
+                </a:gridCol>
+                <a:gridCol w="993207">
+                  <a:extLst>
+                    <a:ext uri="{9D8B030D-6E8A-4147-A177-3AD203B41FA5}">
+                      <a16:colId xmlns:a16="http://schemas.microsoft.com/office/drawing/2014/main" val="3070726687"/>
+                    </a:ext>
+                  </a:extLst>
+                </a:gridCol>
+                <a:gridCol w="1331473">
+                  <a:extLst>
+                    <a:ext uri="{9D8B030D-6E8A-4147-A177-3AD203B41FA5}">
+                      <a16:colId xmlns:a16="http://schemas.microsoft.com/office/drawing/2014/main" val="2979461448"/>
+                    </a:ext>
+                  </a:extLst>
+                </a:gridCol>
+              </a:tblGrid>
+              <a:tr h="443330">
+                <a:tc>
+                  <a:txBody>
+                    <a:bodyPr/>
+                    <a:lstStyle/>
+                    <a:p>
+                      <a:pPr algn="ctr" fontAlgn="ctr"/>
+                      <a:r>
+                        <a:rPr lang="en-US" sz="1200" b="0" kern="1200" dirty="0">
+                          <a:solidFill>
+                            <a:schemeClr val="lt1"/>
+                          </a:solidFill>
+                          <a:latin typeface="Arial" panose="020B0604020202020204" pitchFamily="34" charset="0"/>
+                          <a:ea typeface="+mn-ea"/>
+                          <a:cs typeface="Arial" panose="020B0604020202020204" pitchFamily="34" charset="0"/>
+                        </a:rPr>
+                        <a:t>AUPRC</a:t>
+                      </a:r>
+                    </a:p>
+                  </a:txBody>
+                  <a:tcPr marL="9525" marR="9525" marT="9525" marB="0" anchor="ctr"/>
+                </a:tc>
+                <a:tc>
+                  <a:txBody>
+                    <a:bodyPr/>
+                    <a:lstStyle/>
+                    <a:p>
+                      <a:pPr algn="ctr" fontAlgn="ctr"/>
+                      <a:r>
+                        <a:rPr lang="en-US" sz="1200" b="0" kern="1200" dirty="0">
+                          <a:solidFill>
+                            <a:schemeClr val="lt1"/>
+                          </a:solidFill>
+                          <a:latin typeface="Arial" panose="020B0604020202020204" pitchFamily="34" charset="0"/>
+                          <a:ea typeface="+mn-ea"/>
+                          <a:cs typeface="Arial" panose="020B0604020202020204" pitchFamily="34" charset="0"/>
+                        </a:rPr>
+                        <a:t>In-Hospital</a:t>
+                      </a:r>
+                    </a:p>
+                  </a:txBody>
+                  <a:tcPr marL="9525" marR="9525" marT="9525" marB="0" anchor="ctr"/>
+                </a:tc>
+                <a:tc>
+                  <a:txBody>
+                    <a:bodyPr/>
+                    <a:lstStyle/>
+                    <a:p>
+                      <a:pPr algn="ctr" fontAlgn="ctr"/>
+                      <a:r>
+                        <a:rPr lang="en-US" sz="1200" b="0" kern="1200" dirty="0">
+                          <a:solidFill>
+                            <a:schemeClr val="lt1"/>
+                          </a:solidFill>
+                          <a:latin typeface="Arial" panose="020B0604020202020204" pitchFamily="34" charset="0"/>
+                          <a:ea typeface="+mn-ea"/>
+                          <a:cs typeface="Arial" panose="020B0604020202020204" pitchFamily="34" charset="0"/>
+                        </a:rPr>
+                        <a:t>ICU mort</a:t>
+                      </a:r>
+                    </a:p>
+                  </a:txBody>
+                  <a:tcPr marL="9525" marR="9525" marT="9525" marB="0" anchor="ctr"/>
+                </a:tc>
+                <a:tc>
+                  <a:txBody>
+                    <a:bodyPr/>
+                    <a:lstStyle/>
+                    <a:p>
+                      <a:pPr algn="ctr" fontAlgn="ctr"/>
+                      <a:r>
+                        <a:rPr lang="en-US" sz="1200" b="0" kern="1200" dirty="0">
+                          <a:solidFill>
+                            <a:schemeClr val="lt1"/>
+                          </a:solidFill>
+                          <a:latin typeface="Arial" panose="020B0604020202020204" pitchFamily="34" charset="0"/>
+                          <a:ea typeface="+mn-ea"/>
+                          <a:cs typeface="Arial" panose="020B0604020202020204" pitchFamily="34" charset="0"/>
+                        </a:rPr>
+                        <a:t>LOS &gt; 3</a:t>
+                      </a:r>
+                    </a:p>
+                  </a:txBody>
+                  <a:tcPr marL="9525" marR="9525" marT="9525" marB="0" anchor="ctr"/>
+                </a:tc>
+                <a:tc>
+                  <a:txBody>
+                    <a:bodyPr/>
+                    <a:lstStyle/>
+                    <a:p>
+                      <a:pPr algn="ctr" fontAlgn="ctr"/>
+                      <a:r>
+                        <a:rPr lang="en-US" sz="1200" b="0" kern="1200" dirty="0">
+                          <a:solidFill>
+                            <a:schemeClr val="lt1"/>
+                          </a:solidFill>
+                          <a:latin typeface="Arial" panose="020B0604020202020204" pitchFamily="34" charset="0"/>
+                          <a:ea typeface="+mn-ea"/>
+                          <a:cs typeface="Arial" panose="020B0604020202020204" pitchFamily="34" charset="0"/>
+                        </a:rPr>
+                        <a:t>LOS &gt; 7</a:t>
+                      </a:r>
+                    </a:p>
+                  </a:txBody>
+                  <a:tcPr marL="9525" marR="9525" marT="9525" marB="0" anchor="ctr"/>
+                </a:tc>
+                <a:extLst>
+                  <a:ext uri="{0D108BD9-81ED-4DB2-BD59-A6C34878D82A}">
+                    <a16:rowId xmlns:a16="http://schemas.microsoft.com/office/drawing/2014/main" val="2202340455"/>
+                  </a:ext>
+                </a:extLst>
+              </a:tr>
+              <a:tr h="443330">
+                <a:tc>
+                  <a:txBody>
+                    <a:bodyPr/>
+                    <a:lstStyle/>
+                    <a:p>
+                      <a:pPr marL="0" algn="ctr" defTabSz="457200" rtl="0" eaLnBrk="1" fontAlgn="b" latinLnBrk="0" hangingPunct="1"/>
+                      <a:r>
+                        <a:rPr lang="en-US" sz="1200" kern="1200" dirty="0">
+                          <a:solidFill>
+                            <a:schemeClr val="dk1"/>
+                          </a:solidFill>
+                          <a:latin typeface="Arial" panose="020B0604020202020204" pitchFamily="34" charset="0"/>
+                          <a:ea typeface="+mn-ea"/>
+                          <a:cs typeface="Arial" panose="020B0604020202020204" pitchFamily="34" charset="0"/>
+                        </a:rPr>
+                        <a:t>Ablation - </a:t>
+                      </a:r>
+                      <a:r>
+                        <a:rPr lang="en-US" sz="1200" kern="1200" dirty="0" err="1">
+                          <a:solidFill>
+                            <a:schemeClr val="dk1"/>
+                          </a:solidFill>
+                          <a:latin typeface="Arial" panose="020B0604020202020204" pitchFamily="34" charset="0"/>
+                          <a:ea typeface="+mn-ea"/>
+                          <a:cs typeface="Arial" panose="020B0604020202020204" pitchFamily="34" charset="0"/>
+                        </a:rPr>
+                        <a:t>GloVe</a:t>
+                      </a:r>
+                      <a:endParaRPr lang="en-US" sz="1200" kern="1200" dirty="0">
+                        <a:solidFill>
+                          <a:schemeClr val="dk1"/>
+                        </a:solidFill>
+                        <a:latin typeface="Arial" panose="020B0604020202020204" pitchFamily="34" charset="0"/>
+                        <a:ea typeface="+mn-ea"/>
+                        <a:cs typeface="Arial" panose="020B0604020202020204" pitchFamily="34" charset="0"/>
+                      </a:endParaRPr>
+                    </a:p>
+                  </a:txBody>
+                  <a:tcPr marL="9525" marR="9525" marT="9525" marB="0" anchor="ctr"/>
+                </a:tc>
+                <a:tc>
+                  <a:txBody>
+                    <a:bodyPr/>
+                    <a:lstStyle/>
+                    <a:p>
+                      <a:pPr marL="0" algn="ctr" defTabSz="457200" rtl="0" eaLnBrk="1" fontAlgn="b" latinLnBrk="0" hangingPunct="1"/>
+                      <a:r>
+                        <a:rPr lang="en-US" sz="1200" kern="1200" dirty="0">
+                          <a:solidFill>
+                            <a:schemeClr val="dk1"/>
+                          </a:solidFill>
+                          <a:latin typeface="Arial" panose="020B0604020202020204" pitchFamily="34" charset="0"/>
+                          <a:ea typeface="+mn-ea"/>
+                          <a:cs typeface="Arial" panose="020B0604020202020204" pitchFamily="34" charset="0"/>
+                        </a:rPr>
+                        <a:t>0.582</a:t>
+                      </a:r>
+                    </a:p>
+                  </a:txBody>
+                  <a:tcPr marL="9525" marR="9525" marT="9525" marB="0" anchor="ctr"/>
+                </a:tc>
+                <a:tc>
+                  <a:txBody>
+                    <a:bodyPr/>
+                    <a:lstStyle/>
+                    <a:p>
+                      <a:pPr marL="0" algn="ctr" defTabSz="457200" rtl="0" eaLnBrk="1" fontAlgn="b" latinLnBrk="0" hangingPunct="1"/>
+                      <a:r>
+                        <a:rPr lang="en-US" sz="1200" kern="1200">
+                          <a:solidFill>
+                            <a:schemeClr val="dk1"/>
+                          </a:solidFill>
+                          <a:latin typeface="Arial" panose="020B0604020202020204" pitchFamily="34" charset="0"/>
+                          <a:ea typeface="+mn-ea"/>
+                          <a:cs typeface="Arial" panose="020B0604020202020204" pitchFamily="34" charset="0"/>
+                        </a:rPr>
+                        <a:t>0.526</a:t>
+                      </a:r>
+                    </a:p>
+                  </a:txBody>
+                  <a:tcPr marL="9525" marR="9525" marT="9525" marB="0" anchor="ctr"/>
+                </a:tc>
+                <a:tc>
+                  <a:txBody>
+                    <a:bodyPr/>
+                    <a:lstStyle/>
+                    <a:p>
+                      <a:pPr marL="0" algn="ctr" defTabSz="457200" rtl="0" eaLnBrk="1" fontAlgn="b" latinLnBrk="0" hangingPunct="1"/>
+                      <a:r>
+                        <a:rPr lang="en-US" sz="1200" kern="1200">
+                          <a:solidFill>
+                            <a:schemeClr val="dk1"/>
+                          </a:solidFill>
+                          <a:latin typeface="Arial" panose="020B0604020202020204" pitchFamily="34" charset="0"/>
+                          <a:ea typeface="+mn-ea"/>
+                          <a:cs typeface="Arial" panose="020B0604020202020204" pitchFamily="34" charset="0"/>
+                        </a:rPr>
+                        <a:t>0.655</a:t>
+                      </a:r>
+                    </a:p>
+                  </a:txBody>
+                  <a:tcPr marL="9525" marR="9525" marT="9525" marB="0" anchor="ctr"/>
+                </a:tc>
+                <a:tc>
+                  <a:txBody>
+                    <a:bodyPr/>
+                    <a:lstStyle/>
+                    <a:p>
+                      <a:pPr marL="0" algn="ctr" defTabSz="457200" rtl="0" eaLnBrk="1" fontAlgn="b" latinLnBrk="0" hangingPunct="1"/>
+                      <a:r>
+                        <a:rPr lang="en-US" sz="1200" kern="1200">
+                          <a:solidFill>
+                            <a:schemeClr val="dk1"/>
+                          </a:solidFill>
+                          <a:latin typeface="Arial" panose="020B0604020202020204" pitchFamily="34" charset="0"/>
+                          <a:ea typeface="+mn-ea"/>
+                          <a:cs typeface="Arial" panose="020B0604020202020204" pitchFamily="34" charset="0"/>
+                        </a:rPr>
+                        <a:t>0.212</a:t>
+                      </a:r>
+                    </a:p>
+                  </a:txBody>
+                  <a:tcPr marL="9525" marR="9525" marT="9525" marB="0" anchor="ctr"/>
+                </a:tc>
+                <a:extLst>
+                  <a:ext uri="{0D108BD9-81ED-4DB2-BD59-A6C34878D82A}">
+                    <a16:rowId xmlns:a16="http://schemas.microsoft.com/office/drawing/2014/main" val="2540400553"/>
+                  </a:ext>
+                </a:extLst>
+              </a:tr>
+              <a:tr h="443330">
+                <a:tc>
+                  <a:txBody>
+                    <a:bodyPr/>
+                    <a:lstStyle/>
+                    <a:p>
+                      <a:pPr marL="0" algn="ctr" defTabSz="457200" rtl="0" eaLnBrk="1" fontAlgn="b" latinLnBrk="0" hangingPunct="1"/>
+                      <a:r>
+                        <a:rPr lang="en-US" sz="1200" kern="1200">
+                          <a:solidFill>
+                            <a:schemeClr val="dk1"/>
+                          </a:solidFill>
+                          <a:latin typeface="Arial" panose="020B0604020202020204" pitchFamily="34" charset="0"/>
+                          <a:ea typeface="+mn-ea"/>
+                          <a:cs typeface="Arial" panose="020B0604020202020204" pitchFamily="34" charset="0"/>
+                        </a:rPr>
+                        <a:t>Proposed </a:t>
+                      </a:r>
+                    </a:p>
+                  </a:txBody>
+                  <a:tcPr marL="9525" marR="9525" marT="9525" marB="0" anchor="ctr"/>
+                </a:tc>
+                <a:tc>
+                  <a:txBody>
+                    <a:bodyPr/>
+                    <a:lstStyle/>
+                    <a:p>
+                      <a:pPr marL="0" algn="ctr" defTabSz="457200" rtl="0" eaLnBrk="1" fontAlgn="b" latinLnBrk="0" hangingPunct="1"/>
+                      <a:r>
+                        <a:rPr lang="en-US" sz="1200" kern="1200" dirty="0">
+                          <a:solidFill>
+                            <a:schemeClr val="dk1"/>
+                          </a:solidFill>
+                          <a:latin typeface="Arial" panose="020B0604020202020204" pitchFamily="34" charset="0"/>
+                          <a:ea typeface="+mn-ea"/>
+                          <a:cs typeface="Arial" panose="020B0604020202020204" pitchFamily="34" charset="0"/>
+                        </a:rPr>
+                        <a:t>0.580</a:t>
+                      </a:r>
+                    </a:p>
+                  </a:txBody>
+                  <a:tcPr marL="9525" marR="9525" marT="9525" marB="0" anchor="ctr"/>
+                </a:tc>
+                <a:tc>
+                  <a:txBody>
+                    <a:bodyPr/>
+                    <a:lstStyle/>
+                    <a:p>
+                      <a:pPr marL="0" algn="ctr" defTabSz="457200" rtl="0" eaLnBrk="1" fontAlgn="b" latinLnBrk="0" hangingPunct="1"/>
+                      <a:r>
+                        <a:rPr lang="en-US" sz="1200" kern="1200" dirty="0">
+                          <a:solidFill>
+                            <a:schemeClr val="dk1"/>
+                          </a:solidFill>
+                          <a:latin typeface="Arial" panose="020B0604020202020204" pitchFamily="34" charset="0"/>
+                          <a:ea typeface="+mn-ea"/>
+                          <a:cs typeface="Arial" panose="020B0604020202020204" pitchFamily="34" charset="0"/>
+                        </a:rPr>
+                        <a:t>0.520</a:t>
+                      </a:r>
+                    </a:p>
+                  </a:txBody>
+                  <a:tcPr marL="9525" marR="9525" marT="9525" marB="0" anchor="ctr"/>
+                </a:tc>
+                <a:tc>
+                  <a:txBody>
+                    <a:bodyPr/>
+                    <a:lstStyle/>
+                    <a:p>
+                      <a:pPr marL="0" algn="ctr" defTabSz="457200" rtl="0" eaLnBrk="1" fontAlgn="b" latinLnBrk="0" hangingPunct="1"/>
+                      <a:r>
+                        <a:rPr lang="en-US" sz="1200" kern="1200">
+                          <a:solidFill>
+                            <a:schemeClr val="dk1"/>
+                          </a:solidFill>
+                          <a:latin typeface="Arial" panose="020B0604020202020204" pitchFamily="34" charset="0"/>
+                          <a:ea typeface="+mn-ea"/>
+                          <a:cs typeface="Arial" panose="020B0604020202020204" pitchFamily="34" charset="0"/>
+                        </a:rPr>
+                        <a:t>0.647</a:t>
+                      </a:r>
+                    </a:p>
+                  </a:txBody>
+                  <a:tcPr marL="9525" marR="9525" marT="9525" marB="0" anchor="ctr"/>
+                </a:tc>
+                <a:tc>
+                  <a:txBody>
+                    <a:bodyPr/>
+                    <a:lstStyle/>
+                    <a:p>
+                      <a:pPr marL="0" algn="ctr" defTabSz="457200" rtl="0" eaLnBrk="1" fontAlgn="b" latinLnBrk="0" hangingPunct="1"/>
+                      <a:r>
+                        <a:rPr lang="en-US" sz="1200" kern="1200">
+                          <a:solidFill>
+                            <a:schemeClr val="dk1"/>
+                          </a:solidFill>
+                          <a:latin typeface="Arial" panose="020B0604020202020204" pitchFamily="34" charset="0"/>
+                          <a:ea typeface="+mn-ea"/>
+                          <a:cs typeface="Arial" panose="020B0604020202020204" pitchFamily="34" charset="0"/>
+                        </a:rPr>
+                        <a:t>0.231</a:t>
+                      </a:r>
+                    </a:p>
+                  </a:txBody>
+                  <a:tcPr marL="9525" marR="9525" marT="9525" marB="0" anchor="ctr"/>
+                </a:tc>
+                <a:extLst>
+                  <a:ext uri="{0D108BD9-81ED-4DB2-BD59-A6C34878D82A}">
+                    <a16:rowId xmlns:a16="http://schemas.microsoft.com/office/drawing/2014/main" val="2137992118"/>
+                  </a:ext>
+                </a:extLst>
+              </a:tr>
+              <a:tr h="443330">
+                <a:tc gridSpan="5">
+                  <a:txBody>
+                    <a:bodyPr/>
+                    <a:lstStyle/>
+                    <a:p>
+                      <a:pPr marL="0" algn="ctr" defTabSz="457200" rtl="0" eaLnBrk="1" fontAlgn="b" latinLnBrk="0" hangingPunct="1"/>
+                      <a:r>
+                        <a:rPr lang="en-US" sz="1200" kern="1200" dirty="0">
+                          <a:solidFill>
+                            <a:schemeClr val="dk1"/>
+                          </a:solidFill>
+                          <a:latin typeface="Arial" panose="020B0604020202020204" pitchFamily="34" charset="0"/>
+                          <a:ea typeface="+mn-ea"/>
+                          <a:cs typeface="Arial" panose="020B0604020202020204" pitchFamily="34" charset="0"/>
+                        </a:rPr>
+                        <a:t>Comparison</a:t>
+                      </a:r>
+                    </a:p>
+                  </a:txBody>
+                  <a:tcPr marL="9525" marR="9525" marT="9525" marB="0" anchor="ctr"/>
+                </a:tc>
+                <a:tc hMerge="1">
+                  <a:txBody>
+                    <a:bodyPr/>
+                    <a:lstStyle/>
+                    <a:p>
+                      <a:endParaRPr lang="en-US"/>
+                    </a:p>
+                  </a:txBody>
+                  <a:tcPr/>
+                </a:tc>
+                <a:tc hMerge="1">
+                  <a:txBody>
+                    <a:bodyPr/>
+                    <a:lstStyle/>
+                    <a:p>
+                      <a:endParaRPr lang="en-US"/>
+                    </a:p>
+                  </a:txBody>
+                  <a:tcPr/>
+                </a:tc>
+                <a:tc hMerge="1">
+                  <a:txBody>
+                    <a:bodyPr/>
+                    <a:lstStyle/>
+                    <a:p>
+                      <a:endParaRPr lang="en-US"/>
+                    </a:p>
+                  </a:txBody>
+                  <a:tcPr/>
+                </a:tc>
+                <a:tc hMerge="1">
+                  <a:txBody>
+                    <a:bodyPr/>
+                    <a:lstStyle/>
+                    <a:p>
+                      <a:endParaRPr lang="en-US"/>
+                    </a:p>
+                  </a:txBody>
+                  <a:tcPr/>
+                </a:tc>
+                <a:extLst>
+                  <a:ext uri="{0D108BD9-81ED-4DB2-BD59-A6C34878D82A}">
+                    <a16:rowId xmlns:a16="http://schemas.microsoft.com/office/drawing/2014/main" val="3633874413"/>
+                  </a:ext>
+                </a:extLst>
+              </a:tr>
+              <a:tr h="443330">
+                <a:tc>
+                  <a:txBody>
+                    <a:bodyPr/>
+                    <a:lstStyle/>
+                    <a:p>
+                      <a:pPr algn="ctr" fontAlgn="b"/>
+                      <a:r>
+                        <a:rPr lang="en-US" sz="1200" kern="1200">
+                          <a:solidFill>
+                            <a:schemeClr val="dk1"/>
+                          </a:solidFill>
+                          <a:latin typeface="Arial" panose="020B0604020202020204" pitchFamily="34" charset="0"/>
+                          <a:ea typeface="+mn-ea"/>
+                          <a:cs typeface="Arial" panose="020B0604020202020204" pitchFamily="34" charset="0"/>
+                        </a:rPr>
+                        <a:t>GloVe</a:t>
+                      </a:r>
+                      <a:r>
+                        <a:rPr lang="en-US" sz="1200" kern="1200" dirty="0">
+                          <a:solidFill>
+                            <a:schemeClr val="dk1"/>
+                          </a:solidFill>
+                          <a:latin typeface="Arial" panose="020B0604020202020204" pitchFamily="34" charset="0"/>
+                          <a:ea typeface="+mn-ea"/>
+                          <a:cs typeface="Arial" panose="020B0604020202020204" pitchFamily="34" charset="0"/>
+                        </a:rPr>
+                        <a:t> vs Proposed</a:t>
+                      </a:r>
+                    </a:p>
+                  </a:txBody>
+                  <a:tcPr marL="9525" marR="9525" marT="9525" marB="0" anchor="ctr"/>
+                </a:tc>
+                <a:tc>
+                  <a:txBody>
+                    <a:bodyPr/>
+                    <a:lstStyle/>
+                    <a:p>
+                      <a:pPr algn="ctr" fontAlgn="b"/>
+                      <a:r>
+                        <a:rPr lang="en-US" sz="1200" kern="1200" dirty="0">
+                          <a:solidFill>
+                            <a:schemeClr val="dk1"/>
+                          </a:solidFill>
+                          <a:latin typeface="Arial" panose="020B0604020202020204" pitchFamily="34" charset="0"/>
+                          <a:ea typeface="+mn-ea"/>
+                          <a:cs typeface="Arial" panose="020B0604020202020204" pitchFamily="34" charset="0"/>
+                        </a:rPr>
+                        <a:t>0.28%</a:t>
+                      </a:r>
+                    </a:p>
+                  </a:txBody>
+                  <a:tcPr marL="9525" marR="9525" marT="9525" marB="0" anchor="ctr"/>
+                </a:tc>
+                <a:tc>
+                  <a:txBody>
+                    <a:bodyPr/>
+                    <a:lstStyle/>
+                    <a:p>
+                      <a:pPr algn="ctr" fontAlgn="b"/>
+                      <a:r>
+                        <a:rPr lang="en-US" sz="1200" kern="1200" dirty="0">
+                          <a:solidFill>
+                            <a:schemeClr val="dk1"/>
+                          </a:solidFill>
+                          <a:latin typeface="Arial" panose="020B0604020202020204" pitchFamily="34" charset="0"/>
+                          <a:ea typeface="+mn-ea"/>
+                          <a:cs typeface="Arial" panose="020B0604020202020204" pitchFamily="34" charset="0"/>
+                        </a:rPr>
+                        <a:t>1.16%</a:t>
+                      </a:r>
+                    </a:p>
+                  </a:txBody>
+                  <a:tcPr marL="9525" marR="9525" marT="9525" marB="0" anchor="ctr"/>
+                </a:tc>
+                <a:tc>
+                  <a:txBody>
+                    <a:bodyPr/>
+                    <a:lstStyle/>
+                    <a:p>
+                      <a:pPr algn="ctr" fontAlgn="b"/>
+                      <a:r>
+                        <a:rPr lang="en-US" sz="1200" kern="1200" dirty="0">
+                          <a:solidFill>
+                            <a:schemeClr val="dk1"/>
+                          </a:solidFill>
+                          <a:latin typeface="Arial" panose="020B0604020202020204" pitchFamily="34" charset="0"/>
+                          <a:ea typeface="+mn-ea"/>
+                          <a:cs typeface="Arial" panose="020B0604020202020204" pitchFamily="34" charset="0"/>
+                        </a:rPr>
+                        <a:t>1.36%</a:t>
+                      </a:r>
+                    </a:p>
+                  </a:txBody>
+                  <a:tcPr marL="9525" marR="9525" marT="9525" marB="0" anchor="ctr"/>
+                </a:tc>
+                <a:tc>
+                  <a:txBody>
+                    <a:bodyPr/>
+                    <a:lstStyle/>
+                    <a:p>
+                      <a:pPr algn="ctr" fontAlgn="b"/>
+                      <a:r>
+                        <a:rPr lang="en-US" sz="1200" kern="1200" dirty="0">
+                          <a:solidFill>
+                            <a:schemeClr val="dk1"/>
+                          </a:solidFill>
+                          <a:latin typeface="Arial" panose="020B0604020202020204" pitchFamily="34" charset="0"/>
+                          <a:ea typeface="+mn-ea"/>
+                          <a:cs typeface="Arial" panose="020B0604020202020204" pitchFamily="34" charset="0"/>
+                        </a:rPr>
+                        <a:t>-8.29%</a:t>
+                      </a:r>
+                    </a:p>
+                  </a:txBody>
+                  <a:tcPr marL="9525" marR="9525" marT="9525" marB="0" anchor="ctr"/>
+                </a:tc>
+                <a:extLst>
+                  <a:ext uri="{0D108BD9-81ED-4DB2-BD59-A6C34878D82A}">
+                    <a16:rowId xmlns:a16="http://schemas.microsoft.com/office/drawing/2014/main" val="934135621"/>
+                  </a:ext>
+                </a:extLst>
+              </a:tr>
+            </a:tbl>
+          </a:graphicData>
+        </a:graphic>
+      </p:graphicFrame>
+    </p:spTree>
+    <p:extLst>
+      <p:ext uri="{BB962C8B-B14F-4D97-AF65-F5344CB8AC3E}">
+        <p14:creationId xmlns:p14="http://schemas.microsoft.com/office/powerpoint/2010/main" val="959879211"/>
+      </p:ext>
+    </p:extLst>
+  </p:cSld>
+  <p:clrMapOvr>
+    <a:masterClrMapping/>
+  </p:clrMapOvr>
+</p:sld>
+</file>
+
+<file path=ppt/slides/slide8.xml><?xml version="1.0" encoding="utf-8"?>
+<p:sld xmlns:a="http://schemas.openxmlformats.org/drawingml/2006/main" xmlns:r="http://schemas.openxmlformats.org/officeDocument/2006/relationships" xmlns:p="http://schemas.openxmlformats.org/presentationml/2006/main">
+  <p:cSld>
+    <p:spTree>
+      <p:nvGrpSpPr>
+        <p:cNvPr id="1" name=""/>
+        <p:cNvGrpSpPr/>
+        <p:nvPr/>
+      </p:nvGrpSpPr>
+      <p:grpSpPr>
+        <a:xfrm>
+          <a:off x="0" y="0"/>
+          <a:ext cx="0" cy="0"/>
+          <a:chOff x="0" y="0"/>
+          <a:chExt cx="0" cy="0"/>
+        </a:xfrm>
+      </p:grpSpPr>
+      <p:sp>
+        <p:nvSpPr>
+          <p:cNvPr id="2" name="Title 1">
+            <a:extLst>
+              <a:ext uri="{FF2B5EF4-FFF2-40B4-BE49-F238E27FC236}">
+                <a16:creationId xmlns:a16="http://schemas.microsoft.com/office/drawing/2014/main" id="{2E52F162-5902-C94D-8B75-80EC5E119CF5}"/>
+              </a:ext>
+            </a:extLst>
+          </p:cNvPr>
+          <p:cNvSpPr>
+            <a:spLocks noGrp="1"/>
+          </p:cNvSpPr>
+          <p:nvPr>
+            <p:ph type="title"/>
+          </p:nvPr>
+        </p:nvSpPr>
+        <p:spPr/>
+        <p:txBody>
+          <a:bodyPr/>
+          <a:lstStyle/>
+          <a:p>
+            <a:r>
+              <a:rPr lang="en-US" dirty="0"/>
+              <a:t>Software Usage</a:t>
+            </a:r>
+          </a:p>
+        </p:txBody>
+      </p:sp>
+      <p:sp>
+        <p:nvSpPr>
+          <p:cNvPr id="3" name="Content Placeholder 2">
+            <a:extLst>
+              <a:ext uri="{FF2B5EF4-FFF2-40B4-BE49-F238E27FC236}">
+                <a16:creationId xmlns:a16="http://schemas.microsoft.com/office/drawing/2014/main" id="{434BEEB4-337B-4D44-8806-CF78037C83DA}"/>
+              </a:ext>
+            </a:extLst>
+          </p:cNvPr>
+          <p:cNvSpPr>
+            <a:spLocks noGrp="1"/>
+          </p:cNvSpPr>
+          <p:nvPr>
+            <p:ph idx="1"/>
+          </p:nvPr>
+        </p:nvSpPr>
+        <p:spPr/>
+        <p:txBody>
+          <a:bodyPr/>
+          <a:lstStyle/>
+          <a:p>
             <a:endParaRPr lang="en-US" dirty="0"/>
           </a:p>
         </p:txBody>
@@ -14652,7 +16612,7 @@
 </p:sld>
 </file>
 
-<file path=ppt/slides/slide8.xml><?xml version="1.0" encoding="utf-8"?>
+<file path=ppt/slides/slide9.xml><?xml version="1.0" encoding="utf-8"?>
 <p:sld xmlns:a="http://schemas.openxmlformats.org/drawingml/2006/main" xmlns:r="http://schemas.openxmlformats.org/officeDocument/2006/relationships" xmlns:p="http://schemas.openxmlformats.org/presentationml/2006/main">
   <p:cSld>
     <p:spTree>

</xml_diff>

<commit_message>
feat: updated presentation with results
</commit_message>
<xml_diff>
--- a/report/project_presentation.pptx
+++ b/report/project_presentation.pptx
@@ -4,6 +4,9 @@
   <p:sldMasterIdLst>
     <p:sldMasterId id="2147483692" r:id="rId1"/>
   </p:sldMasterIdLst>
+  <p:notesMasterIdLst>
+    <p:notesMasterId r:id="rId10"/>
+  </p:notesMasterIdLst>
   <p:sldIdLst>
     <p:sldId id="256" r:id="rId2"/>
     <p:sldId id="257" r:id="rId3"/>
@@ -13,7 +16,6 @@
     <p:sldId id="264" r:id="rId7"/>
     <p:sldId id="260" r:id="rId8"/>
     <p:sldId id="261" r:id="rId9"/>
-    <p:sldId id="262" r:id="rId10"/>
   </p:sldIdLst>
   <p:sldSz cx="12192000" cy="6858000"/>
   <p:notesSz cx="6858000" cy="9144000"/>
@@ -123,9 +125,445 @@
 <file path=ppt/revisionInfo.xml><?xml version="1.0" encoding="utf-8"?>
 <p1510:revInfo xmlns:a="http://schemas.openxmlformats.org/drawingml/2006/main" xmlns:r="http://schemas.openxmlformats.org/officeDocument/2006/relationships" xmlns:p1510="http://schemas.microsoft.com/office/powerpoint/2015/10/main">
   <p1510:revLst>
-    <p1510:client id="{98275A60-A96C-1848-9A84-F2C5BAEA54E2}" v="39" dt="2022-05-07T20:40:30.759"/>
+    <p1510:client id="{98275A60-A96C-1848-9A84-F2C5BAEA54E2}" v="41" dt="2022-05-07T23:24:26.803"/>
   </p1510:revLst>
 </p1510:revInfo>
+</file>
+
+<file path=ppt/notesMasters/notesMaster1.xml><?xml version="1.0" encoding="utf-8"?>
+<p:notesMaster xmlns:a="http://schemas.openxmlformats.org/drawingml/2006/main" xmlns:r="http://schemas.openxmlformats.org/officeDocument/2006/relationships" xmlns:p="http://schemas.openxmlformats.org/presentationml/2006/main">
+  <p:cSld>
+    <p:bg>
+      <p:bgRef idx="1001">
+        <a:schemeClr val="bg1"/>
+      </p:bgRef>
+    </p:bg>
+    <p:spTree>
+      <p:nvGrpSpPr>
+        <p:cNvPr id="1" name=""/>
+        <p:cNvGrpSpPr/>
+        <p:nvPr/>
+      </p:nvGrpSpPr>
+      <p:grpSpPr>
+        <a:xfrm>
+          <a:off x="0" y="0"/>
+          <a:ext cx="0" cy="0"/>
+          <a:chOff x="0" y="0"/>
+          <a:chExt cx="0" cy="0"/>
+        </a:xfrm>
+      </p:grpSpPr>
+      <p:sp>
+        <p:nvSpPr>
+          <p:cNvPr id="2" name="Header Placeholder 1"/>
+          <p:cNvSpPr>
+            <a:spLocks noGrp="1"/>
+          </p:cNvSpPr>
+          <p:nvPr>
+            <p:ph type="hdr" sz="quarter"/>
+          </p:nvPr>
+        </p:nvSpPr>
+        <p:spPr>
+          <a:xfrm>
+            <a:off x="0" y="0"/>
+            <a:ext cx="2971800" cy="458788"/>
+          </a:xfrm>
+          <a:prstGeom prst="rect">
+            <a:avLst/>
+          </a:prstGeom>
+        </p:spPr>
+        <p:txBody>
+          <a:bodyPr vert="horz" lIns="91440" tIns="45720" rIns="91440" bIns="45720" rtlCol="0"/>
+          <a:lstStyle>
+            <a:lvl1pPr algn="l">
+              <a:defRPr sz="1200"/>
+            </a:lvl1pPr>
+          </a:lstStyle>
+          <a:p>
+            <a:endParaRPr lang="en-US"/>
+          </a:p>
+        </p:txBody>
+      </p:sp>
+      <p:sp>
+        <p:nvSpPr>
+          <p:cNvPr id="3" name="Date Placeholder 2"/>
+          <p:cNvSpPr>
+            <a:spLocks noGrp="1"/>
+          </p:cNvSpPr>
+          <p:nvPr>
+            <p:ph type="dt" idx="1"/>
+          </p:nvPr>
+        </p:nvSpPr>
+        <p:spPr>
+          <a:xfrm>
+            <a:off x="3884613" y="0"/>
+            <a:ext cx="2971800" cy="458788"/>
+          </a:xfrm>
+          <a:prstGeom prst="rect">
+            <a:avLst/>
+          </a:prstGeom>
+        </p:spPr>
+        <p:txBody>
+          <a:bodyPr vert="horz" lIns="91440" tIns="45720" rIns="91440" bIns="45720" rtlCol="0"/>
+          <a:lstStyle>
+            <a:lvl1pPr algn="r">
+              <a:defRPr sz="1200"/>
+            </a:lvl1pPr>
+          </a:lstStyle>
+          <a:p>
+            <a:fld id="{9B01E5E4-0763-3544-AA1D-FC79C5A452E6}" type="datetimeFigureOut">
+              <a:rPr lang="en-US" smtClean="0"/>
+              <a:t>5/7/22</a:t>
+            </a:fld>
+            <a:endParaRPr lang="en-US"/>
+          </a:p>
+        </p:txBody>
+      </p:sp>
+      <p:sp>
+        <p:nvSpPr>
+          <p:cNvPr id="4" name="Slide Image Placeholder 3"/>
+          <p:cNvSpPr>
+            <a:spLocks noGrp="1" noRot="1" noChangeAspect="1"/>
+          </p:cNvSpPr>
+          <p:nvPr>
+            <p:ph type="sldImg" idx="2"/>
+          </p:nvPr>
+        </p:nvSpPr>
+        <p:spPr>
+          <a:xfrm>
+            <a:off x="685800" y="1143000"/>
+            <a:ext cx="5486400" cy="3086100"/>
+          </a:xfrm>
+          <a:prstGeom prst="rect">
+            <a:avLst/>
+          </a:prstGeom>
+          <a:noFill/>
+          <a:ln w="12700">
+            <a:solidFill>
+              <a:prstClr val="black"/>
+            </a:solidFill>
+          </a:ln>
+        </p:spPr>
+        <p:txBody>
+          <a:bodyPr vert="horz" lIns="91440" tIns="45720" rIns="91440" bIns="45720" rtlCol="0" anchor="ctr"/>
+          <a:lstStyle/>
+          <a:p>
+            <a:endParaRPr lang="en-US"/>
+          </a:p>
+        </p:txBody>
+      </p:sp>
+      <p:sp>
+        <p:nvSpPr>
+          <p:cNvPr id="5" name="Notes Placeholder 4"/>
+          <p:cNvSpPr>
+            <a:spLocks noGrp="1"/>
+          </p:cNvSpPr>
+          <p:nvPr>
+            <p:ph type="body" sz="quarter" idx="3"/>
+          </p:nvPr>
+        </p:nvSpPr>
+        <p:spPr>
+          <a:xfrm>
+            <a:off x="685800" y="4400550"/>
+            <a:ext cx="5486400" cy="3600450"/>
+          </a:xfrm>
+          <a:prstGeom prst="rect">
+            <a:avLst/>
+          </a:prstGeom>
+        </p:spPr>
+        <p:txBody>
+          <a:bodyPr vert="horz" lIns="91440" tIns="45720" rIns="91440" bIns="45720" rtlCol="0"/>
+          <a:lstStyle/>
+          <a:p>
+            <a:pPr lvl="0"/>
+            <a:r>
+              <a:rPr lang="en-US"/>
+              <a:t>Click to edit Master text styles</a:t>
+            </a:r>
+          </a:p>
+          <a:p>
+            <a:pPr lvl="1"/>
+            <a:r>
+              <a:rPr lang="en-US"/>
+              <a:t>Second level</a:t>
+            </a:r>
+          </a:p>
+          <a:p>
+            <a:pPr lvl="2"/>
+            <a:r>
+              <a:rPr lang="en-US"/>
+              <a:t>Third level</a:t>
+            </a:r>
+          </a:p>
+          <a:p>
+            <a:pPr lvl="3"/>
+            <a:r>
+              <a:rPr lang="en-US"/>
+              <a:t>Fourth level</a:t>
+            </a:r>
+          </a:p>
+          <a:p>
+            <a:pPr lvl="4"/>
+            <a:r>
+              <a:rPr lang="en-US"/>
+              <a:t>Fifth level</a:t>
+            </a:r>
+          </a:p>
+        </p:txBody>
+      </p:sp>
+      <p:sp>
+        <p:nvSpPr>
+          <p:cNvPr id="6" name="Footer Placeholder 5"/>
+          <p:cNvSpPr>
+            <a:spLocks noGrp="1"/>
+          </p:cNvSpPr>
+          <p:nvPr>
+            <p:ph type="ftr" sz="quarter" idx="4"/>
+          </p:nvPr>
+        </p:nvSpPr>
+        <p:spPr>
+          <a:xfrm>
+            <a:off x="0" y="8685213"/>
+            <a:ext cx="2971800" cy="458787"/>
+          </a:xfrm>
+          <a:prstGeom prst="rect">
+            <a:avLst/>
+          </a:prstGeom>
+        </p:spPr>
+        <p:txBody>
+          <a:bodyPr vert="horz" lIns="91440" tIns="45720" rIns="91440" bIns="45720" rtlCol="0" anchor="b"/>
+          <a:lstStyle>
+            <a:lvl1pPr algn="l">
+              <a:defRPr sz="1200"/>
+            </a:lvl1pPr>
+          </a:lstStyle>
+          <a:p>
+            <a:endParaRPr lang="en-US"/>
+          </a:p>
+        </p:txBody>
+      </p:sp>
+      <p:sp>
+        <p:nvSpPr>
+          <p:cNvPr id="7" name="Slide Number Placeholder 6"/>
+          <p:cNvSpPr>
+            <a:spLocks noGrp="1"/>
+          </p:cNvSpPr>
+          <p:nvPr>
+            <p:ph type="sldNum" sz="quarter" idx="5"/>
+          </p:nvPr>
+        </p:nvSpPr>
+        <p:spPr>
+          <a:xfrm>
+            <a:off x="3884613" y="8685213"/>
+            <a:ext cx="2971800" cy="458787"/>
+          </a:xfrm>
+          <a:prstGeom prst="rect">
+            <a:avLst/>
+          </a:prstGeom>
+        </p:spPr>
+        <p:txBody>
+          <a:bodyPr vert="horz" lIns="91440" tIns="45720" rIns="91440" bIns="45720" rtlCol="0" anchor="b"/>
+          <a:lstStyle>
+            <a:lvl1pPr algn="r">
+              <a:defRPr sz="1200"/>
+            </a:lvl1pPr>
+          </a:lstStyle>
+          <a:p>
+            <a:fld id="{E72C85A9-998F-1C4E-B9C8-88DEC431930C}" type="slidenum">
+              <a:rPr lang="en-US" smtClean="0"/>
+              <a:t>‹#›</a:t>
+            </a:fld>
+            <a:endParaRPr lang="en-US"/>
+          </a:p>
+        </p:txBody>
+      </p:sp>
+    </p:spTree>
+    <p:extLst>
+      <p:ext uri="{BB962C8B-B14F-4D97-AF65-F5344CB8AC3E}">
+        <p14:creationId xmlns:p14="http://schemas.microsoft.com/office/powerpoint/2010/main" val="2878263251"/>
+      </p:ext>
+    </p:extLst>
+  </p:cSld>
+  <p:clrMap bg1="lt1" tx1="dk1" bg2="lt2" tx2="dk2" accent1="accent1" accent2="accent2" accent3="accent3" accent4="accent4" accent5="accent5" accent6="accent6" hlink="hlink" folHlink="folHlink"/>
+  <p:notesStyle>
+    <a:lvl1pPr marL="0" algn="l" defTabSz="914400" rtl="0" eaLnBrk="1" latinLnBrk="0" hangingPunct="1">
+      <a:defRPr sz="1200" kern="1200">
+        <a:solidFill>
+          <a:schemeClr val="tx1"/>
+        </a:solidFill>
+        <a:latin typeface="+mn-lt"/>
+        <a:ea typeface="+mn-ea"/>
+        <a:cs typeface="+mn-cs"/>
+      </a:defRPr>
+    </a:lvl1pPr>
+    <a:lvl2pPr marL="457200" algn="l" defTabSz="914400" rtl="0" eaLnBrk="1" latinLnBrk="0" hangingPunct="1">
+      <a:defRPr sz="1200" kern="1200">
+        <a:solidFill>
+          <a:schemeClr val="tx1"/>
+        </a:solidFill>
+        <a:latin typeface="+mn-lt"/>
+        <a:ea typeface="+mn-ea"/>
+        <a:cs typeface="+mn-cs"/>
+      </a:defRPr>
+    </a:lvl2pPr>
+    <a:lvl3pPr marL="914400" algn="l" defTabSz="914400" rtl="0" eaLnBrk="1" latinLnBrk="0" hangingPunct="1">
+      <a:defRPr sz="1200" kern="1200">
+        <a:solidFill>
+          <a:schemeClr val="tx1"/>
+        </a:solidFill>
+        <a:latin typeface="+mn-lt"/>
+        <a:ea typeface="+mn-ea"/>
+        <a:cs typeface="+mn-cs"/>
+      </a:defRPr>
+    </a:lvl3pPr>
+    <a:lvl4pPr marL="1371600" algn="l" defTabSz="914400" rtl="0" eaLnBrk="1" latinLnBrk="0" hangingPunct="1">
+      <a:defRPr sz="1200" kern="1200">
+        <a:solidFill>
+          <a:schemeClr val="tx1"/>
+        </a:solidFill>
+        <a:latin typeface="+mn-lt"/>
+        <a:ea typeface="+mn-ea"/>
+        <a:cs typeface="+mn-cs"/>
+      </a:defRPr>
+    </a:lvl4pPr>
+    <a:lvl5pPr marL="1828800" algn="l" defTabSz="914400" rtl="0" eaLnBrk="1" latinLnBrk="0" hangingPunct="1">
+      <a:defRPr sz="1200" kern="1200">
+        <a:solidFill>
+          <a:schemeClr val="tx1"/>
+        </a:solidFill>
+        <a:latin typeface="+mn-lt"/>
+        <a:ea typeface="+mn-ea"/>
+        <a:cs typeface="+mn-cs"/>
+      </a:defRPr>
+    </a:lvl5pPr>
+    <a:lvl6pPr marL="2286000" algn="l" defTabSz="914400" rtl="0" eaLnBrk="1" latinLnBrk="0" hangingPunct="1">
+      <a:defRPr sz="1200" kern="1200">
+        <a:solidFill>
+          <a:schemeClr val="tx1"/>
+        </a:solidFill>
+        <a:latin typeface="+mn-lt"/>
+        <a:ea typeface="+mn-ea"/>
+        <a:cs typeface="+mn-cs"/>
+      </a:defRPr>
+    </a:lvl6pPr>
+    <a:lvl7pPr marL="2743200" algn="l" defTabSz="914400" rtl="0" eaLnBrk="1" latinLnBrk="0" hangingPunct="1">
+      <a:defRPr sz="1200" kern="1200">
+        <a:solidFill>
+          <a:schemeClr val="tx1"/>
+        </a:solidFill>
+        <a:latin typeface="+mn-lt"/>
+        <a:ea typeface="+mn-ea"/>
+        <a:cs typeface="+mn-cs"/>
+      </a:defRPr>
+    </a:lvl7pPr>
+    <a:lvl8pPr marL="3200400" algn="l" defTabSz="914400" rtl="0" eaLnBrk="1" latinLnBrk="0" hangingPunct="1">
+      <a:defRPr sz="1200" kern="1200">
+        <a:solidFill>
+          <a:schemeClr val="tx1"/>
+        </a:solidFill>
+        <a:latin typeface="+mn-lt"/>
+        <a:ea typeface="+mn-ea"/>
+        <a:cs typeface="+mn-cs"/>
+      </a:defRPr>
+    </a:lvl8pPr>
+    <a:lvl9pPr marL="3657600" algn="l" defTabSz="914400" rtl="0" eaLnBrk="1" latinLnBrk="0" hangingPunct="1">
+      <a:defRPr sz="1200" kern="1200">
+        <a:solidFill>
+          <a:schemeClr val="tx1"/>
+        </a:solidFill>
+        <a:latin typeface="+mn-lt"/>
+        <a:ea typeface="+mn-ea"/>
+        <a:cs typeface="+mn-cs"/>
+      </a:defRPr>
+    </a:lvl9pPr>
+  </p:notesStyle>
+</p:notesMaster>
+</file>
+
+<file path=ppt/notesSlides/notesSlide1.xml><?xml version="1.0" encoding="utf-8"?>
+<p:notes xmlns:a="http://schemas.openxmlformats.org/drawingml/2006/main" xmlns:r="http://schemas.openxmlformats.org/officeDocument/2006/relationships" xmlns:p="http://schemas.openxmlformats.org/presentationml/2006/main">
+  <p:cSld>
+    <p:spTree>
+      <p:nvGrpSpPr>
+        <p:cNvPr id="1" name=""/>
+        <p:cNvGrpSpPr/>
+        <p:nvPr/>
+      </p:nvGrpSpPr>
+      <p:grpSpPr>
+        <a:xfrm>
+          <a:off x="0" y="0"/>
+          <a:ext cx="0" cy="0"/>
+          <a:chOff x="0" y="0"/>
+          <a:chExt cx="0" cy="0"/>
+        </a:xfrm>
+      </p:grpSpPr>
+      <p:sp>
+        <p:nvSpPr>
+          <p:cNvPr id="2" name="Slide Image Placeholder 1"/>
+          <p:cNvSpPr>
+            <a:spLocks noGrp="1" noRot="1" noChangeAspect="1"/>
+          </p:cNvSpPr>
+          <p:nvPr>
+            <p:ph type="sldImg"/>
+          </p:nvPr>
+        </p:nvSpPr>
+        <p:spPr/>
+      </p:sp>
+      <p:sp>
+        <p:nvSpPr>
+          <p:cNvPr id="3" name="Notes Placeholder 2"/>
+          <p:cNvSpPr>
+            <a:spLocks noGrp="1"/>
+          </p:cNvSpPr>
+          <p:nvPr>
+            <p:ph type="body" idx="1"/>
+          </p:nvPr>
+        </p:nvSpPr>
+        <p:spPr/>
+        <p:txBody>
+          <a:bodyPr/>
+          <a:lstStyle/>
+          <a:p>
+            <a:r>
+              <a:rPr lang="en-US"/>
+              <a:t>Test notes</a:t>
+            </a:r>
+          </a:p>
+        </p:txBody>
+      </p:sp>
+      <p:sp>
+        <p:nvSpPr>
+          <p:cNvPr id="4" name="Slide Number Placeholder 3"/>
+          <p:cNvSpPr>
+            <a:spLocks noGrp="1"/>
+          </p:cNvSpPr>
+          <p:nvPr>
+            <p:ph type="sldNum" sz="quarter" idx="5"/>
+          </p:nvPr>
+        </p:nvSpPr>
+        <p:spPr/>
+        <p:txBody>
+          <a:bodyPr/>
+          <a:lstStyle/>
+          <a:p>
+            <a:fld id="{E72C85A9-998F-1C4E-B9C8-88DEC431930C}" type="slidenum">
+              <a:rPr lang="en-US" smtClean="0"/>
+              <a:t>8</a:t>
+            </a:fld>
+            <a:endParaRPr lang="en-US"/>
+          </a:p>
+        </p:txBody>
+      </p:sp>
+    </p:spTree>
+    <p:extLst>
+      <p:ext uri="{BB962C8B-B14F-4D97-AF65-F5344CB8AC3E}">
+        <p14:creationId xmlns:p14="http://schemas.microsoft.com/office/powerpoint/2010/main" val="2376586844"/>
+      </p:ext>
+    </p:extLst>
+  </p:cSld>
+  <p:clrMapOvr>
+    <a:masterClrMapping/>
+  </p:clrMapOvr>
+</p:notes>
 </file>
 
 <file path=ppt/slideLayouts/slideLayout1.xml><?xml version="1.0" encoding="utf-8"?>
@@ -14477,7 +14915,7 @@
           <a:p>
             <a:r>
               <a:rPr lang="en-US" dirty="0"/>
-              <a:t>Claim 1 - Performance improvement of 1%  - 1.5% AUPRC against multimodal baseline models</a:t>
+              <a:t>Paper Claim 1 - Performance improvement of 1%  - 1.5% AUPRC against multimodal baseline models</a:t>
             </a:r>
           </a:p>
           <a:p>
@@ -15100,6 +15538,42 @@
           </a:graphicData>
         </a:graphic>
       </p:graphicFrame>
+      <p:sp>
+        <p:nvSpPr>
+          <p:cNvPr id="5" name="TextBox 4">
+            <a:extLst>
+              <a:ext uri="{FF2B5EF4-FFF2-40B4-BE49-F238E27FC236}">
+                <a16:creationId xmlns:a16="http://schemas.microsoft.com/office/drawing/2014/main" id="{6614DB2D-3BE0-394E-8D2A-66117B31BA18}"/>
+              </a:ext>
+            </a:extLst>
+          </p:cNvPr>
+          <p:cNvSpPr txBox="1"/>
+          <p:nvPr/>
+        </p:nvSpPr>
+        <p:spPr>
+          <a:xfrm>
+            <a:off x="4331431" y="5709807"/>
+            <a:ext cx="3529138" cy="246221"/>
+          </a:xfrm>
+          <a:prstGeom prst="rect">
+            <a:avLst/>
+          </a:prstGeom>
+          <a:noFill/>
+        </p:spPr>
+        <p:txBody>
+          <a:bodyPr wrap="square" rtlCol="0">
+            <a:spAutoFit/>
+          </a:bodyPr>
+          <a:lstStyle/>
+          <a:p>
+            <a:pPr algn="ctr"/>
+            <a:r>
+              <a:rPr lang="en-US" sz="1000" dirty="0"/>
+              <a:t>Actual results from our reproduction attempt</a:t>
+            </a:r>
+          </a:p>
+        </p:txBody>
+      </p:sp>
     </p:spTree>
     <p:extLst>
       <p:ext uri="{BB962C8B-B14F-4D97-AF65-F5344CB8AC3E}">
@@ -15181,7 +15655,7 @@
           <a:p>
             <a:r>
               <a:rPr lang="en-US" dirty="0"/>
-              <a:t>Claim 2 - Performance improvement of 2.5%  - 3% AUPRC against time series baseline model</a:t>
+              <a:t>Paper Claim 2 - Performance improvement of 2.5%  - 3% AUPRC against time series baseline model</a:t>
             </a:r>
           </a:p>
           <a:p>
@@ -15796,6 +16270,42 @@
           </a:graphicData>
         </a:graphic>
       </p:graphicFrame>
+      <p:sp>
+        <p:nvSpPr>
+          <p:cNvPr id="6" name="TextBox 5">
+            <a:extLst>
+              <a:ext uri="{FF2B5EF4-FFF2-40B4-BE49-F238E27FC236}">
+                <a16:creationId xmlns:a16="http://schemas.microsoft.com/office/drawing/2014/main" id="{D20C60AD-5907-2015-9FB2-2899742A8C82}"/>
+              </a:ext>
+            </a:extLst>
+          </p:cNvPr>
+          <p:cNvSpPr txBox="1"/>
+          <p:nvPr/>
+        </p:nvSpPr>
+        <p:spPr>
+          <a:xfrm>
+            <a:off x="4331431" y="5709807"/>
+            <a:ext cx="3529138" cy="246221"/>
+          </a:xfrm>
+          <a:prstGeom prst="rect">
+            <a:avLst/>
+          </a:prstGeom>
+          <a:noFill/>
+        </p:spPr>
+        <p:txBody>
+          <a:bodyPr wrap="square" rtlCol="0">
+            <a:spAutoFit/>
+          </a:bodyPr>
+          <a:lstStyle/>
+          <a:p>
+            <a:pPr algn="ctr"/>
+            <a:r>
+              <a:rPr lang="en-US" sz="1000" dirty="0"/>
+              <a:t>Actual results from our reproduction attempt</a:t>
+            </a:r>
+          </a:p>
+        </p:txBody>
+      </p:sp>
     </p:spTree>
     <p:extLst>
       <p:ext uri="{BB962C8B-B14F-4D97-AF65-F5344CB8AC3E}">
@@ -16569,7 +17079,7 @@
           <a:p>
             <a:r>
               <a:rPr lang="en-US" dirty="0"/>
-              <a:t>Software Usage</a:t>
+              <a:t>Conclusions</a:t>
             </a:r>
           </a:p>
         </p:txBody>
@@ -16595,7 +17105,10 @@
           <a:bodyPr/>
           <a:lstStyle/>
           <a:p>
-            <a:endParaRPr lang="en-US" dirty="0"/>
+            <a:r>
+              <a:rPr lang="en-US" dirty="0"/>
+              <a:t>The results reproduced conform to the author’s claims on leveraging 1D-CNN based multimodal architecture which uses timeseries features and medical entities together producing better results when compared to timeseries and multimodal baseline models. </a:t>
+            </a:r>
           </a:p>
         </p:txBody>
       </p:sp>
@@ -16603,97 +17116,6 @@
     <p:extLst>
       <p:ext uri="{BB962C8B-B14F-4D97-AF65-F5344CB8AC3E}">
         <p14:creationId xmlns:p14="http://schemas.microsoft.com/office/powerpoint/2010/main" val="3921004015"/>
-      </p:ext>
-    </p:extLst>
-  </p:cSld>
-  <p:clrMapOvr>
-    <a:masterClrMapping/>
-  </p:clrMapOvr>
-</p:sld>
-</file>
-
-<file path=ppt/slides/slide9.xml><?xml version="1.0" encoding="utf-8"?>
-<p:sld xmlns:a="http://schemas.openxmlformats.org/drawingml/2006/main" xmlns:r="http://schemas.openxmlformats.org/officeDocument/2006/relationships" xmlns:p="http://schemas.openxmlformats.org/presentationml/2006/main">
-  <p:cSld>
-    <p:spTree>
-      <p:nvGrpSpPr>
-        <p:cNvPr id="1" name=""/>
-        <p:cNvGrpSpPr/>
-        <p:nvPr/>
-      </p:nvGrpSpPr>
-      <p:grpSpPr>
-        <a:xfrm>
-          <a:off x="0" y="0"/>
-          <a:ext cx="0" cy="0"/>
-          <a:chOff x="0" y="0"/>
-          <a:chExt cx="0" cy="0"/>
-        </a:xfrm>
-      </p:grpSpPr>
-      <p:sp>
-        <p:nvSpPr>
-          <p:cNvPr id="2" name="Title 1">
-            <a:extLst>
-              <a:ext uri="{FF2B5EF4-FFF2-40B4-BE49-F238E27FC236}">
-                <a16:creationId xmlns:a16="http://schemas.microsoft.com/office/drawing/2014/main" id="{2E52F162-5902-C94D-8B75-80EC5E119CF5}"/>
-              </a:ext>
-            </a:extLst>
-          </p:cNvPr>
-          <p:cNvSpPr>
-            <a:spLocks noGrp="1"/>
-          </p:cNvSpPr>
-          <p:nvPr>
-            <p:ph type="title"/>
-          </p:nvPr>
-        </p:nvSpPr>
-        <p:spPr/>
-        <p:txBody>
-          <a:bodyPr/>
-          <a:lstStyle/>
-          <a:p>
-            <a:r>
-              <a:rPr lang="en-US" dirty="0"/>
-              <a:t>Future Work</a:t>
-            </a:r>
-          </a:p>
-        </p:txBody>
-      </p:sp>
-      <p:sp>
-        <p:nvSpPr>
-          <p:cNvPr id="3" name="Content Placeholder 2">
-            <a:extLst>
-              <a:ext uri="{FF2B5EF4-FFF2-40B4-BE49-F238E27FC236}">
-                <a16:creationId xmlns:a16="http://schemas.microsoft.com/office/drawing/2014/main" id="{434BEEB4-337B-4D44-8806-CF78037C83DA}"/>
-              </a:ext>
-            </a:extLst>
-          </p:cNvPr>
-          <p:cNvSpPr>
-            <a:spLocks noGrp="1"/>
-          </p:cNvSpPr>
-          <p:nvPr>
-            <p:ph idx="1"/>
-          </p:nvPr>
-        </p:nvSpPr>
-        <p:spPr>
-          <a:xfrm>
-            <a:off x="472966" y="2603500"/>
-            <a:ext cx="9507647" cy="3416300"/>
-          </a:xfrm>
-        </p:spPr>
-        <p:txBody>
-          <a:bodyPr/>
-          <a:lstStyle/>
-          <a:p>
-            <a:r>
-              <a:rPr lang="en-US" dirty="0"/>
-              <a:t>Bert </a:t>
-            </a:r>
-          </a:p>
-        </p:txBody>
-      </p:sp>
-    </p:spTree>
-    <p:extLst>
-      <p:ext uri="{BB962C8B-B14F-4D97-AF65-F5344CB8AC3E}">
-        <p14:creationId xmlns:p14="http://schemas.microsoft.com/office/powerpoint/2010/main" val="2896220735"/>
       </p:ext>
     </p:extLst>
   </p:cSld>
@@ -16965,4 +17387,299 @@
     </a:ext>
   </a:extLst>
 </a:theme>
+</file>
+
+<file path=ppt/theme/theme2.xml><?xml version="1.0" encoding="utf-8"?>
+<a:theme xmlns:a="http://schemas.openxmlformats.org/drawingml/2006/main" name="Office Theme">
+  <a:themeElements>
+    <a:clrScheme name="Office">
+      <a:dk1>
+        <a:sysClr val="windowText" lastClr="000000"/>
+      </a:dk1>
+      <a:lt1>
+        <a:sysClr val="window" lastClr="FFFFFF"/>
+      </a:lt1>
+      <a:dk2>
+        <a:srgbClr val="44546A"/>
+      </a:dk2>
+      <a:lt2>
+        <a:srgbClr val="E7E6E6"/>
+      </a:lt2>
+      <a:accent1>
+        <a:srgbClr val="4472C4"/>
+      </a:accent1>
+      <a:accent2>
+        <a:srgbClr val="ED7D31"/>
+      </a:accent2>
+      <a:accent3>
+        <a:srgbClr val="A5A5A5"/>
+      </a:accent3>
+      <a:accent4>
+        <a:srgbClr val="FFC000"/>
+      </a:accent4>
+      <a:accent5>
+        <a:srgbClr val="5B9BD5"/>
+      </a:accent5>
+      <a:accent6>
+        <a:srgbClr val="70AD47"/>
+      </a:accent6>
+      <a:hlink>
+        <a:srgbClr val="0563C1"/>
+      </a:hlink>
+      <a:folHlink>
+        <a:srgbClr val="954F72"/>
+      </a:folHlink>
+    </a:clrScheme>
+    <a:fontScheme name="Office">
+      <a:majorFont>
+        <a:latin typeface="Calibri Light" panose="020F0302020204030204"/>
+        <a:ea typeface=""/>
+        <a:cs typeface=""/>
+        <a:font script="Jpan" typeface="游ゴシック Light"/>
+        <a:font script="Hang" typeface="맑은 고딕"/>
+        <a:font script="Hans" typeface="等线 Light"/>
+        <a:font script="Hant" typeface="新細明體"/>
+        <a:font script="Arab" typeface="Times New Roman"/>
+        <a:font script="Hebr" typeface="Times New Roman"/>
+        <a:font script="Thai" typeface="Angsana New"/>
+        <a:font script="Ethi" typeface="Nyala"/>
+        <a:font script="Beng" typeface="Vrinda"/>
+        <a:font script="Gujr" typeface="Shruti"/>
+        <a:font script="Khmr" typeface="MoolBoran"/>
+        <a:font script="Knda" typeface="Tunga"/>
+        <a:font script="Guru" typeface="Raavi"/>
+        <a:font script="Cans" typeface="Euphemia"/>
+        <a:font script="Cher" typeface="Plantagenet Cherokee"/>
+        <a:font script="Yiii" typeface="Microsoft Yi Baiti"/>
+        <a:font script="Tibt" typeface="Microsoft Himalaya"/>
+        <a:font script="Thaa" typeface="MV Boli"/>
+        <a:font script="Deva" typeface="Mangal"/>
+        <a:font script="Telu" typeface="Gautami"/>
+        <a:font script="Taml" typeface="Latha"/>
+        <a:font script="Syrc" typeface="Estrangelo Edessa"/>
+        <a:font script="Orya" typeface="Kalinga"/>
+        <a:font script="Mlym" typeface="Kartika"/>
+        <a:font script="Laoo" typeface="DokChampa"/>
+        <a:font script="Sinh" typeface="Iskoola Pota"/>
+        <a:font script="Mong" typeface="Mongolian Baiti"/>
+        <a:font script="Viet" typeface="Times New Roman"/>
+        <a:font script="Uigh" typeface="Microsoft Uighur"/>
+        <a:font script="Geor" typeface="Sylfaen"/>
+        <a:font script="Armn" typeface="Arial"/>
+        <a:font script="Bugi" typeface="Leelawadee UI"/>
+        <a:font script="Bopo" typeface="Microsoft JhengHei"/>
+        <a:font script="Java" typeface="Javanese Text"/>
+        <a:font script="Lisu" typeface="Segoe UI"/>
+        <a:font script="Mymr" typeface="Myanmar Text"/>
+        <a:font script="Nkoo" typeface="Ebrima"/>
+        <a:font script="Olck" typeface="Nirmala UI"/>
+        <a:font script="Osma" typeface="Ebrima"/>
+        <a:font script="Phag" typeface="Phagspa"/>
+        <a:font script="Syrn" typeface="Estrangelo Edessa"/>
+        <a:font script="Syrj" typeface="Estrangelo Edessa"/>
+        <a:font script="Syre" typeface="Estrangelo Edessa"/>
+        <a:font script="Sora" typeface="Nirmala UI"/>
+        <a:font script="Tale" typeface="Microsoft Tai Le"/>
+        <a:font script="Talu" typeface="Microsoft New Tai Lue"/>
+        <a:font script="Tfng" typeface="Ebrima"/>
+      </a:majorFont>
+      <a:minorFont>
+        <a:latin typeface="Calibri" panose="020F0502020204030204"/>
+        <a:ea typeface=""/>
+        <a:cs typeface=""/>
+        <a:font script="Jpan" typeface="游ゴシック"/>
+        <a:font script="Hang" typeface="맑은 고딕"/>
+        <a:font script="Hans" typeface="等线"/>
+        <a:font script="Hant" typeface="新細明體"/>
+        <a:font script="Arab" typeface="Arial"/>
+        <a:font script="Hebr" typeface="Arial"/>
+        <a:font script="Thai" typeface="Cordia New"/>
+        <a:font script="Ethi" typeface="Nyala"/>
+        <a:font script="Beng" typeface="Vrinda"/>
+        <a:font script="Gujr" typeface="Shruti"/>
+        <a:font script="Khmr" typeface="DaunPenh"/>
+        <a:font script="Knda" typeface="Tunga"/>
+        <a:font script="Guru" typeface="Raavi"/>
+        <a:font script="Cans" typeface="Euphemia"/>
+        <a:font script="Cher" typeface="Plantagenet Cherokee"/>
+        <a:font script="Yiii" typeface="Microsoft Yi Baiti"/>
+        <a:font script="Tibt" typeface="Microsoft Himalaya"/>
+        <a:font script="Thaa" typeface="MV Boli"/>
+        <a:font script="Deva" typeface="Mangal"/>
+        <a:font script="Telu" typeface="Gautami"/>
+        <a:font script="Taml" typeface="Latha"/>
+        <a:font script="Syrc" typeface="Estrangelo Edessa"/>
+        <a:font script="Orya" typeface="Kalinga"/>
+        <a:font script="Mlym" typeface="Kartika"/>
+        <a:font script="Laoo" typeface="DokChampa"/>
+        <a:font script="Sinh" typeface="Iskoola Pota"/>
+        <a:font script="Mong" typeface="Mongolian Baiti"/>
+        <a:font script="Viet" typeface="Arial"/>
+        <a:font script="Uigh" typeface="Microsoft Uighur"/>
+        <a:font script="Geor" typeface="Sylfaen"/>
+        <a:font script="Armn" typeface="Arial"/>
+        <a:font script="Bugi" typeface="Leelawadee UI"/>
+        <a:font script="Bopo" typeface="Microsoft JhengHei"/>
+        <a:font script="Java" typeface="Javanese Text"/>
+        <a:font script="Lisu" typeface="Segoe UI"/>
+        <a:font script="Mymr" typeface="Myanmar Text"/>
+        <a:font script="Nkoo" typeface="Ebrima"/>
+        <a:font script="Olck" typeface="Nirmala UI"/>
+        <a:font script="Osma" typeface="Ebrima"/>
+        <a:font script="Phag" typeface="Phagspa"/>
+        <a:font script="Syrn" typeface="Estrangelo Edessa"/>
+        <a:font script="Syrj" typeface="Estrangelo Edessa"/>
+        <a:font script="Syre" typeface="Estrangelo Edessa"/>
+        <a:font script="Sora" typeface="Nirmala UI"/>
+        <a:font script="Tale" typeface="Microsoft Tai Le"/>
+        <a:font script="Talu" typeface="Microsoft New Tai Lue"/>
+        <a:font script="Tfng" typeface="Ebrima"/>
+      </a:minorFont>
+    </a:fontScheme>
+    <a:fmtScheme name="Office">
+      <a:fillStyleLst>
+        <a:solidFill>
+          <a:schemeClr val="phClr"/>
+        </a:solidFill>
+        <a:gradFill rotWithShape="1">
+          <a:gsLst>
+            <a:gs pos="0">
+              <a:schemeClr val="phClr">
+                <a:lumMod val="110000"/>
+                <a:satMod val="105000"/>
+                <a:tint val="67000"/>
+              </a:schemeClr>
+            </a:gs>
+            <a:gs pos="50000">
+              <a:schemeClr val="phClr">
+                <a:lumMod val="105000"/>
+                <a:satMod val="103000"/>
+                <a:tint val="73000"/>
+              </a:schemeClr>
+            </a:gs>
+            <a:gs pos="100000">
+              <a:schemeClr val="phClr">
+                <a:lumMod val="105000"/>
+                <a:satMod val="109000"/>
+                <a:tint val="81000"/>
+              </a:schemeClr>
+            </a:gs>
+          </a:gsLst>
+          <a:lin ang="5400000" scaled="0"/>
+        </a:gradFill>
+        <a:gradFill rotWithShape="1">
+          <a:gsLst>
+            <a:gs pos="0">
+              <a:schemeClr val="phClr">
+                <a:satMod val="103000"/>
+                <a:lumMod val="102000"/>
+                <a:tint val="94000"/>
+              </a:schemeClr>
+            </a:gs>
+            <a:gs pos="50000">
+              <a:schemeClr val="phClr">
+                <a:satMod val="110000"/>
+                <a:lumMod val="100000"/>
+                <a:shade val="100000"/>
+              </a:schemeClr>
+            </a:gs>
+            <a:gs pos="100000">
+              <a:schemeClr val="phClr">
+                <a:lumMod val="99000"/>
+                <a:satMod val="120000"/>
+                <a:shade val="78000"/>
+              </a:schemeClr>
+            </a:gs>
+          </a:gsLst>
+          <a:lin ang="5400000" scaled="0"/>
+        </a:gradFill>
+      </a:fillStyleLst>
+      <a:lnStyleLst>
+        <a:ln w="6350" cap="flat" cmpd="sng" algn="ctr">
+          <a:solidFill>
+            <a:schemeClr val="phClr"/>
+          </a:solidFill>
+          <a:prstDash val="solid"/>
+          <a:miter lim="800000"/>
+        </a:ln>
+        <a:ln w="12700" cap="flat" cmpd="sng" algn="ctr">
+          <a:solidFill>
+            <a:schemeClr val="phClr"/>
+          </a:solidFill>
+          <a:prstDash val="solid"/>
+          <a:miter lim="800000"/>
+        </a:ln>
+        <a:ln w="19050" cap="flat" cmpd="sng" algn="ctr">
+          <a:solidFill>
+            <a:schemeClr val="phClr"/>
+          </a:solidFill>
+          <a:prstDash val="solid"/>
+          <a:miter lim="800000"/>
+        </a:ln>
+      </a:lnStyleLst>
+      <a:effectStyleLst>
+        <a:effectStyle>
+          <a:effectLst/>
+        </a:effectStyle>
+        <a:effectStyle>
+          <a:effectLst/>
+        </a:effectStyle>
+        <a:effectStyle>
+          <a:effectLst>
+            <a:outerShdw blurRad="57150" dist="19050" dir="5400000" algn="ctr" rotWithShape="0">
+              <a:srgbClr val="000000">
+                <a:alpha val="63000"/>
+              </a:srgbClr>
+            </a:outerShdw>
+          </a:effectLst>
+        </a:effectStyle>
+      </a:effectStyleLst>
+      <a:bgFillStyleLst>
+        <a:solidFill>
+          <a:schemeClr val="phClr"/>
+        </a:solidFill>
+        <a:solidFill>
+          <a:schemeClr val="phClr">
+            <a:tint val="95000"/>
+            <a:satMod val="170000"/>
+          </a:schemeClr>
+        </a:solidFill>
+        <a:gradFill rotWithShape="1">
+          <a:gsLst>
+            <a:gs pos="0">
+              <a:schemeClr val="phClr">
+                <a:tint val="93000"/>
+                <a:satMod val="150000"/>
+                <a:shade val="98000"/>
+                <a:lumMod val="102000"/>
+              </a:schemeClr>
+            </a:gs>
+            <a:gs pos="50000">
+              <a:schemeClr val="phClr">
+                <a:tint val="98000"/>
+                <a:satMod val="130000"/>
+                <a:shade val="90000"/>
+                <a:lumMod val="103000"/>
+              </a:schemeClr>
+            </a:gs>
+            <a:gs pos="100000">
+              <a:schemeClr val="phClr">
+                <a:shade val="63000"/>
+                <a:satMod val="120000"/>
+              </a:schemeClr>
+            </a:gs>
+          </a:gsLst>
+          <a:lin ang="5400000" scaled="0"/>
+        </a:gradFill>
+      </a:bgFillStyleLst>
+    </a:fmtScheme>
+  </a:themeElements>
+  <a:objectDefaults/>
+  <a:extraClrSchemeLst/>
+  <a:extLst>
+    <a:ext uri="{05A4C25C-085E-4340-85A3-A5531E510DB2}">
+      <thm15:themeFamily xmlns:thm15="http://schemas.microsoft.com/office/thememl/2012/main" name="Office Theme" id="{62F939B6-93AF-4DB8-9C6B-D6C7DFDC589F}" vid="{4A3C46E8-61CC-4603-A589-7422A47A8E4A}"/>
+    </a:ext>
+  </a:extLst>
+</a:theme>
 </file>
</xml_diff>

<commit_message>
latest upates regarding citation
</commit_message>
<xml_diff>
--- a/report/project_presentation.pptx
+++ b/report/project_presentation.pptx
@@ -899,9 +899,9 @@
             </a:lvl1pPr>
           </a:lstStyle>
           <a:p>
-            <a:fld id="{24DE01ED-3AF6-BD41-B3B0-4728D2D6B26C}" type="datetime1">
+            <a:fld id="{FD841E60-D1FE-7347-B11E-B4B1BB3CF53E}" type="datetime1">
               <a:rPr lang="en-US" smtClean="0"/>
-              <a:t>5/7/22</a:t>
+              <a:t>5/8/22</a:t>
             </a:fld>
             <a:endParaRPr lang="en-US" dirty="0"/>
           </a:p>
@@ -1992,9 +1992,9 @@
           <a:bodyPr/>
           <a:lstStyle/>
           <a:p>
-            <a:fld id="{EA2F28C4-2BBC-2845-90F2-6683E526A170}" type="datetime1">
+            <a:fld id="{AC34C278-0255-3141-81F1-47DEC159D84F}" type="datetime1">
               <a:rPr lang="en-US" smtClean="0"/>
-              <a:t>5/7/22</a:t>
+              <a:t>5/8/22</a:t>
             </a:fld>
             <a:endParaRPr lang="en-US" dirty="0"/>
           </a:p>
@@ -2977,9 +2977,9 @@
           <a:bodyPr/>
           <a:lstStyle/>
           <a:p>
-            <a:fld id="{6A14F738-EFD1-AC49-B8B8-A6B559C69806}" type="datetime1">
+            <a:fld id="{41415765-D164-6D4C-BF96-95A02E02384C}" type="datetime1">
               <a:rPr lang="en-US" smtClean="0"/>
-              <a:t>5/7/22</a:t>
+              <a:t>5/8/22</a:t>
             </a:fld>
             <a:endParaRPr lang="en-US" dirty="0"/>
           </a:p>
@@ -4116,9 +4116,9 @@
           <a:bodyPr/>
           <a:lstStyle/>
           <a:p>
-            <a:fld id="{49D63D00-34FF-4644-86FD-8486CF40EC2C}" type="datetime1">
+            <a:fld id="{7CEABC47-A6E0-2B49-BC0F-0F1B75537E14}" type="datetime1">
               <a:rPr lang="en-US" smtClean="0"/>
-              <a:t>5/7/22</a:t>
+              <a:t>5/8/22</a:t>
             </a:fld>
             <a:endParaRPr lang="en-US" dirty="0"/>
           </a:p>
@@ -5154,9 +5154,9 @@
           <a:bodyPr/>
           <a:lstStyle/>
           <a:p>
-            <a:fld id="{ADFDA4CF-AA94-854C-88C5-D9F33A6AA710}" type="datetime1">
+            <a:fld id="{07BA7DD6-BFF9-084F-84F9-561C8B6C7B4F}" type="datetime1">
               <a:rPr lang="en-US" smtClean="0"/>
-              <a:t>5/7/22</a:t>
+              <a:t>5/8/22</a:t>
             </a:fld>
             <a:endParaRPr lang="en-US" dirty="0"/>
           </a:p>
@@ -5819,9 +5819,9 @@
           <a:bodyPr/>
           <a:lstStyle/>
           <a:p>
-            <a:fld id="{1270E831-1EF4-6642-B61A-D7E8CBAB20D4}" type="datetime1">
+            <a:fld id="{724C4EB0-39D1-9A4E-8C9F-D853C1FD4261}" type="datetime1">
               <a:rPr lang="en-US" smtClean="0"/>
-              <a:t>5/7/22</a:t>
+              <a:t>5/8/22</a:t>
             </a:fld>
             <a:endParaRPr lang="en-US" dirty="0"/>
           </a:p>
@@ -6685,9 +6685,9 @@
           <a:bodyPr/>
           <a:lstStyle/>
           <a:p>
-            <a:fld id="{86E5CD15-9192-DA46-9BAE-7133F9383754}" type="datetime1">
+            <a:fld id="{86D26930-F2B0-9844-92CE-BAE581F58247}" type="datetime1">
               <a:rPr lang="en-US" smtClean="0"/>
-              <a:t>5/7/22</a:t>
+              <a:t>5/8/22</a:t>
             </a:fld>
             <a:endParaRPr lang="en-US" dirty="0"/>
           </a:p>
@@ -6880,9 +6880,9 @@
           <a:bodyPr/>
           <a:lstStyle/>
           <a:p>
-            <a:fld id="{120B18D5-7D5E-514A-B04C-6B3AA3285E7A}" type="datetime1">
+            <a:fld id="{380C7D20-E836-6B41-A34C-20A5758EF4B7}" type="datetime1">
               <a:rPr lang="en-US" smtClean="0"/>
-              <a:t>5/7/22</a:t>
+              <a:t>5/8/22</a:t>
             </a:fld>
             <a:endParaRPr lang="en-US" dirty="0"/>
           </a:p>
@@ -7857,9 +7857,9 @@
           <a:bodyPr/>
           <a:lstStyle/>
           <a:p>
-            <a:fld id="{88343C2F-3E17-5D48-93D0-32B25CCD34CD}" type="datetime1">
+            <a:fld id="{2776366E-4798-7C48-A927-990FE89992C6}" type="datetime1">
               <a:rPr lang="en-US" smtClean="0"/>
-              <a:t>5/7/22</a:t>
+              <a:t>5/8/22</a:t>
             </a:fld>
             <a:endParaRPr lang="en-US" dirty="0"/>
           </a:p>
@@ -8073,9 +8073,9 @@
           <a:bodyPr/>
           <a:lstStyle/>
           <a:p>
-            <a:fld id="{2D11A0A9-A2D8-C341-9383-67C5484E1034}" type="datetime1">
+            <a:fld id="{326A49A4-1413-6E44-B02F-40C4D58E54B1}" type="datetime1">
               <a:rPr lang="en-US" smtClean="0"/>
-              <a:t>5/7/22</a:t>
+              <a:t>5/8/22</a:t>
             </a:fld>
             <a:endParaRPr lang="en-US" dirty="0"/>
           </a:p>
@@ -9112,9 +9112,9 @@
           <a:bodyPr/>
           <a:lstStyle/>
           <a:p>
-            <a:fld id="{91508794-F411-EA4A-A394-6F8EB73219D7}" type="datetime1">
+            <a:fld id="{574B54C1-55B7-8445-8990-BC9745155849}" type="datetime1">
               <a:rPr lang="en-US" smtClean="0"/>
-              <a:t>5/7/22</a:t>
+              <a:t>5/8/22</a:t>
             </a:fld>
             <a:endParaRPr lang="en-US" dirty="0"/>
           </a:p>
@@ -9389,9 +9389,9 @@
           <a:bodyPr/>
           <a:lstStyle/>
           <a:p>
-            <a:fld id="{80BDD94D-D7B2-044D-9D2E-4A1FB8F20097}" type="datetime1">
+            <a:fld id="{955F97F2-E349-EF41-ACBD-20FF2C4CD11C}" type="datetime1">
               <a:rPr lang="en-US" smtClean="0"/>
-              <a:t>5/7/22</a:t>
+              <a:t>5/8/22</a:t>
             </a:fld>
             <a:endParaRPr lang="en-US" dirty="0"/>
           </a:p>
@@ -9804,9 +9804,9 @@
           <a:bodyPr/>
           <a:lstStyle/>
           <a:p>
-            <a:fld id="{EE7519D9-4178-094A-BC4C-E01A58A217BD}" type="datetime1">
+            <a:fld id="{6D759958-ECDF-0443-8560-EF97EC33197E}" type="datetime1">
               <a:rPr lang="en-US" smtClean="0"/>
-              <a:t>5/7/22</a:t>
+              <a:t>5/8/22</a:t>
             </a:fld>
             <a:endParaRPr lang="en-US" dirty="0"/>
           </a:p>
@@ -9936,9 +9936,9 @@
           <a:bodyPr/>
           <a:lstStyle/>
           <a:p>
-            <a:fld id="{74957F99-3511-774C-84C7-350707350755}" type="datetime1">
+            <a:fld id="{5023A36E-2C42-6744-AC3C-58FABD8666C1}" type="datetime1">
               <a:rPr lang="en-US" smtClean="0"/>
-              <a:t>5/7/22</a:t>
+              <a:t>5/8/22</a:t>
             </a:fld>
             <a:endParaRPr lang="en-US" dirty="0"/>
           </a:p>
@@ -10036,9 +10036,9 @@
           <a:bodyPr/>
           <a:lstStyle/>
           <a:p>
-            <a:fld id="{CD8B2E8C-DE6C-8B49-985F-C89E9147C411}" type="datetime1">
+            <a:fld id="{AB93C7B1-326F-0543-9B3E-AADCACAFEAE6}" type="datetime1">
               <a:rPr lang="en-US" smtClean="0"/>
-              <a:t>5/7/22</a:t>
+              <a:t>5/8/22</a:t>
             </a:fld>
             <a:endParaRPr lang="en-US" dirty="0"/>
           </a:p>
@@ -11122,9 +11122,9 @@
           <a:bodyPr/>
           <a:lstStyle/>
           <a:p>
-            <a:fld id="{98C4242D-46B6-7846-BF36-0B0F9B3EF06A}" type="datetime1">
+            <a:fld id="{B0CCFD82-5EF0-3446-8407-CAC227F555F2}" type="datetime1">
               <a:rPr lang="en-US" smtClean="0"/>
-              <a:t>5/7/22</a:t>
+              <a:t>5/8/22</a:t>
             </a:fld>
             <a:endParaRPr lang="en-US" dirty="0"/>
           </a:p>
@@ -12235,9 +12235,9 @@
           <a:bodyPr/>
           <a:lstStyle/>
           <a:p>
-            <a:fld id="{6FAB6DC0-087E-FB4C-A9F6-76319D08BD08}" type="datetime1">
+            <a:fld id="{B0CA4E5B-911D-C242-AA08-C78EC595DB10}" type="datetime1">
               <a:rPr lang="en-US" smtClean="0"/>
-              <a:t>5/7/22</a:t>
+              <a:t>5/8/22</a:t>
             </a:fld>
             <a:endParaRPr lang="en-US" dirty="0"/>
           </a:p>
@@ -13237,9 +13237,9 @@
             </a:lvl1pPr>
           </a:lstStyle>
           <a:p>
-            <a:fld id="{74C6D8EF-A1C5-9D42-8221-2B3AE4B6AAB4}" type="datetime1">
+            <a:fld id="{42C7097B-D33C-7740-84D8-08C67B8FCBBB}" type="datetime1">
               <a:rPr lang="en-US" smtClean="0"/>
-              <a:t>5/7/22</a:t>
+              <a:t>5/8/22</a:t>
             </a:fld>
             <a:endParaRPr lang="en-US" dirty="0"/>
           </a:p>
@@ -13387,7 +13387,7 @@
     <p:sldLayoutId id="2147483708" r:id="rId16"/>
     <p:sldLayoutId id="2147483709" r:id="rId17"/>
   </p:sldLayoutIdLst>
-  <p:hf hdr="0" dt="0"/>
+  <p:hf hdr="0" ftr="0" dt="0"/>
   <p:txStyles>
     <p:titleStyle>
       <a:lvl1pPr algn="l" defTabSz="457200" rtl="0" eaLnBrk="1" latinLnBrk="0" hangingPunct="1">
@@ -13820,7 +13820,12 @@
             <p:ph type="ctrTitle"/>
           </p:nvPr>
         </p:nvSpPr>
-        <p:spPr/>
+        <p:spPr>
+          <a:xfrm>
+            <a:off x="886940" y="1998221"/>
+            <a:ext cx="10606121" cy="1624277"/>
+          </a:xfrm>
+        </p:spPr>
         <p:txBody>
           <a:bodyPr/>
           <a:lstStyle/>
@@ -13835,7 +13840,7 @@
             <a:br>
               <a:rPr lang="en-US" sz="2000" dirty="0"/>
             </a:br>
-            <a:endParaRPr lang="en-US" sz="2000" dirty="0"/>
+            <a:endParaRPr lang="en-US" sz="900" dirty="0"/>
           </a:p>
         </p:txBody>
       </p:sp>
@@ -13858,19 +13863,24 @@
         <p:spPr>
           <a:xfrm>
             <a:off x="1154955" y="4777379"/>
-            <a:ext cx="9968674" cy="1284055"/>
+            <a:ext cx="5521742" cy="1284055"/>
           </a:xfrm>
         </p:spPr>
         <p:txBody>
           <a:bodyPr>
-            <a:normAutofit fontScale="85000" lnSpcReduction="20000"/>
+            <a:normAutofit fontScale="62500" lnSpcReduction="20000"/>
           </a:bodyPr>
           <a:lstStyle/>
           <a:p>
             <a:r>
               <a:rPr lang="en-US" dirty="0"/>
-              <a:t>CS 598 DLH</a:t>
-            </a:r>
+              <a:t>CS 598 DLH | </a:t>
+            </a:r>
+            <a:r>
+              <a:rPr lang="en-US" cap="none" dirty="0"/>
+              <a:t>Spring 2022</a:t>
+            </a:r>
+            <a:endParaRPr lang="en-US" dirty="0"/>
           </a:p>
           <a:p>
             <a:r>
@@ -13880,6 +13890,16 @@
             <a:r>
               <a:rPr lang="en-US" dirty="0"/>
               <a:t>: 46</a:t>
+            </a:r>
+          </a:p>
+          <a:p>
+            <a:r>
+              <a:rPr lang="en-US" cap="none" dirty="0"/>
+              <a:t>Paper	   </a:t>
+            </a:r>
+            <a:r>
+              <a:rPr lang="en-US" dirty="0"/>
+              <a:t>: 211</a:t>
             </a:r>
           </a:p>
           <a:p>
@@ -13955,6 +13975,182 @@
           <a:lstStyle/>
           <a:p>
             <a:endParaRPr lang="en-US" dirty="0"/>
+          </a:p>
+        </p:txBody>
+      </p:sp>
+      <p:sp>
+        <p:nvSpPr>
+          <p:cNvPr id="7" name="Rectangle 6">
+            <a:extLst>
+              <a:ext uri="{FF2B5EF4-FFF2-40B4-BE49-F238E27FC236}">
+                <a16:creationId xmlns:a16="http://schemas.microsoft.com/office/drawing/2014/main" id="{C9A55884-8529-8445-B52C-3F58EB82CC8E}"/>
+              </a:ext>
+            </a:extLst>
+          </p:cNvPr>
+          <p:cNvSpPr/>
+          <p:nvPr/>
+        </p:nvSpPr>
+        <p:spPr>
+          <a:xfrm>
+            <a:off x="6789748" y="4671047"/>
+            <a:ext cx="4829439" cy="1246495"/>
+          </a:xfrm>
+          <a:prstGeom prst="rect">
+            <a:avLst/>
+          </a:prstGeom>
+        </p:spPr>
+        <p:txBody>
+          <a:bodyPr wrap="square">
+            <a:spAutoFit/>
+          </a:bodyPr>
+          <a:lstStyle/>
+          <a:p>
+            <a:r>
+              <a:rPr lang="en-US" sz="1000" b="1" dirty="0">
+                <a:solidFill>
+                  <a:schemeClr val="accent1">
+                    <a:lumMod val="60000"/>
+                    <a:lumOff val="40000"/>
+                  </a:schemeClr>
+                </a:solidFill>
+              </a:rPr>
+              <a:t>Original Paper</a:t>
+            </a:r>
+            <a:r>
+              <a:rPr lang="en-US" sz="1000" dirty="0">
+                <a:solidFill>
+                  <a:schemeClr val="accent1">
+                    <a:lumMod val="60000"/>
+                    <a:lumOff val="40000"/>
+                  </a:schemeClr>
+                </a:solidFill>
+              </a:rPr>
+              <a:t>: </a:t>
+            </a:r>
+            <a:r>
+              <a:rPr lang="en-US" sz="1000" dirty="0" err="1">
+                <a:solidFill>
+                  <a:schemeClr val="accent1">
+                    <a:lumMod val="60000"/>
+                    <a:lumOff val="40000"/>
+                  </a:schemeClr>
+                </a:solidFill>
+              </a:rPr>
+              <a:t>Batuhan</a:t>
+            </a:r>
+            <a:r>
+              <a:rPr lang="en-US" sz="1000" dirty="0">
+                <a:solidFill>
+                  <a:schemeClr val="accent1">
+                    <a:lumMod val="60000"/>
+                    <a:lumOff val="40000"/>
+                  </a:schemeClr>
+                </a:solidFill>
+              </a:rPr>
+              <a:t> </a:t>
+            </a:r>
+            <a:r>
+              <a:rPr lang="en-US" sz="1000" dirty="0" err="1">
+                <a:solidFill>
+                  <a:schemeClr val="accent1">
+                    <a:lumMod val="60000"/>
+                    <a:lumOff val="40000"/>
+                  </a:schemeClr>
+                </a:solidFill>
+              </a:rPr>
+              <a:t>Bardak</a:t>
+            </a:r>
+            <a:r>
+              <a:rPr lang="en-US" sz="1000" dirty="0">
+                <a:solidFill>
+                  <a:schemeClr val="accent1">
+                    <a:lumMod val="60000"/>
+                    <a:lumOff val="40000"/>
+                  </a:schemeClr>
+                </a:solidFill>
+              </a:rPr>
+              <a:t> and Mehmet Tan. 2021.</a:t>
+            </a:r>
+            <a:r>
+              <a:rPr lang="en-US" sz="1500" dirty="0">
+                <a:solidFill>
+                  <a:schemeClr val="accent1">
+                    <a:lumMod val="60000"/>
+                    <a:lumOff val="40000"/>
+                  </a:schemeClr>
+                </a:solidFill>
+              </a:rPr>
+              <a:t> </a:t>
+            </a:r>
+            <a:r>
+              <a:rPr lang="en-US" sz="1000" dirty="0">
+                <a:hlinkClick r:id="rId4"/>
+              </a:rPr>
+              <a:t>Improving clinical outcome predictions using convolution over medical entities with multimodal learning</a:t>
+            </a:r>
+            <a:r>
+              <a:rPr lang="en-US" sz="1500" dirty="0">
+                <a:solidFill>
+                  <a:schemeClr val="accent1">
+                    <a:lumMod val="60000"/>
+                    <a:lumOff val="40000"/>
+                  </a:schemeClr>
+                </a:solidFill>
+              </a:rPr>
+              <a:t>. </a:t>
+            </a:r>
+            <a:r>
+              <a:rPr lang="en-US" sz="1000" dirty="0">
+                <a:solidFill>
+                  <a:schemeClr val="accent1">
+                    <a:lumMod val="60000"/>
+                    <a:lumOff val="40000"/>
+                  </a:schemeClr>
+                </a:solidFill>
+              </a:rPr>
+              <a:t>Artificial Intelligence in Medicine, 117:102112.</a:t>
+            </a:r>
+            <a:r>
+              <a:rPr lang="en-US" sz="1500" dirty="0">
+                <a:solidFill>
+                  <a:schemeClr val="accent1">
+                    <a:lumMod val="60000"/>
+                    <a:lumOff val="40000"/>
+                  </a:schemeClr>
+                </a:solidFill>
+              </a:rPr>
+              <a:t> </a:t>
+            </a:r>
+          </a:p>
+          <a:p>
+            <a:endParaRPr lang="en-US" sz="1500" dirty="0">
+              <a:solidFill>
+                <a:schemeClr val="accent1">
+                  <a:lumMod val="60000"/>
+                  <a:lumOff val="40000"/>
+                </a:schemeClr>
+              </a:solidFill>
+            </a:endParaRPr>
+          </a:p>
+          <a:p>
+            <a:r>
+              <a:rPr lang="en-US" sz="1000" dirty="0">
+                <a:hlinkClick r:id="rId4" tooltip="Persistent link using digital object identifier"/>
+              </a:rPr>
+              <a:t>https://doi.org/10.1016/j.artmed.2021.102112</a:t>
+            </a:r>
+            <a:br>
+              <a:rPr lang="en-US" sz="1000" dirty="0">
+                <a:solidFill>
+                  <a:schemeClr val="bg1"/>
+                </a:solidFill>
+              </a:rPr>
+            </a:br>
+            <a:endParaRPr lang="en-US" sz="1000" dirty="0">
+              <a:solidFill>
+                <a:schemeClr val="bg1"/>
+              </a:solidFill>
+            </a:endParaRPr>
           </a:p>
         </p:txBody>
       </p:sp>
@@ -13996,35 +14192,6 @@
           <a:chExt cx="0" cy="0"/>
         </a:xfrm>
       </p:grpSpPr>
-      <p:sp>
-        <p:nvSpPr>
-          <p:cNvPr id="4" name="Footer Placeholder 3">
-            <a:extLst>
-              <a:ext uri="{FF2B5EF4-FFF2-40B4-BE49-F238E27FC236}">
-                <a16:creationId xmlns:a16="http://schemas.microsoft.com/office/drawing/2014/main" id="{F4F8584C-2683-D84A-A67E-9F88CFE1ECB4}"/>
-              </a:ext>
-            </a:extLst>
-          </p:cNvPr>
-          <p:cNvSpPr>
-            <a:spLocks noGrp="1"/>
-          </p:cNvSpPr>
-          <p:nvPr>
-            <p:ph type="ftr" sz="quarter" idx="11"/>
-          </p:nvPr>
-        </p:nvSpPr>
-        <p:spPr/>
-        <p:txBody>
-          <a:bodyPr/>
-          <a:lstStyle/>
-          <a:p>
-            <a:r>
-              <a:rPr lang="en-US"/>
-              <a:t>Team ID: 46</a:t>
-            </a:r>
-            <a:endParaRPr lang="en-US" dirty="0"/>
-          </a:p>
-        </p:txBody>
-      </p:sp>
       <p:sp>
         <p:nvSpPr>
           <p:cNvPr id="13" name="Content Placeholder 2">
@@ -15344,35 +15511,6 @@
       </p:sp>
       <p:sp>
         <p:nvSpPr>
-          <p:cNvPr id="7" name="Footer Placeholder 6">
-            <a:extLst>
-              <a:ext uri="{FF2B5EF4-FFF2-40B4-BE49-F238E27FC236}">
-                <a16:creationId xmlns:a16="http://schemas.microsoft.com/office/drawing/2014/main" id="{BEA6DA37-0983-B149-BD2A-DC5B6EAF0D79}"/>
-              </a:ext>
-            </a:extLst>
-          </p:cNvPr>
-          <p:cNvSpPr>
-            <a:spLocks noGrp="1"/>
-          </p:cNvSpPr>
-          <p:nvPr>
-            <p:ph type="ftr" sz="quarter" idx="11"/>
-          </p:nvPr>
-        </p:nvSpPr>
-        <p:spPr/>
-        <p:txBody>
-          <a:bodyPr/>
-          <a:lstStyle/>
-          <a:p>
-            <a:r>
-              <a:rPr lang="en-US"/>
-              <a:t>Team ID: 46</a:t>
-            </a:r>
-            <a:endParaRPr lang="en-US" dirty="0"/>
-          </a:p>
-        </p:txBody>
-      </p:sp>
-      <p:sp>
-        <p:nvSpPr>
           <p:cNvPr id="8" name="Slide Number Placeholder 7">
             <a:extLst>
               <a:ext uri="{FF2B5EF4-FFF2-40B4-BE49-F238E27FC236}">
@@ -15491,34 +15629,6 @@
           </a:prstGeom>
         </p:spPr>
       </p:pic>
-      <p:sp>
-        <p:nvSpPr>
-          <p:cNvPr id="3" name="Footer Placeholder 2">
-            <a:extLst>
-              <a:ext uri="{FF2B5EF4-FFF2-40B4-BE49-F238E27FC236}">
-                <a16:creationId xmlns:a16="http://schemas.microsoft.com/office/drawing/2014/main" id="{26DED93D-B9B1-4F42-8644-90C08C4D065C}"/>
-              </a:ext>
-            </a:extLst>
-          </p:cNvPr>
-          <p:cNvSpPr>
-            <a:spLocks noGrp="1"/>
-          </p:cNvSpPr>
-          <p:nvPr>
-            <p:ph type="ftr" sz="quarter" idx="11"/>
-          </p:nvPr>
-        </p:nvSpPr>
-        <p:spPr/>
-        <p:txBody>
-          <a:bodyPr/>
-          <a:lstStyle/>
-          <a:p>
-            <a:r>
-              <a:rPr lang="en-US" dirty="0"/>
-              <a:t>Team ID: 46</a:t>
-            </a:r>
-          </a:p>
-        </p:txBody>
-      </p:sp>
       <p:sp>
         <p:nvSpPr>
           <p:cNvPr id="5" name="Slide Number Placeholder 4">
@@ -16124,15 +16234,7 @@
             </a:pPr>
             <a:r>
               <a:rPr lang="en-US" sz="1100" dirty="0"/>
-              <a:t>Batch size: 64			</a:t>
-            </a:r>
-            <a:r>
-              <a:rPr lang="en-US" sz="1100"/>
-              <a:t>Conv Kernel </a:t>
-            </a:r>
-            <a:r>
-              <a:rPr lang="en-US" sz="1100" dirty="0"/>
-              <a:t>size : 3		</a:t>
+              <a:t>Batch size: 64			Conv Kernel size : 3		</a:t>
             </a:r>
           </a:p>
           <a:p>
@@ -16292,15 +16394,82 @@
             <p:ph idx="1"/>
           </p:nvPr>
         </p:nvSpPr>
-        <p:spPr/>
+        <p:spPr>
+          <a:xfrm>
+            <a:off x="1154954" y="2603500"/>
+            <a:ext cx="8825659" cy="3788338"/>
+          </a:xfrm>
+        </p:spPr>
         <p:txBody>
           <a:bodyPr/>
           <a:lstStyle/>
           <a:p>
             <a:r>
+              <a:rPr lang="en-US" b="1" dirty="0"/>
+              <a:t>Paper Claim 1</a:t>
+            </a:r>
+            <a:r>
               <a:rPr lang="en-US" dirty="0"/>
-              <a:t>Paper Claim 1 - Performance improvement of 1%  - 1.5% AUPRC against multimodal baseline models</a:t>
-            </a:r>
+              <a:t> </a:t>
+            </a:r>
+            <a:r>
+              <a:rPr lang="en-US" b="1" dirty="0"/>
+              <a:t>-</a:t>
+            </a:r>
+            <a:r>
+              <a:rPr lang="en-US" dirty="0"/>
+              <a:t> Performance improvement of 1%  - 1.5% AUPRC against multimodal baseline models</a:t>
+            </a:r>
+          </a:p>
+          <a:p>
+            <a:r>
+              <a:rPr lang="en-US" b="1" dirty="0"/>
+              <a:t>Reproducibility</a:t>
+            </a:r>
+            <a:r>
+              <a:rPr lang="en-US" dirty="0"/>
+              <a:t> </a:t>
+            </a:r>
+            <a:r>
+              <a:rPr lang="en-US" b="1" dirty="0"/>
+              <a:t>Attempt Result </a:t>
+            </a:r>
+            <a:r>
+              <a:rPr lang="en-US" dirty="0"/>
+              <a:t> </a:t>
+            </a:r>
+            <a:r>
+              <a:rPr lang="en-US" b="1" dirty="0"/>
+              <a:t>- </a:t>
+            </a:r>
+            <a:r>
+              <a:rPr lang="en-US" dirty="0"/>
+              <a:t>We noticed performance improved for most of the prediction tasks. On average , they match with authors claim.</a:t>
+            </a:r>
+          </a:p>
+          <a:p>
+            <a:r>
+              <a:rPr lang="en-US" dirty="0"/>
+              <a:t>Latest version of the pretrained word embedding models could be one of the reason on why the numbers couldn’t exactly match</a:t>
+            </a:r>
+          </a:p>
+          <a:p>
+            <a:pPr marL="0" indent="0">
+              <a:buNone/>
+            </a:pPr>
+            <a:r>
+              <a:rPr lang="en-US" dirty="0"/>
+              <a:t> </a:t>
+            </a:r>
+          </a:p>
+          <a:p>
+            <a:endParaRPr lang="en-US" dirty="0"/>
+          </a:p>
+          <a:p>
+            <a:pPr marL="0" indent="0">
+              <a:buNone/>
+            </a:pPr>
+            <a:endParaRPr lang="en-US" dirty="0"/>
           </a:p>
           <a:p>
             <a:pPr marL="0" indent="0">
@@ -16334,14 +16503,14 @@
           <p:nvPr>
             <p:extLst>
               <p:ext uri="{D42A27DB-BD31-4B8C-83A1-F6EECF244321}">
-                <p14:modId xmlns:p14="http://schemas.microsoft.com/office/powerpoint/2010/main" val="3370263218"/>
+                <p14:modId xmlns:p14="http://schemas.microsoft.com/office/powerpoint/2010/main" val="3444624634"/>
               </p:ext>
             </p:extLst>
           </p:nvPr>
         </p:nvGraphicFramePr>
         <p:xfrm>
-          <a:off x="2976695" y="3429000"/>
-          <a:ext cx="6238610" cy="2217035"/>
+          <a:off x="2788931" y="4663579"/>
+          <a:ext cx="5557704" cy="1385721"/>
         </p:xfrm>
         <a:graphic>
           <a:graphicData uri="http://schemas.openxmlformats.org/drawingml/2006/table">
@@ -16350,35 +16519,35 @@
                 <a:tableStyleId>{5C22544A-7EE6-4342-B048-85BDC9FD1C3A}</a:tableStyleId>
               </a:tblPr>
               <a:tblGrid>
-                <a:gridCol w="1806856">
+                <a:gridCol w="1609648">
                   <a:extLst>
                     <a:ext uri="{9D8B030D-6E8A-4147-A177-3AD203B41FA5}">
                       <a16:colId xmlns:a16="http://schemas.microsoft.com/office/drawing/2014/main" val="2368788603"/>
                     </a:ext>
                   </a:extLst>
                 </a:gridCol>
-                <a:gridCol w="948636">
+                <a:gridCol w="845098">
                   <a:extLst>
                     <a:ext uri="{9D8B030D-6E8A-4147-A177-3AD203B41FA5}">
                       <a16:colId xmlns:a16="http://schemas.microsoft.com/office/drawing/2014/main" val="3146162556"/>
                     </a:ext>
                   </a:extLst>
                 </a:gridCol>
-                <a:gridCol w="1161039">
+                <a:gridCol w="1034319">
                   <a:extLst>
                     <a:ext uri="{9D8B030D-6E8A-4147-A177-3AD203B41FA5}">
                       <a16:colId xmlns:a16="http://schemas.microsoft.com/office/drawing/2014/main" val="1634975802"/>
                     </a:ext>
                   </a:extLst>
                 </a:gridCol>
-                <a:gridCol w="992095">
+                <a:gridCol w="883814">
                   <a:extLst>
                     <a:ext uri="{9D8B030D-6E8A-4147-A177-3AD203B41FA5}">
                       <a16:colId xmlns:a16="http://schemas.microsoft.com/office/drawing/2014/main" val="3070726687"/>
                     </a:ext>
                   </a:extLst>
                 </a:gridCol>
-                <a:gridCol w="1329984">
+                <a:gridCol w="1184825">
                   <a:extLst>
                     <a:ext uri="{9D8B030D-6E8A-4147-A177-3AD203B41FA5}">
                       <a16:colId xmlns:a16="http://schemas.microsoft.com/office/drawing/2014/main" val="2979461448"/>
@@ -16386,7 +16555,7 @@
                   </a:extLst>
                 </a:gridCol>
               </a:tblGrid>
-              <a:tr h="443407">
+              <a:tr h="252609">
                 <a:tc>
                   <a:txBody>
                     <a:bodyPr/>
@@ -16415,7 +16584,7 @@
                     <a:p>
                       <a:pPr algn="ctr" fontAlgn="ctr"/>
                       <a:r>
-                        <a:rPr lang="en-US" sz="1200" b="0" kern="1200">
+                        <a:rPr lang="en-US" sz="1200" b="0" kern="1200" dirty="0">
                           <a:solidFill>
                             <a:schemeClr val="lt1"/>
                           </a:solidFill>
@@ -16425,14 +16594,6 @@
                         </a:rPr>
                         <a:t>In-Hospital</a:t>
                       </a:r>
-                      <a:endParaRPr lang="en-US" sz="1200" b="0" kern="1200" dirty="0">
-                        <a:solidFill>
-                          <a:schemeClr val="lt1"/>
-                        </a:solidFill>
-                        <a:latin typeface="Arial" panose="020B0604020202020204" pitchFamily="34" charset="0"/>
-                        <a:ea typeface="+mn-ea"/>
-                        <a:cs typeface="Arial" panose="020B0604020202020204" pitchFamily="34" charset="0"/>
-                      </a:endParaRPr>
                     </a:p>
                   </a:txBody>
                   <a:tcPr marL="9525" marR="9525" marT="9525" marB="0" anchor="ctr"/>
@@ -16506,7 +16667,7 @@
                   </a:ext>
                 </a:extLst>
               </a:tr>
-              <a:tr h="443407">
+              <a:tr h="252609">
                 <a:tc>
                   <a:txBody>
                     <a:bodyPr/>
@@ -16535,7 +16696,7 @@
                     <a:p>
                       <a:pPr algn="ctr" fontAlgn="b"/>
                       <a:r>
-                        <a:rPr lang="en-US" sz="1200" kern="1200">
+                        <a:rPr lang="en-US" sz="1200" kern="1200" dirty="0">
                           <a:solidFill>
                             <a:schemeClr val="dk1"/>
                           </a:solidFill>
@@ -16545,14 +16706,6 @@
                         </a:rPr>
                         <a:t>0.580</a:t>
                       </a:r>
-                      <a:endParaRPr lang="en-US" sz="1200" kern="1200" dirty="0">
-                        <a:solidFill>
-                          <a:schemeClr val="dk1"/>
-                        </a:solidFill>
-                        <a:latin typeface="Arial" panose="020B0604020202020204" pitchFamily="34" charset="0"/>
-                        <a:ea typeface="+mn-ea"/>
-                        <a:cs typeface="Arial" panose="020B0604020202020204" pitchFamily="34" charset="0"/>
-                      </a:endParaRPr>
                     </a:p>
                   </a:txBody>
                   <a:tcPr marL="9525" marR="9525" marT="9525" marB="0" anchor="ctr"/>
@@ -16626,7 +16779,7 @@
                   </a:ext>
                 </a:extLst>
               </a:tr>
-              <a:tr h="443407">
+              <a:tr h="252609">
                 <a:tc>
                   <a:txBody>
                     <a:bodyPr/>
@@ -16738,7 +16891,7 @@
                   </a:ext>
                 </a:extLst>
               </a:tr>
-              <a:tr h="443407">
+              <a:tr h="252609">
                 <a:tc gridSpan="5">
                   <a:txBody>
                     <a:bodyPr/>
@@ -16806,7 +16959,7 @@
                   </a:ext>
                 </a:extLst>
               </a:tr>
-              <a:tr h="443407">
+              <a:tr h="252609">
                 <a:tc>
                   <a:txBody>
                     <a:bodyPr/>
@@ -16936,7 +17089,7 @@
         </p:nvSpPr>
         <p:spPr>
           <a:xfrm>
-            <a:off x="4331431" y="5709807"/>
+            <a:off x="3953059" y="6078590"/>
             <a:ext cx="3529138" cy="246221"/>
           </a:xfrm>
           <a:prstGeom prst="rect">
@@ -16955,35 +17108,6 @@
               <a:rPr lang="en-US" sz="1000" dirty="0"/>
               <a:t>Actual results from our reproduction attempt</a:t>
             </a:r>
-          </a:p>
-        </p:txBody>
-      </p:sp>
-      <p:sp>
-        <p:nvSpPr>
-          <p:cNvPr id="6" name="Footer Placeholder 5">
-            <a:extLst>
-              <a:ext uri="{FF2B5EF4-FFF2-40B4-BE49-F238E27FC236}">
-                <a16:creationId xmlns:a16="http://schemas.microsoft.com/office/drawing/2014/main" id="{DEA844F5-71DD-1748-A977-8908BA0B18FF}"/>
-              </a:ext>
-            </a:extLst>
-          </p:cNvPr>
-          <p:cNvSpPr>
-            <a:spLocks noGrp="1"/>
-          </p:cNvSpPr>
-          <p:nvPr>
-            <p:ph type="ftr" sz="quarter" idx="11"/>
-          </p:nvPr>
-        </p:nvSpPr>
-        <p:spPr/>
-        <p:txBody>
-          <a:bodyPr/>
-          <a:lstStyle/>
-          <a:p>
-            <a:r>
-              <a:rPr lang="en-US"/>
-              <a:t>Team ID: 46</a:t>
-            </a:r>
-            <a:endParaRPr lang="en-US" dirty="0"/>
           </a:p>
         </p:txBody>
       </p:sp>
@@ -17070,7 +17194,7 @@
           <a:p>
             <a:r>
               <a:rPr lang="en-US" dirty="0"/>
-              <a:t>Results</a:t>
+              <a:t>Results – Contd..</a:t>
             </a:r>
           </a:p>
         </p:txBody>
@@ -17091,15 +17215,65 @@
             <p:ph idx="1"/>
           </p:nvPr>
         </p:nvSpPr>
-        <p:spPr/>
+        <p:spPr>
+          <a:xfrm>
+            <a:off x="1154954" y="2435772"/>
+            <a:ext cx="8825659" cy="4079932"/>
+          </a:xfrm>
+        </p:spPr>
         <p:txBody>
           <a:bodyPr/>
           <a:lstStyle/>
           <a:p>
             <a:r>
+              <a:rPr lang="en-US" b="1" dirty="0"/>
+              <a:t>Paper Claim 2</a:t>
+            </a:r>
+            <a:r>
               <a:rPr lang="en-US" dirty="0"/>
-              <a:t>Paper Claim 2 - Performance improvement of 2.5%  - 3% AUPRC against time series baseline model</a:t>
-            </a:r>
+              <a:t> </a:t>
+            </a:r>
+            <a:r>
+              <a:rPr lang="en-US" b="1" dirty="0"/>
+              <a:t>-</a:t>
+            </a:r>
+            <a:r>
+              <a:rPr lang="en-US" dirty="0"/>
+              <a:t> Performance improvement of 2.5%  - 3% AUPRC against time series baseline model</a:t>
+            </a:r>
+          </a:p>
+          <a:p>
+            <a:r>
+              <a:rPr lang="en-US" b="1" dirty="0"/>
+              <a:t>Reproducibility</a:t>
+            </a:r>
+            <a:r>
+              <a:rPr lang="en-US" dirty="0"/>
+              <a:t> </a:t>
+            </a:r>
+            <a:r>
+              <a:rPr lang="en-US" b="1" dirty="0"/>
+              <a:t>Attempt Result – </a:t>
+            </a:r>
+            <a:r>
+              <a:rPr lang="en-US" dirty="0"/>
+              <a:t>We noticed, our results outperformed the improvement claimed by the author  by 3%. </a:t>
+            </a:r>
+          </a:p>
+          <a:p>
+            <a:r>
+              <a:rPr lang="en-US" dirty="0"/>
+              <a:t>Latest version of the pretrained word embedding models could be one of the reason on why the the proposed model outperformed the timeseries baseline claim.</a:t>
+            </a:r>
+          </a:p>
+          <a:p>
+            <a:endParaRPr lang="en-US" dirty="0"/>
+          </a:p>
+          <a:p>
+            <a:endParaRPr lang="en-US" dirty="0"/>
+          </a:p>
+          <a:p>
+            <a:endParaRPr lang="en-US" dirty="0"/>
           </a:p>
           <a:p>
             <a:pPr marL="0" indent="0">
@@ -17133,14 +17307,14 @@
           <p:nvPr>
             <p:extLst>
               <p:ext uri="{D42A27DB-BD31-4B8C-83A1-F6EECF244321}">
-                <p14:modId xmlns:p14="http://schemas.microsoft.com/office/powerpoint/2010/main" val="426263485"/>
+                <p14:modId xmlns:p14="http://schemas.microsoft.com/office/powerpoint/2010/main" val="2975554381"/>
               </p:ext>
             </p:extLst>
           </p:nvPr>
         </p:nvGraphicFramePr>
         <p:xfrm>
-          <a:off x="2976695" y="3429000"/>
-          <a:ext cx="6238610" cy="2217035"/>
+          <a:off x="3492062" y="4847528"/>
+          <a:ext cx="5707475" cy="1539120"/>
         </p:xfrm>
         <a:graphic>
           <a:graphicData uri="http://schemas.openxmlformats.org/drawingml/2006/table">
@@ -17149,35 +17323,35 @@
                 <a:tableStyleId>{5C22544A-7EE6-4342-B048-85BDC9FD1C3A}</a:tableStyleId>
               </a:tblPr>
               <a:tblGrid>
-                <a:gridCol w="1806856">
+                <a:gridCol w="1653026">
                   <a:extLst>
                     <a:ext uri="{9D8B030D-6E8A-4147-A177-3AD203B41FA5}">
                       <a16:colId xmlns:a16="http://schemas.microsoft.com/office/drawing/2014/main" val="2368788603"/>
                     </a:ext>
                   </a:extLst>
                 </a:gridCol>
-                <a:gridCol w="948636">
+                <a:gridCol w="867872">
                   <a:extLst>
                     <a:ext uri="{9D8B030D-6E8A-4147-A177-3AD203B41FA5}">
                       <a16:colId xmlns:a16="http://schemas.microsoft.com/office/drawing/2014/main" val="3146162556"/>
                     </a:ext>
                   </a:extLst>
                 </a:gridCol>
-                <a:gridCol w="1161039">
+                <a:gridCol w="1062192">
                   <a:extLst>
                     <a:ext uri="{9D8B030D-6E8A-4147-A177-3AD203B41FA5}">
                       <a16:colId xmlns:a16="http://schemas.microsoft.com/office/drawing/2014/main" val="1634975802"/>
                     </a:ext>
                   </a:extLst>
                 </a:gridCol>
-                <a:gridCol w="992095">
+                <a:gridCol w="907632">
                   <a:extLst>
                     <a:ext uri="{9D8B030D-6E8A-4147-A177-3AD203B41FA5}">
                       <a16:colId xmlns:a16="http://schemas.microsoft.com/office/drawing/2014/main" val="3070726687"/>
                     </a:ext>
                   </a:extLst>
                 </a:gridCol>
-                <a:gridCol w="1329984">
+                <a:gridCol w="1216753">
                   <a:extLst>
                     <a:ext uri="{9D8B030D-6E8A-4147-A177-3AD203B41FA5}">
                       <a16:colId xmlns:a16="http://schemas.microsoft.com/office/drawing/2014/main" val="2979461448"/>
@@ -17185,7 +17359,7 @@
                   </a:extLst>
                 </a:gridCol>
               </a:tblGrid>
-              <a:tr h="443407">
+              <a:tr h="307824">
                 <a:tc>
                   <a:txBody>
                     <a:bodyPr/>
@@ -17201,7 +17375,7 @@
                           <a:ea typeface="+mn-ea"/>
                           <a:cs typeface="Arial" panose="020B0604020202020204" pitchFamily="34" charset="0"/>
                         </a:rPr>
-                        <a:t>AUPRC</a:t>
+                        <a:t>AUPRC </a:t>
                       </a:r>
                     </a:p>
                   </a:txBody>
@@ -17297,7 +17471,7 @@
                   </a:ext>
                 </a:extLst>
               </a:tr>
-              <a:tr h="443407">
+              <a:tr h="307824">
                 <a:tc>
                   <a:txBody>
                     <a:bodyPr/>
@@ -17409,7 +17583,7 @@
                   </a:ext>
                 </a:extLst>
               </a:tr>
-              <a:tr h="443407">
+              <a:tr h="307824">
                 <a:tc>
                   <a:txBody>
                     <a:bodyPr/>
@@ -17529,7 +17703,7 @@
                   </a:ext>
                 </a:extLst>
               </a:tr>
-              <a:tr h="443407">
+              <a:tr h="307824">
                 <a:tc gridSpan="5">
                   <a:txBody>
                     <a:bodyPr/>
@@ -17597,7 +17771,7 @@
                   </a:ext>
                 </a:extLst>
               </a:tr>
-              <a:tr h="443407">
+              <a:tr h="307824">
                 <a:tc>
                   <a:txBody>
                     <a:bodyPr/>
@@ -17727,7 +17901,7 @@
         </p:nvSpPr>
         <p:spPr>
           <a:xfrm>
-            <a:off x="4331431" y="5709807"/>
+            <a:off x="4315665" y="6450418"/>
             <a:ext cx="3529138" cy="246221"/>
           </a:xfrm>
           <a:prstGeom prst="rect">
@@ -17746,35 +17920,6 @@
               <a:rPr lang="en-US" sz="1000" dirty="0"/>
               <a:t>Actual results from our reproduction attempt</a:t>
             </a:r>
-          </a:p>
-        </p:txBody>
-      </p:sp>
-      <p:sp>
-        <p:nvSpPr>
-          <p:cNvPr id="5" name="Footer Placeholder 4">
-            <a:extLst>
-              <a:ext uri="{FF2B5EF4-FFF2-40B4-BE49-F238E27FC236}">
-                <a16:creationId xmlns:a16="http://schemas.microsoft.com/office/drawing/2014/main" id="{C9B3F74F-3ECA-A442-869A-7872F04140F4}"/>
-              </a:ext>
-            </a:extLst>
-          </p:cNvPr>
-          <p:cNvSpPr>
-            <a:spLocks noGrp="1"/>
-          </p:cNvSpPr>
-          <p:nvPr>
-            <p:ph type="ftr" sz="quarter" idx="11"/>
-          </p:nvPr>
-        </p:nvSpPr>
-        <p:spPr/>
-        <p:txBody>
-          <a:bodyPr/>
-          <a:lstStyle/>
-          <a:p>
-            <a:r>
-              <a:rPr lang="en-US"/>
-              <a:t>Team ID: 46</a:t>
-            </a:r>
-            <a:endParaRPr lang="en-US" dirty="0"/>
           </a:p>
         </p:txBody>
       </p:sp>
@@ -18530,35 +18675,6 @@
       </p:graphicFrame>
       <p:sp>
         <p:nvSpPr>
-          <p:cNvPr id="5" name="Footer Placeholder 4">
-            <a:extLst>
-              <a:ext uri="{FF2B5EF4-FFF2-40B4-BE49-F238E27FC236}">
-                <a16:creationId xmlns:a16="http://schemas.microsoft.com/office/drawing/2014/main" id="{1D41317F-26B3-AA4F-94F5-4ED6586BBAF8}"/>
-              </a:ext>
-            </a:extLst>
-          </p:cNvPr>
-          <p:cNvSpPr>
-            <a:spLocks noGrp="1"/>
-          </p:cNvSpPr>
-          <p:nvPr>
-            <p:ph type="ftr" sz="quarter" idx="11"/>
-          </p:nvPr>
-        </p:nvSpPr>
-        <p:spPr/>
-        <p:txBody>
-          <a:bodyPr/>
-          <a:lstStyle/>
-          <a:p>
-            <a:r>
-              <a:rPr lang="en-US"/>
-              <a:t>Team ID: 46</a:t>
-            </a:r>
-            <a:endParaRPr lang="en-US" dirty="0"/>
-          </a:p>
-        </p:txBody>
-      </p:sp>
-      <p:sp>
-        <p:nvSpPr>
           <p:cNvPr id="6" name="Slide Number Placeholder 5">
             <a:extLst>
               <a:ext uri="{FF2B5EF4-FFF2-40B4-BE49-F238E27FC236}">
@@ -18705,35 +18821,6 @@
               <a:rPr lang="en-US" dirty="0"/>
               <a:t>The results reproduced conform to the author’s claims on leveraging 1D-CNN based multimodal architecture which uses timeseries features and medical entities together producing better results when compared to timeseries and multimodal baseline models. </a:t>
             </a:r>
-          </a:p>
-        </p:txBody>
-      </p:sp>
-      <p:sp>
-        <p:nvSpPr>
-          <p:cNvPr id="4" name="Footer Placeholder 3">
-            <a:extLst>
-              <a:ext uri="{FF2B5EF4-FFF2-40B4-BE49-F238E27FC236}">
-                <a16:creationId xmlns:a16="http://schemas.microsoft.com/office/drawing/2014/main" id="{11F348C5-C4E8-A846-B19B-32EA48BAD795}"/>
-              </a:ext>
-            </a:extLst>
-          </p:cNvPr>
-          <p:cNvSpPr>
-            <a:spLocks noGrp="1"/>
-          </p:cNvSpPr>
-          <p:nvPr>
-            <p:ph type="ftr" sz="quarter" idx="11"/>
-          </p:nvPr>
-        </p:nvSpPr>
-        <p:spPr/>
-        <p:txBody>
-          <a:bodyPr/>
-          <a:lstStyle/>
-          <a:p>
-            <a:r>
-              <a:rPr lang="en-US"/>
-              <a:t>Team ID: 46</a:t>
-            </a:r>
-            <a:endParaRPr lang="en-US" dirty="0"/>
           </a:p>
         </p:txBody>
       </p:sp>

</xml_diff>